<commit_message>
Added objective function diagram.
</commit_message>
<xml_diff>
--- a/Abschlusspräsentation/Praesentation_newdesign.pptx
+++ b/Abschlusspräsentation/Praesentation_newdesign.pptx
@@ -10115,6 +10115,1174 @@
           </a:p>
         </p:txBody>
       </p:sp>
+      <p:grpSp>
+        <p:nvGrpSpPr>
+          <p:cNvPr id="83" name="Gruppierung 82"/>
+          <p:cNvGrpSpPr/>
+          <p:nvPr/>
+        </p:nvGrpSpPr>
+        <p:grpSpPr>
+          <a:xfrm>
+            <a:off x="757457" y="3024994"/>
+            <a:ext cx="10110409" cy="3413902"/>
+            <a:chOff x="757457" y="3024994"/>
+            <a:chExt cx="10110409" cy="3413902"/>
+          </a:xfrm>
+          <a:effectLst>
+            <a:outerShdw blurRad="50800" dist="38100" dir="2700000" algn="tl" rotWithShape="0">
+              <a:prstClr val="black">
+                <a:alpha val="40000"/>
+              </a:prstClr>
+            </a:outerShdw>
+          </a:effectLst>
+        </p:grpSpPr>
+        <p:grpSp>
+          <p:nvGrpSpPr>
+            <p:cNvPr id="58" name="Gruppierung 57"/>
+            <p:cNvGrpSpPr/>
+            <p:nvPr/>
+          </p:nvGrpSpPr>
+          <p:grpSpPr>
+            <a:xfrm>
+              <a:off x="2600787" y="3024994"/>
+              <a:ext cx="8267079" cy="3413902"/>
+              <a:chOff x="1371596" y="3024994"/>
+              <a:chExt cx="8994196" cy="3599316"/>
+            </a:xfrm>
+            <a:effectLst/>
+          </p:grpSpPr>
+          <p:sp>
+            <p:nvSpPr>
+              <p:cNvPr id="4" name="Rechteck 3"/>
+              <p:cNvSpPr/>
+              <p:nvPr/>
+            </p:nvSpPr>
+            <p:spPr>
+              <a:xfrm>
+                <a:off x="1371596" y="5089357"/>
+                <a:ext cx="2618511" cy="547442"/>
+              </a:xfrm>
+              <a:prstGeom prst="rect">
+                <a:avLst/>
+              </a:prstGeom>
+              <a:gradFill flip="none" rotWithShape="1">
+                <a:gsLst>
+                  <a:gs pos="0">
+                    <a:schemeClr val="accent1">
+                      <a:lumMod val="67000"/>
+                    </a:schemeClr>
+                  </a:gs>
+                  <a:gs pos="48000">
+                    <a:schemeClr val="accent1">
+                      <a:lumMod val="97000"/>
+                      <a:lumOff val="3000"/>
+                    </a:schemeClr>
+                  </a:gs>
+                  <a:gs pos="100000">
+                    <a:schemeClr val="accent1">
+                      <a:lumMod val="60000"/>
+                      <a:lumOff val="40000"/>
+                    </a:schemeClr>
+                  </a:gs>
+                </a:gsLst>
+                <a:lin ang="16200000" scaled="1"/>
+                <a:tileRect/>
+              </a:gradFill>
+            </p:spPr>
+            <p:style>
+              <a:lnRef idx="2">
+                <a:schemeClr val="accent1">
+                  <a:shade val="50000"/>
+                </a:schemeClr>
+              </a:lnRef>
+              <a:fillRef idx="1">
+                <a:schemeClr val="accent1"/>
+              </a:fillRef>
+              <a:effectRef idx="0">
+                <a:schemeClr val="accent1"/>
+              </a:effectRef>
+              <a:fontRef idx="minor">
+                <a:schemeClr val="lt1"/>
+              </a:fontRef>
+            </p:style>
+            <p:txBody>
+              <a:bodyPr rtlCol="0" anchor="ctr"/>
+              <a:lstStyle/>
+              <a:p>
+                <a:pPr algn="ctr"/>
+                <a:r>
+                  <a:rPr lang="de-DE" dirty="0" smtClean="0">
+                    <a:solidFill>
+                      <a:schemeClr val="tx2"/>
+                    </a:solidFill>
+                  </a:rPr>
+                  <a:t>ECTS Standard Deviation</a:t>
+                </a:r>
+              </a:p>
+            </p:txBody>
+          </p:sp>
+          <p:sp>
+            <p:nvSpPr>
+              <p:cNvPr id="5" name="Rechteck 4"/>
+              <p:cNvSpPr/>
+              <p:nvPr/>
+            </p:nvSpPr>
+            <p:spPr>
+              <a:xfrm>
+                <a:off x="1371598" y="3024994"/>
+                <a:ext cx="2618511" cy="547442"/>
+              </a:xfrm>
+              <a:prstGeom prst="rect">
+                <a:avLst/>
+              </a:prstGeom>
+              <a:gradFill flip="none" rotWithShape="1">
+                <a:gsLst>
+                  <a:gs pos="0">
+                    <a:schemeClr val="accent1">
+                      <a:lumMod val="67000"/>
+                    </a:schemeClr>
+                  </a:gs>
+                  <a:gs pos="48000">
+                    <a:schemeClr val="accent1">
+                      <a:lumMod val="97000"/>
+                      <a:lumOff val="3000"/>
+                    </a:schemeClr>
+                  </a:gs>
+                  <a:gs pos="100000">
+                    <a:schemeClr val="accent1">
+                      <a:lumMod val="60000"/>
+                      <a:lumOff val="40000"/>
+                    </a:schemeClr>
+                  </a:gs>
+                </a:gsLst>
+                <a:lin ang="16200000" scaled="1"/>
+                <a:tileRect/>
+              </a:gradFill>
+            </p:spPr>
+            <p:style>
+              <a:lnRef idx="2">
+                <a:schemeClr val="accent1">
+                  <a:shade val="50000"/>
+                </a:schemeClr>
+              </a:lnRef>
+              <a:fillRef idx="1">
+                <a:schemeClr val="accent1"/>
+              </a:fillRef>
+              <a:effectRef idx="0">
+                <a:schemeClr val="accent1"/>
+              </a:effectRef>
+              <a:fontRef idx="minor">
+                <a:schemeClr val="lt1"/>
+              </a:fontRef>
+            </p:style>
+            <p:txBody>
+              <a:bodyPr rtlCol="0" anchor="ctr"/>
+              <a:lstStyle/>
+              <a:p>
+                <a:pPr algn="ctr"/>
+                <a:r>
+                  <a:rPr lang="de-DE" dirty="0" smtClean="0">
+                    <a:solidFill>
+                      <a:schemeClr val="tx2"/>
+                    </a:solidFill>
+                  </a:rPr>
+                  <a:t>Minimal ECTS</a:t>
+                </a:r>
+              </a:p>
+            </p:txBody>
+          </p:sp>
+          <p:sp>
+            <p:nvSpPr>
+              <p:cNvPr id="6" name="Rechteck 5"/>
+              <p:cNvSpPr/>
+              <p:nvPr/>
+            </p:nvSpPr>
+            <p:spPr>
+              <a:xfrm>
+                <a:off x="1371598" y="3713115"/>
+                <a:ext cx="2618511" cy="547442"/>
+              </a:xfrm>
+              <a:prstGeom prst="rect">
+                <a:avLst/>
+              </a:prstGeom>
+              <a:gradFill flip="none" rotWithShape="1">
+                <a:gsLst>
+                  <a:gs pos="0">
+                    <a:schemeClr val="accent1">
+                      <a:lumMod val="67000"/>
+                    </a:schemeClr>
+                  </a:gs>
+                  <a:gs pos="48000">
+                    <a:schemeClr val="accent1">
+                      <a:lumMod val="97000"/>
+                      <a:lumOff val="3000"/>
+                    </a:schemeClr>
+                  </a:gs>
+                  <a:gs pos="100000">
+                    <a:schemeClr val="accent1">
+                      <a:lumMod val="60000"/>
+                      <a:lumOff val="40000"/>
+                    </a:schemeClr>
+                  </a:gs>
+                </a:gsLst>
+                <a:lin ang="16200000" scaled="1"/>
+                <a:tileRect/>
+              </a:gradFill>
+            </p:spPr>
+            <p:style>
+              <a:lnRef idx="2">
+                <a:schemeClr val="accent1">
+                  <a:shade val="50000"/>
+                </a:schemeClr>
+              </a:lnRef>
+              <a:fillRef idx="1">
+                <a:schemeClr val="accent1"/>
+              </a:fillRef>
+              <a:effectRef idx="0">
+                <a:schemeClr val="accent1"/>
+              </a:effectRef>
+              <a:fontRef idx="minor">
+                <a:schemeClr val="lt1"/>
+              </a:fontRef>
+            </p:style>
+            <p:txBody>
+              <a:bodyPr rtlCol="0" anchor="ctr"/>
+              <a:lstStyle/>
+              <a:p>
+                <a:pPr algn="ctr"/>
+                <a:r>
+                  <a:rPr lang="de-DE" dirty="0" smtClean="0">
+                    <a:solidFill>
+                      <a:schemeClr val="tx2"/>
+                    </a:solidFill>
+                  </a:rPr>
+                  <a:t>Minimal Semester</a:t>
+                </a:r>
+              </a:p>
+            </p:txBody>
+          </p:sp>
+          <p:sp>
+            <p:nvSpPr>
+              <p:cNvPr id="7" name="Rechteck 6"/>
+              <p:cNvSpPr/>
+              <p:nvPr/>
+            </p:nvSpPr>
+            <p:spPr>
+              <a:xfrm>
+                <a:off x="1371597" y="4401236"/>
+                <a:ext cx="2618511" cy="547442"/>
+              </a:xfrm>
+              <a:prstGeom prst="rect">
+                <a:avLst/>
+              </a:prstGeom>
+              <a:gradFill flip="none" rotWithShape="1">
+                <a:gsLst>
+                  <a:gs pos="0">
+                    <a:schemeClr val="accent1">
+                      <a:lumMod val="67000"/>
+                    </a:schemeClr>
+                  </a:gs>
+                  <a:gs pos="48000">
+                    <a:schemeClr val="accent1">
+                      <a:lumMod val="97000"/>
+                      <a:lumOff val="3000"/>
+                    </a:schemeClr>
+                  </a:gs>
+                  <a:gs pos="100000">
+                    <a:schemeClr val="accent1">
+                      <a:lumMod val="60000"/>
+                      <a:lumOff val="40000"/>
+                    </a:schemeClr>
+                  </a:gs>
+                </a:gsLst>
+                <a:lin ang="16200000" scaled="1"/>
+                <a:tileRect/>
+              </a:gradFill>
+            </p:spPr>
+            <p:style>
+              <a:lnRef idx="2">
+                <a:schemeClr val="accent1">
+                  <a:shade val="50000"/>
+                </a:schemeClr>
+              </a:lnRef>
+              <a:fillRef idx="1">
+                <a:schemeClr val="accent1"/>
+              </a:fillRef>
+              <a:effectRef idx="0">
+                <a:schemeClr val="accent1"/>
+              </a:effectRef>
+              <a:fontRef idx="minor">
+                <a:schemeClr val="lt1"/>
+              </a:fontRef>
+            </p:style>
+            <p:txBody>
+              <a:bodyPr rtlCol="0" anchor="ctr"/>
+              <a:lstStyle/>
+              <a:p>
+                <a:pPr algn="ctr"/>
+                <a:r>
+                  <a:rPr lang="de-DE" dirty="0" err="1" smtClean="0">
+                    <a:solidFill>
+                      <a:schemeClr val="tx2"/>
+                    </a:solidFill>
+                  </a:rPr>
+                  <a:t>Preferences</a:t>
+                </a:r>
+                <a:endParaRPr lang="de-DE" dirty="0" smtClean="0">
+                  <a:solidFill>
+                    <a:schemeClr val="tx2"/>
+                  </a:solidFill>
+                </a:endParaRPr>
+              </a:p>
+            </p:txBody>
+          </p:sp>
+          <p:sp>
+            <p:nvSpPr>
+              <p:cNvPr id="8" name="Rechteck 7"/>
+              <p:cNvSpPr/>
+              <p:nvPr/>
+            </p:nvSpPr>
+            <p:spPr>
+              <a:xfrm>
+                <a:off x="1371596" y="6051199"/>
+                <a:ext cx="2618511" cy="547442"/>
+              </a:xfrm>
+              <a:prstGeom prst="rect">
+                <a:avLst/>
+              </a:prstGeom>
+              <a:gradFill>
+                <a:gsLst>
+                  <a:gs pos="1000">
+                    <a:schemeClr val="accent3"/>
+                  </a:gs>
+                  <a:gs pos="87000">
+                    <a:schemeClr val="accent2">
+                      <a:lumMod val="97000"/>
+                      <a:lumOff val="3000"/>
+                    </a:schemeClr>
+                  </a:gs>
+                  <a:gs pos="100000">
+                    <a:schemeClr val="accent2">
+                      <a:lumMod val="60000"/>
+                      <a:lumOff val="40000"/>
+                    </a:schemeClr>
+                  </a:gs>
+                </a:gsLst>
+                <a:lin ang="16200000" scaled="1"/>
+              </a:gradFill>
+            </p:spPr>
+            <p:style>
+              <a:lnRef idx="2">
+                <a:schemeClr val="accent1">
+                  <a:shade val="50000"/>
+                </a:schemeClr>
+              </a:lnRef>
+              <a:fillRef idx="1">
+                <a:schemeClr val="accent1"/>
+              </a:fillRef>
+              <a:effectRef idx="0">
+                <a:schemeClr val="accent1"/>
+              </a:effectRef>
+              <a:fontRef idx="minor">
+                <a:schemeClr val="lt1"/>
+              </a:fontRef>
+            </p:style>
+            <p:txBody>
+              <a:bodyPr rtlCol="0" anchor="ctr"/>
+              <a:lstStyle/>
+              <a:p>
+                <a:pPr algn="ctr"/>
+                <a:r>
+                  <a:rPr lang="de-DE" dirty="0" smtClean="0">
+                    <a:solidFill>
+                      <a:schemeClr val="accent1"/>
+                    </a:solidFill>
+                  </a:rPr>
+                  <a:t>User </a:t>
+                </a:r>
+                <a:r>
+                  <a:rPr lang="de-DE" dirty="0" err="1" smtClean="0">
+                    <a:solidFill>
+                      <a:schemeClr val="accent1"/>
+                    </a:solidFill>
+                  </a:rPr>
+                  <a:t>Selection</a:t>
+                </a:r>
+                <a:endParaRPr lang="de-DE" dirty="0" smtClean="0">
+                  <a:solidFill>
+                    <a:schemeClr val="accent1"/>
+                  </a:solidFill>
+                </a:endParaRPr>
+              </a:p>
+            </p:txBody>
+          </p:sp>
+          <p:sp>
+            <p:nvSpPr>
+              <p:cNvPr id="9" name="Rechteck 8"/>
+              <p:cNvSpPr/>
+              <p:nvPr/>
+            </p:nvSpPr>
+            <p:spPr>
+              <a:xfrm>
+                <a:off x="5798380" y="3962744"/>
+                <a:ext cx="698805" cy="696469"/>
+              </a:xfrm>
+              <a:prstGeom prst="rect">
+                <a:avLst/>
+              </a:prstGeom>
+              <a:gradFill flip="none" rotWithShape="1">
+                <a:gsLst>
+                  <a:gs pos="0">
+                    <a:schemeClr val="accent1">
+                      <a:lumMod val="67000"/>
+                    </a:schemeClr>
+                  </a:gs>
+                  <a:gs pos="48000">
+                    <a:schemeClr val="accent1">
+                      <a:lumMod val="97000"/>
+                      <a:lumOff val="3000"/>
+                    </a:schemeClr>
+                  </a:gs>
+                  <a:gs pos="100000">
+                    <a:schemeClr val="accent1">
+                      <a:lumMod val="60000"/>
+                      <a:lumOff val="40000"/>
+                    </a:schemeClr>
+                  </a:gs>
+                </a:gsLst>
+                <a:lin ang="16200000" scaled="1"/>
+                <a:tileRect/>
+              </a:gradFill>
+            </p:spPr>
+            <p:style>
+              <a:lnRef idx="2">
+                <a:schemeClr val="accent1">
+                  <a:shade val="50000"/>
+                </a:schemeClr>
+              </a:lnRef>
+              <a:fillRef idx="1">
+                <a:schemeClr val="accent1"/>
+              </a:fillRef>
+              <a:effectRef idx="0">
+                <a:schemeClr val="accent1"/>
+              </a:effectRef>
+              <a:fontRef idx="minor">
+                <a:schemeClr val="lt1"/>
+              </a:fontRef>
+            </p:style>
+            <p:txBody>
+              <a:bodyPr rtlCol="0" anchor="ctr"/>
+              <a:lstStyle/>
+              <a:p>
+                <a:pPr algn="ctr"/>
+                <a:r>
+                  <a:rPr lang="de-DE" sz="6600" dirty="0" smtClean="0">
+                    <a:solidFill>
+                      <a:schemeClr val="tx2"/>
+                    </a:solidFill>
+                  </a:rPr>
+                  <a:t>∅</a:t>
+                </a:r>
+                <a:endParaRPr lang="de-DE" dirty="0" smtClean="0">
+                  <a:solidFill>
+                    <a:schemeClr val="tx2"/>
+                  </a:solidFill>
+                </a:endParaRPr>
+              </a:p>
+            </p:txBody>
+          </p:sp>
+          <p:cxnSp>
+            <p:nvCxnSpPr>
+              <p:cNvPr id="11" name="Gewinkelte Verbindung 10"/>
+              <p:cNvCxnSpPr>
+                <a:stCxn id="5" idx="3"/>
+                <a:endCxn id="9" idx="1"/>
+              </p:cNvCxnSpPr>
+              <p:nvPr/>
+            </p:nvCxnSpPr>
+            <p:spPr>
+              <a:xfrm>
+                <a:off x="3990109" y="3298715"/>
+                <a:ext cx="1808271" cy="1012264"/>
+              </a:xfrm>
+              <a:prstGeom prst="bentConnector3">
+                <a:avLst/>
+              </a:prstGeom>
+              <a:ln>
+                <a:tailEnd type="triangle"/>
+              </a:ln>
+            </p:spPr>
+            <p:style>
+              <a:lnRef idx="1">
+                <a:schemeClr val="accent1"/>
+              </a:lnRef>
+              <a:fillRef idx="0">
+                <a:schemeClr val="accent1"/>
+              </a:fillRef>
+              <a:effectRef idx="0">
+                <a:schemeClr val="accent1"/>
+              </a:effectRef>
+              <a:fontRef idx="minor">
+                <a:schemeClr val="tx1"/>
+              </a:fontRef>
+            </p:style>
+          </p:cxnSp>
+          <p:cxnSp>
+            <p:nvCxnSpPr>
+              <p:cNvPr id="12" name="Gewinkelte Verbindung 11"/>
+              <p:cNvCxnSpPr>
+                <a:stCxn id="6" idx="3"/>
+                <a:endCxn id="9" idx="1"/>
+              </p:cNvCxnSpPr>
+              <p:nvPr/>
+            </p:nvCxnSpPr>
+            <p:spPr>
+              <a:xfrm>
+                <a:off x="3990109" y="3986836"/>
+                <a:ext cx="1808271" cy="324143"/>
+              </a:xfrm>
+              <a:prstGeom prst="bentConnector3">
+                <a:avLst/>
+              </a:prstGeom>
+              <a:ln>
+                <a:tailEnd type="triangle"/>
+              </a:ln>
+            </p:spPr>
+            <p:style>
+              <a:lnRef idx="1">
+                <a:schemeClr val="accent1"/>
+              </a:lnRef>
+              <a:fillRef idx="0">
+                <a:schemeClr val="accent1"/>
+              </a:fillRef>
+              <a:effectRef idx="0">
+                <a:schemeClr val="accent1"/>
+              </a:effectRef>
+              <a:fontRef idx="minor">
+                <a:schemeClr val="tx1"/>
+              </a:fontRef>
+            </p:style>
+          </p:cxnSp>
+          <p:cxnSp>
+            <p:nvCxnSpPr>
+              <p:cNvPr id="15" name="Gewinkelte Verbindung 14"/>
+              <p:cNvCxnSpPr>
+                <a:stCxn id="7" idx="3"/>
+                <a:endCxn id="9" idx="1"/>
+              </p:cNvCxnSpPr>
+              <p:nvPr/>
+            </p:nvCxnSpPr>
+            <p:spPr>
+              <a:xfrm flipV="1">
+                <a:off x="3990108" y="4310979"/>
+                <a:ext cx="1808272" cy="363978"/>
+              </a:xfrm>
+              <a:prstGeom prst="bentConnector3">
+                <a:avLst/>
+              </a:prstGeom>
+              <a:ln>
+                <a:tailEnd type="triangle"/>
+              </a:ln>
+            </p:spPr>
+            <p:style>
+              <a:lnRef idx="1">
+                <a:schemeClr val="accent1"/>
+              </a:lnRef>
+              <a:fillRef idx="0">
+                <a:schemeClr val="accent1"/>
+              </a:fillRef>
+              <a:effectRef idx="0">
+                <a:schemeClr val="accent1"/>
+              </a:effectRef>
+              <a:fontRef idx="minor">
+                <a:schemeClr val="tx1"/>
+              </a:fontRef>
+            </p:style>
+          </p:cxnSp>
+          <p:cxnSp>
+            <p:nvCxnSpPr>
+              <p:cNvPr id="18" name="Gewinkelte Verbindung 17"/>
+              <p:cNvCxnSpPr>
+                <a:stCxn id="4" idx="3"/>
+                <a:endCxn id="9" idx="1"/>
+              </p:cNvCxnSpPr>
+              <p:nvPr/>
+            </p:nvCxnSpPr>
+            <p:spPr>
+              <a:xfrm flipV="1">
+                <a:off x="3990107" y="4310979"/>
+                <a:ext cx="1808273" cy="1052099"/>
+              </a:xfrm>
+              <a:prstGeom prst="bentConnector3">
+                <a:avLst>
+                  <a:gd name="adj1" fmla="val 50000"/>
+                </a:avLst>
+              </a:prstGeom>
+              <a:ln>
+                <a:tailEnd type="triangle"/>
+              </a:ln>
+            </p:spPr>
+            <p:style>
+              <a:lnRef idx="1">
+                <a:schemeClr val="accent1"/>
+              </a:lnRef>
+              <a:fillRef idx="0">
+                <a:schemeClr val="accent1"/>
+              </a:fillRef>
+              <a:effectRef idx="0">
+                <a:schemeClr val="accent1"/>
+              </a:effectRef>
+              <a:fontRef idx="minor">
+                <a:schemeClr val="tx1"/>
+              </a:fontRef>
+            </p:style>
+          </p:cxnSp>
+          <p:sp>
+            <p:nvSpPr>
+              <p:cNvPr id="35" name="Rechteck 34"/>
+              <p:cNvSpPr/>
+              <p:nvPr/>
+            </p:nvSpPr>
+            <p:spPr>
+              <a:xfrm>
+                <a:off x="4811842" y="6051199"/>
+                <a:ext cx="1685343" cy="573111"/>
+              </a:xfrm>
+              <a:prstGeom prst="rect">
+                <a:avLst/>
+              </a:prstGeom>
+              <a:gradFill flip="none" rotWithShape="1">
+                <a:gsLst>
+                  <a:gs pos="0">
+                    <a:schemeClr val="accent1">
+                      <a:lumMod val="67000"/>
+                    </a:schemeClr>
+                  </a:gs>
+                  <a:gs pos="48000">
+                    <a:schemeClr val="accent1">
+                      <a:lumMod val="97000"/>
+                      <a:lumOff val="3000"/>
+                    </a:schemeClr>
+                  </a:gs>
+                  <a:gs pos="100000">
+                    <a:schemeClr val="accent1">
+                      <a:lumMod val="60000"/>
+                      <a:lumOff val="40000"/>
+                    </a:schemeClr>
+                  </a:gs>
+                </a:gsLst>
+                <a:lin ang="16200000" scaled="1"/>
+                <a:tileRect/>
+              </a:gradFill>
+            </p:spPr>
+            <p:style>
+              <a:lnRef idx="2">
+                <a:schemeClr val="accent1">
+                  <a:shade val="50000"/>
+                </a:schemeClr>
+              </a:lnRef>
+              <a:fillRef idx="1">
+                <a:schemeClr val="accent1"/>
+              </a:fillRef>
+              <a:effectRef idx="0">
+                <a:schemeClr val="accent1"/>
+              </a:effectRef>
+              <a:fontRef idx="minor">
+                <a:schemeClr val="lt1"/>
+              </a:fontRef>
+            </p:style>
+            <p:txBody>
+              <a:bodyPr rtlCol="0" anchor="ctr"/>
+              <a:lstStyle/>
+              <a:p>
+                <a:pPr algn="ctr"/>
+                <a:r>
+                  <a:rPr lang="de-DE" sz="2000" dirty="0">
+                    <a:solidFill>
+                      <a:schemeClr val="tx2"/>
+                    </a:solidFill>
+                  </a:rPr>
+                  <a:t>x</a:t>
+                </a:r>
+                <a:r>
+                  <a:rPr lang="de-DE" sz="2000" dirty="0" smtClean="0">
+                    <a:solidFill>
+                      <a:schemeClr val="tx2"/>
+                    </a:solidFill>
+                  </a:rPr>
+                  <a:t> &lt; 0.5 ? 0 : x</a:t>
+                </a:r>
+                <a:endParaRPr lang="de-DE" sz="1400" dirty="0" smtClean="0">
+                  <a:solidFill>
+                    <a:schemeClr val="tx2"/>
+                  </a:solidFill>
+                </a:endParaRPr>
+              </a:p>
+            </p:txBody>
+          </p:sp>
+          <p:cxnSp>
+            <p:nvCxnSpPr>
+              <p:cNvPr id="41" name="Gerade Verbindung mit Pfeil 40"/>
+              <p:cNvCxnSpPr>
+                <a:stCxn id="8" idx="3"/>
+                <a:endCxn id="35" idx="1"/>
+              </p:cNvCxnSpPr>
+              <p:nvPr/>
+            </p:nvCxnSpPr>
+            <p:spPr>
+              <a:xfrm>
+                <a:off x="3990107" y="6324920"/>
+                <a:ext cx="821735" cy="12835"/>
+              </a:xfrm>
+              <a:prstGeom prst="straightConnector1">
+                <a:avLst/>
+              </a:prstGeom>
+              <a:ln>
+                <a:tailEnd type="triangle"/>
+              </a:ln>
+            </p:spPr>
+            <p:style>
+              <a:lnRef idx="1">
+                <a:schemeClr val="accent1"/>
+              </a:lnRef>
+              <a:fillRef idx="0">
+                <a:schemeClr val="accent1"/>
+              </a:fillRef>
+              <a:effectRef idx="0">
+                <a:schemeClr val="accent1"/>
+              </a:effectRef>
+              <a:fontRef idx="minor">
+                <a:schemeClr val="tx1"/>
+              </a:fontRef>
+            </p:style>
+          </p:cxnSp>
+          <p:sp>
+            <p:nvSpPr>
+              <p:cNvPr id="45" name="Rechteck 44"/>
+              <p:cNvSpPr/>
+              <p:nvPr/>
+            </p:nvSpPr>
+            <p:spPr>
+              <a:xfrm>
+                <a:off x="8067488" y="4674957"/>
+                <a:ext cx="698805" cy="696469"/>
+              </a:xfrm>
+              <a:prstGeom prst="rect">
+                <a:avLst/>
+              </a:prstGeom>
+              <a:gradFill flip="none" rotWithShape="1">
+                <a:gsLst>
+                  <a:gs pos="0">
+                    <a:schemeClr val="accent1">
+                      <a:lumMod val="67000"/>
+                    </a:schemeClr>
+                  </a:gs>
+                  <a:gs pos="48000">
+                    <a:schemeClr val="accent1">
+                      <a:lumMod val="97000"/>
+                      <a:lumOff val="3000"/>
+                    </a:schemeClr>
+                  </a:gs>
+                  <a:gs pos="100000">
+                    <a:schemeClr val="accent1">
+                      <a:lumMod val="60000"/>
+                      <a:lumOff val="40000"/>
+                    </a:schemeClr>
+                  </a:gs>
+                </a:gsLst>
+                <a:lin ang="16200000" scaled="1"/>
+                <a:tileRect/>
+              </a:gradFill>
+            </p:spPr>
+            <p:style>
+              <a:lnRef idx="2">
+                <a:schemeClr val="accent1">
+                  <a:shade val="50000"/>
+                </a:schemeClr>
+              </a:lnRef>
+              <a:fillRef idx="1">
+                <a:schemeClr val="accent1"/>
+              </a:fillRef>
+              <a:effectRef idx="0">
+                <a:schemeClr val="accent1"/>
+              </a:effectRef>
+              <a:fontRef idx="minor">
+                <a:schemeClr val="lt1"/>
+              </a:fontRef>
+            </p:style>
+            <p:txBody>
+              <a:bodyPr rtlCol="0" anchor="ctr"/>
+              <a:lstStyle/>
+              <a:p>
+                <a:pPr algn="ctr"/>
+                <a:r>
+                  <a:rPr lang="de-DE" sz="5400" dirty="0">
+                    <a:solidFill>
+                      <a:schemeClr val="tx2"/>
+                    </a:solidFill>
+                  </a:rPr>
+                  <a:t>*</a:t>
+                </a:r>
+                <a:endParaRPr lang="de-DE" sz="1400" dirty="0" smtClean="0">
+                  <a:solidFill>
+                    <a:schemeClr val="tx2"/>
+                  </a:solidFill>
+                </a:endParaRPr>
+              </a:p>
+            </p:txBody>
+          </p:sp>
+          <p:cxnSp>
+            <p:nvCxnSpPr>
+              <p:cNvPr id="47" name="Gewinkelte Verbindung 46"/>
+              <p:cNvCxnSpPr>
+                <a:stCxn id="35" idx="3"/>
+                <a:endCxn id="45" idx="1"/>
+              </p:cNvCxnSpPr>
+              <p:nvPr/>
+            </p:nvCxnSpPr>
+            <p:spPr>
+              <a:xfrm flipV="1">
+                <a:off x="6497185" y="5023192"/>
+                <a:ext cx="1570303" cy="1314563"/>
+              </a:xfrm>
+              <a:prstGeom prst="bentConnector3">
+                <a:avLst/>
+              </a:prstGeom>
+              <a:ln>
+                <a:tailEnd type="triangle"/>
+              </a:ln>
+            </p:spPr>
+            <p:style>
+              <a:lnRef idx="1">
+                <a:schemeClr val="accent1"/>
+              </a:lnRef>
+              <a:fillRef idx="0">
+                <a:schemeClr val="accent1"/>
+              </a:fillRef>
+              <a:effectRef idx="0">
+                <a:schemeClr val="accent1"/>
+              </a:effectRef>
+              <a:fontRef idx="minor">
+                <a:schemeClr val="tx1"/>
+              </a:fontRef>
+            </p:style>
+          </p:cxnSp>
+          <p:cxnSp>
+            <p:nvCxnSpPr>
+              <p:cNvPr id="49" name="Gewinkelte Verbindung 48"/>
+              <p:cNvCxnSpPr>
+                <a:stCxn id="9" idx="3"/>
+                <a:endCxn id="45" idx="1"/>
+              </p:cNvCxnSpPr>
+              <p:nvPr/>
+            </p:nvCxnSpPr>
+            <p:spPr>
+              <a:xfrm>
+                <a:off x="6497185" y="4310979"/>
+                <a:ext cx="1570303" cy="712213"/>
+              </a:xfrm>
+              <a:prstGeom prst="bentConnector3">
+                <a:avLst/>
+              </a:prstGeom>
+              <a:ln>
+                <a:tailEnd type="triangle"/>
+              </a:ln>
+            </p:spPr>
+            <p:style>
+              <a:lnRef idx="1">
+                <a:schemeClr val="accent1"/>
+              </a:lnRef>
+              <a:fillRef idx="0">
+                <a:schemeClr val="accent1"/>
+              </a:fillRef>
+              <a:effectRef idx="0">
+                <a:schemeClr val="accent1"/>
+              </a:effectRef>
+              <a:fontRef idx="minor">
+                <a:schemeClr val="tx1"/>
+              </a:fontRef>
+            </p:style>
+          </p:cxnSp>
+          <p:sp>
+            <p:nvSpPr>
+              <p:cNvPr id="54" name="Textfeld 53"/>
+              <p:cNvSpPr txBox="1"/>
+              <p:nvPr/>
+            </p:nvSpPr>
+            <p:spPr>
+              <a:xfrm>
+                <a:off x="9613663" y="4823136"/>
+                <a:ext cx="752129" cy="400110"/>
+              </a:xfrm>
+              <a:prstGeom prst="rect">
+                <a:avLst/>
+              </a:prstGeom>
+              <a:noFill/>
+            </p:spPr>
+            <p:txBody>
+              <a:bodyPr wrap="none" rtlCol="0">
+                <a:spAutoFit/>
+              </a:bodyPr>
+              <a:lstStyle/>
+              <a:p>
+                <a:r>
+                  <a:rPr lang="de-DE" sz="2000" dirty="0" smtClean="0"/>
+                  <a:t>score</a:t>
+                </a:r>
+              </a:p>
+            </p:txBody>
+          </p:sp>
+          <p:cxnSp>
+            <p:nvCxnSpPr>
+              <p:cNvPr id="57" name="Gerade Verbindung mit Pfeil 56"/>
+              <p:cNvCxnSpPr>
+                <a:stCxn id="45" idx="3"/>
+                <a:endCxn id="54" idx="1"/>
+              </p:cNvCxnSpPr>
+              <p:nvPr/>
+            </p:nvCxnSpPr>
+            <p:spPr>
+              <a:xfrm flipV="1">
+                <a:off x="8766293" y="5023191"/>
+                <a:ext cx="847370" cy="1"/>
+              </a:xfrm>
+              <a:prstGeom prst="straightConnector1">
+                <a:avLst/>
+              </a:prstGeom>
+              <a:ln>
+                <a:tailEnd type="triangle"/>
+              </a:ln>
+            </p:spPr>
+            <p:style>
+              <a:lnRef idx="1">
+                <a:schemeClr val="accent1"/>
+              </a:lnRef>
+              <a:fillRef idx="0">
+                <a:schemeClr val="accent1"/>
+              </a:fillRef>
+              <a:effectRef idx="0">
+                <a:schemeClr val="accent1"/>
+              </a:effectRef>
+              <a:fontRef idx="minor">
+                <a:schemeClr val="tx1"/>
+              </a:fontRef>
+            </p:style>
+          </p:cxnSp>
+        </p:grpSp>
+        <p:sp>
+          <p:nvSpPr>
+            <p:cNvPr id="59" name="Textfeld 58"/>
+            <p:cNvSpPr txBox="1"/>
+            <p:nvPr/>
+          </p:nvSpPr>
+          <p:spPr>
+            <a:xfrm>
+              <a:off x="757457" y="4543629"/>
+              <a:ext cx="639919" cy="400110"/>
+            </a:xfrm>
+            <a:prstGeom prst="rect">
+              <a:avLst/>
+            </a:prstGeom>
+            <a:noFill/>
+          </p:spPr>
+          <p:txBody>
+            <a:bodyPr wrap="none" rtlCol="0">
+              <a:spAutoFit/>
+            </a:bodyPr>
+            <a:lstStyle/>
+            <a:p>
+              <a:r>
+                <a:rPr lang="de-DE" sz="2000"/>
+                <a:t>p</a:t>
+              </a:r>
+              <a:r>
+                <a:rPr lang="de-DE" sz="2000" smtClean="0"/>
+                <a:t>lan</a:t>
+              </a:r>
+            </a:p>
+          </p:txBody>
+        </p:sp>
+        <p:cxnSp>
+          <p:nvCxnSpPr>
+            <p:cNvPr id="63" name="Gewinkelte Verbindung 62"/>
+            <p:cNvCxnSpPr>
+              <a:stCxn id="59" idx="3"/>
+              <a:endCxn id="5" idx="1"/>
+            </p:cNvCxnSpPr>
+            <p:nvPr/>
+          </p:nvCxnSpPr>
+          <p:spPr>
+            <a:xfrm flipV="1">
+              <a:off x="1397376" y="3284615"/>
+              <a:ext cx="1203413" cy="1459069"/>
+            </a:xfrm>
+            <a:prstGeom prst="bentConnector3">
+              <a:avLst/>
+            </a:prstGeom>
+            <a:ln>
+              <a:tailEnd type="triangle"/>
+            </a:ln>
+          </p:spPr>
+          <p:style>
+            <a:lnRef idx="1">
+              <a:schemeClr val="accent1"/>
+            </a:lnRef>
+            <a:fillRef idx="0">
+              <a:schemeClr val="accent1"/>
+            </a:fillRef>
+            <a:effectRef idx="0">
+              <a:schemeClr val="accent1"/>
+            </a:effectRef>
+            <a:fontRef idx="minor">
+              <a:schemeClr val="tx1"/>
+            </a:fontRef>
+          </p:style>
+        </p:cxnSp>
+        <p:cxnSp>
+          <p:nvCxnSpPr>
+            <p:cNvPr id="64" name="Gewinkelte Verbindung 63"/>
+            <p:cNvCxnSpPr>
+              <a:stCxn id="59" idx="3"/>
+              <a:endCxn id="6" idx="1"/>
+            </p:cNvCxnSpPr>
+            <p:nvPr/>
+          </p:nvCxnSpPr>
+          <p:spPr>
+            <a:xfrm flipV="1">
+              <a:off x="1397376" y="3937288"/>
+              <a:ext cx="1203413" cy="806396"/>
+            </a:xfrm>
+            <a:prstGeom prst="bentConnector3">
+              <a:avLst/>
+            </a:prstGeom>
+            <a:ln>
+              <a:tailEnd type="triangle"/>
+            </a:ln>
+          </p:spPr>
+          <p:style>
+            <a:lnRef idx="1">
+              <a:schemeClr val="accent1"/>
+            </a:lnRef>
+            <a:fillRef idx="0">
+              <a:schemeClr val="accent1"/>
+            </a:fillRef>
+            <a:effectRef idx="0">
+              <a:schemeClr val="accent1"/>
+            </a:effectRef>
+            <a:fontRef idx="minor">
+              <a:schemeClr val="tx1"/>
+            </a:fontRef>
+          </p:style>
+        </p:cxnSp>
+        <p:cxnSp>
+          <p:nvCxnSpPr>
+            <p:cNvPr id="67" name="Gewinkelte Verbindung 66"/>
+            <p:cNvCxnSpPr>
+              <a:stCxn id="59" idx="3"/>
+              <a:endCxn id="7" idx="1"/>
+            </p:cNvCxnSpPr>
+            <p:nvPr/>
+          </p:nvCxnSpPr>
+          <p:spPr>
+            <a:xfrm flipV="1">
+              <a:off x="1397376" y="4589962"/>
+              <a:ext cx="1203412" cy="153722"/>
+            </a:xfrm>
+            <a:prstGeom prst="bentConnector3">
+              <a:avLst/>
+            </a:prstGeom>
+            <a:ln>
+              <a:tailEnd type="triangle"/>
+            </a:ln>
+          </p:spPr>
+          <p:style>
+            <a:lnRef idx="1">
+              <a:schemeClr val="accent1"/>
+            </a:lnRef>
+            <a:fillRef idx="0">
+              <a:schemeClr val="accent1"/>
+            </a:fillRef>
+            <a:effectRef idx="0">
+              <a:schemeClr val="accent1"/>
+            </a:effectRef>
+            <a:fontRef idx="minor">
+              <a:schemeClr val="tx1"/>
+            </a:fontRef>
+          </p:style>
+        </p:cxnSp>
+        <p:cxnSp>
+          <p:nvCxnSpPr>
+            <p:cNvPr id="70" name="Gewinkelte Verbindung 69"/>
+            <p:cNvCxnSpPr>
+              <a:stCxn id="59" idx="3"/>
+              <a:endCxn id="4" idx="1"/>
+            </p:cNvCxnSpPr>
+            <p:nvPr/>
+          </p:nvCxnSpPr>
+          <p:spPr>
+            <a:xfrm>
+              <a:off x="1397376" y="4743684"/>
+              <a:ext cx="1203411" cy="498951"/>
+            </a:xfrm>
+            <a:prstGeom prst="bentConnector3">
+              <a:avLst/>
+            </a:prstGeom>
+            <a:ln>
+              <a:tailEnd type="triangle"/>
+            </a:ln>
+          </p:spPr>
+          <p:style>
+            <a:lnRef idx="1">
+              <a:schemeClr val="accent1"/>
+            </a:lnRef>
+            <a:fillRef idx="0">
+              <a:schemeClr val="accent1"/>
+            </a:fillRef>
+            <a:effectRef idx="0">
+              <a:schemeClr val="accent1"/>
+            </a:effectRef>
+            <a:fontRef idx="minor">
+              <a:schemeClr val="tx1"/>
+            </a:fontRef>
+          </p:style>
+        </p:cxnSp>
+        <p:cxnSp>
+          <p:nvCxnSpPr>
+            <p:cNvPr id="73" name="Gewinkelte Verbindung 72"/>
+            <p:cNvCxnSpPr>
+              <a:stCxn id="59" idx="3"/>
+              <a:endCxn id="8" idx="1"/>
+            </p:cNvCxnSpPr>
+            <p:nvPr/>
+          </p:nvCxnSpPr>
+          <p:spPr>
+            <a:xfrm>
+              <a:off x="1397376" y="4743684"/>
+              <a:ext cx="1203411" cy="1411245"/>
+            </a:xfrm>
+            <a:prstGeom prst="bentConnector3">
+              <a:avLst/>
+            </a:prstGeom>
+            <a:ln>
+              <a:tailEnd type="triangle"/>
+            </a:ln>
+          </p:spPr>
+          <p:style>
+            <a:lnRef idx="1">
+              <a:schemeClr val="accent1"/>
+            </a:lnRef>
+            <a:fillRef idx="0">
+              <a:schemeClr val="accent1"/>
+            </a:fillRef>
+            <a:effectRef idx="0">
+              <a:schemeClr val="accent1"/>
+            </a:effectRef>
+            <a:fontRef idx="minor">
+              <a:schemeClr val="tx1"/>
+            </a:fontRef>
+          </p:style>
+        </p:cxnSp>
+      </p:grpSp>
     </p:spTree>
     <p:extLst>
       <p:ext uri="{BB962C8B-B14F-4D97-AF65-F5344CB8AC3E}">

</xml_diff>

<commit_message>
Revolutionary update to presentation
</commit_message>
<xml_diff>
--- a/Abschlusspräsentation/Praesentation_newdesign.pptx
+++ b/Abschlusspräsentation/Praesentation_newdesign.pptx
@@ -5,7 +5,7 @@
     <p:sldMasterId id="2147483648" r:id="rId1"/>
   </p:sldMasterIdLst>
   <p:notesMasterIdLst>
-    <p:notesMasterId r:id="rId10"/>
+    <p:notesMasterId r:id="rId13"/>
   </p:notesMasterIdLst>
   <p:sldIdLst>
     <p:sldId id="256" r:id="rId2"/>
@@ -16,6 +16,9 @@
     <p:sldId id="261" r:id="rId7"/>
     <p:sldId id="262" r:id="rId8"/>
     <p:sldId id="263" r:id="rId9"/>
+    <p:sldId id="264" r:id="rId10"/>
+    <p:sldId id="265" r:id="rId11"/>
+    <p:sldId id="266" r:id="rId12"/>
   </p:sldIdLst>
   <p:sldSz cx="12192000" cy="6858000"/>
   <p:notesSz cx="6858000" cy="9144000"/>
@@ -218,7 +221,7 @@
           <a:p>
             <a:fld id="{74D74940-F9E6-439C-A55C-AF525C59EADC}" type="datetimeFigureOut">
               <a:rPr lang="de-DE" smtClean="0"/>
-              <a:t>18.03.17</a:t>
+              <a:t>19.03.2017</a:t>
             </a:fld>
             <a:endParaRPr lang="de-DE"/>
           </a:p>
@@ -1023,6 +1026,87 @@
           <a:bodyPr/>
           <a:lstStyle/>
           <a:p>
+            <a:pPr marL="171450" lvl="0" indent="-171450">
+              <a:buFont typeface="Arial" panose="020B0604020202020204" pitchFamily="34" charset="0"/>
+              <a:buChar char="•"/>
+            </a:pPr>
+            <a:r>
+              <a:rPr lang="de-DE" baseline="0" dirty="0"/>
+              <a:t>REST:</a:t>
+            </a:r>
+          </a:p>
+          <a:p>
+            <a:pPr marL="628650" lvl="1" indent="-171450">
+              <a:buFont typeface="Arial" panose="020B0604020202020204" pitchFamily="34" charset="0"/>
+              <a:buChar char="•"/>
+            </a:pPr>
+            <a:r>
+              <a:rPr lang="de-DE" baseline="0" dirty="0"/>
+              <a:t>Wichtige Entscheidung: Mehr als nur die entwickelte </a:t>
+            </a:r>
+            <a:r>
+              <a:rPr lang="de-DE" baseline="0" dirty="0" err="1"/>
+              <a:t>WebApp</a:t>
+            </a:r>
+            <a:r>
+              <a:rPr lang="de-DE" baseline="0" dirty="0"/>
+              <a:t> (=&gt; Plattform)</a:t>
+            </a:r>
+          </a:p>
+          <a:p>
+            <a:pPr marL="628650" lvl="1" indent="-171450">
+              <a:buFont typeface="Arial" panose="020B0604020202020204" pitchFamily="34" charset="0"/>
+              <a:buChar char="•"/>
+            </a:pPr>
+            <a:r>
+              <a:rPr lang="de-DE" baseline="0" dirty="0"/>
+              <a:t>Ohne Bearbeitung: Neue Benutzeroberfläche</a:t>
+            </a:r>
+          </a:p>
+          <a:p>
+            <a:pPr marL="1085850" lvl="2" indent="-171450">
+              <a:buFont typeface="Arial" panose="020B0604020202020204" pitchFamily="34" charset="0"/>
+              <a:buChar char="•"/>
+            </a:pPr>
+            <a:r>
+              <a:rPr lang="de-DE" baseline="0" dirty="0"/>
+              <a:t>z.B. App</a:t>
+            </a:r>
+          </a:p>
+          <a:p>
+            <a:pPr marL="628650" lvl="1" indent="-171450">
+              <a:buFont typeface="Arial" panose="020B0604020202020204" pitchFamily="34" charset="0"/>
+              <a:buChar char="•"/>
+            </a:pPr>
+            <a:r>
+              <a:rPr lang="de-DE" baseline="0" dirty="0"/>
+              <a:t>Eigene </a:t>
+            </a:r>
+            <a:r>
+              <a:rPr lang="de-DE" baseline="0" dirty="0" err="1"/>
+              <a:t>OAuth</a:t>
+            </a:r>
+            <a:r>
+              <a:rPr lang="de-DE" baseline="0" dirty="0"/>
+              <a:t> Implementierung</a:t>
+            </a:r>
+          </a:p>
+          <a:p>
+            <a:pPr marL="628650" lvl="1" indent="-171450">
+              <a:buFont typeface="Arial" panose="020B0604020202020204" pitchFamily="34" charset="0"/>
+              <a:buChar char="•"/>
+            </a:pPr>
+            <a:r>
+              <a:rPr lang="de-DE" baseline="0" dirty="0"/>
+              <a:t>REST-Schnittstelle </a:t>
+            </a:r>
+            <a:r>
+              <a:rPr lang="de-DE" b="1" baseline="0" dirty="0"/>
+              <a:t>gegen Anwendungsfälle getestet</a:t>
+            </a:r>
+            <a:endParaRPr lang="de-DE" b="0" baseline="0" dirty="0"/>
+          </a:p>
+          <a:p>
             <a:pPr marL="171450" indent="-171450">
               <a:buFont typeface="Arial" panose="020B0604020202020204" pitchFamily="34" charset="0"/>
               <a:buChar char="•"/>
@@ -1097,69 +1181,6 @@
               <a:rPr lang="de-DE" baseline="0" dirty="0"/>
               <a:t> (Templates)</a:t>
             </a:r>
-          </a:p>
-          <a:p>
-            <a:pPr marL="171450" lvl="0" indent="-171450">
-              <a:buFont typeface="Arial" panose="020B0604020202020204" pitchFamily="34" charset="0"/>
-              <a:buChar char="•"/>
-            </a:pPr>
-            <a:r>
-              <a:rPr lang="de-DE" baseline="0" dirty="0"/>
-              <a:t>REST:</a:t>
-            </a:r>
-          </a:p>
-          <a:p>
-            <a:pPr marL="628650" lvl="1" indent="-171450">
-              <a:buFont typeface="Arial" panose="020B0604020202020204" pitchFamily="34" charset="0"/>
-              <a:buChar char="•"/>
-            </a:pPr>
-            <a:r>
-              <a:rPr lang="de-DE" baseline="0" dirty="0"/>
-              <a:t>Ohne Bearbeitung: Neue Benutzeroberfläche</a:t>
-            </a:r>
-          </a:p>
-          <a:p>
-            <a:pPr marL="1085850" lvl="2" indent="-171450">
-              <a:buFont typeface="Arial" panose="020B0604020202020204" pitchFamily="34" charset="0"/>
-              <a:buChar char="•"/>
-            </a:pPr>
-            <a:r>
-              <a:rPr lang="de-DE" baseline="0" dirty="0"/>
-              <a:t>z.B. App</a:t>
-            </a:r>
-          </a:p>
-          <a:p>
-            <a:pPr marL="628650" lvl="1" indent="-171450">
-              <a:buFont typeface="Arial" panose="020B0604020202020204" pitchFamily="34" charset="0"/>
-              <a:buChar char="•"/>
-            </a:pPr>
-            <a:r>
-              <a:rPr lang="de-DE" baseline="0" dirty="0"/>
-              <a:t>Eigene </a:t>
-            </a:r>
-            <a:r>
-              <a:rPr lang="de-DE" baseline="0" dirty="0" err="1"/>
-              <a:t>OAuth</a:t>
-            </a:r>
-            <a:r>
-              <a:rPr lang="de-DE" baseline="0" dirty="0"/>
-              <a:t> Implementierung</a:t>
-            </a:r>
-          </a:p>
-          <a:p>
-            <a:pPr marL="628650" lvl="1" indent="-171450">
-              <a:buFont typeface="Arial" panose="020B0604020202020204" pitchFamily="34" charset="0"/>
-              <a:buChar char="•"/>
-            </a:pPr>
-            <a:r>
-              <a:rPr lang="de-DE" baseline="0" dirty="0"/>
-              <a:t>REST-Schnittstelle </a:t>
-            </a:r>
-            <a:r>
-              <a:rPr lang="de-DE" b="1" baseline="0" dirty="0"/>
-              <a:t>gegen Anwendungsfälle getestet</a:t>
-            </a:r>
-            <a:endParaRPr lang="de-DE" b="0" baseline="0" dirty="0"/>
           </a:p>
           <a:p>
             <a:pPr marL="171450" lvl="0" indent="-171450">
@@ -1433,6 +1454,308 @@
     <p:extLst>
       <p:ext uri="{BB962C8B-B14F-4D97-AF65-F5344CB8AC3E}">
         <p14:creationId xmlns:p14="http://schemas.microsoft.com/office/powerpoint/2010/main" val="2063133213"/>
+      </p:ext>
+    </p:extLst>
+  </p:cSld>
+  <p:clrMapOvr>
+    <a:masterClrMapping/>
+  </p:clrMapOvr>
+</p:notes>
+</file>
+
+<file path=ppt/notesSlides/notesSlide6.xml><?xml version="1.0" encoding="utf-8"?>
+<p:notes xmlns:a="http://schemas.openxmlformats.org/drawingml/2006/main" xmlns:r="http://schemas.openxmlformats.org/officeDocument/2006/relationships" xmlns:p="http://schemas.openxmlformats.org/presentationml/2006/main">
+  <p:cSld>
+    <p:spTree>
+      <p:nvGrpSpPr>
+        <p:cNvPr id="1" name=""/>
+        <p:cNvGrpSpPr/>
+        <p:nvPr/>
+      </p:nvGrpSpPr>
+      <p:grpSpPr>
+        <a:xfrm>
+          <a:off x="0" y="0"/>
+          <a:ext cx="0" cy="0"/>
+          <a:chOff x="0" y="0"/>
+          <a:chExt cx="0" cy="0"/>
+        </a:xfrm>
+      </p:grpSpPr>
+      <p:sp>
+        <p:nvSpPr>
+          <p:cNvPr id="2" name="Folienbildplatzhalter 1"/>
+          <p:cNvSpPr>
+            <a:spLocks noGrp="1" noRot="1" noChangeAspect="1"/>
+          </p:cNvSpPr>
+          <p:nvPr>
+            <p:ph type="sldImg"/>
+          </p:nvPr>
+        </p:nvSpPr>
+        <p:spPr/>
+      </p:sp>
+      <p:sp>
+        <p:nvSpPr>
+          <p:cNvPr id="3" name="Notizenplatzhalter 2"/>
+          <p:cNvSpPr>
+            <a:spLocks noGrp="1"/>
+          </p:cNvSpPr>
+          <p:nvPr>
+            <p:ph type="body" idx="1"/>
+          </p:nvPr>
+        </p:nvSpPr>
+        <p:spPr/>
+        <p:txBody>
+          <a:bodyPr/>
+          <a:lstStyle/>
+          <a:p>
+            <a:pPr marL="171450" indent="-171450">
+              <a:buFont typeface="Arial" panose="020B0604020202020204" pitchFamily="34" charset="0"/>
+              <a:buChar char="•"/>
+            </a:pPr>
+            <a:r>
+              <a:rPr lang="de-DE" dirty="0"/>
+              <a:t>Evolutionärer Algorithmus</a:t>
+            </a:r>
+          </a:p>
+          <a:p>
+            <a:pPr marL="628650" lvl="1" indent="-171450">
+              <a:buFont typeface="Arial" panose="020B0604020202020204" pitchFamily="34" charset="0"/>
+              <a:buChar char="•"/>
+            </a:pPr>
+            <a:r>
+              <a:rPr lang="de-DE" dirty="0"/>
+              <a:t>Mehrfache Generierung von „Plan-Familien“</a:t>
+            </a:r>
+          </a:p>
+          <a:p>
+            <a:pPr marL="1085850" lvl="2" indent="-171450">
+              <a:buFont typeface="Arial" panose="020B0604020202020204" pitchFamily="34" charset="0"/>
+              <a:buChar char="•"/>
+            </a:pPr>
+            <a:r>
+              <a:rPr lang="de-DE" dirty="0"/>
+              <a:t>10</a:t>
+            </a:r>
+            <a:r>
+              <a:rPr lang="de-DE" baseline="0" dirty="0"/>
+              <a:t> Pläne/Familie</a:t>
+            </a:r>
+          </a:p>
+          <a:p>
+            <a:pPr marL="1085850" lvl="2" indent="-171450">
+              <a:buFont typeface="Arial" panose="020B0604020202020204" pitchFamily="34" charset="0"/>
+              <a:buChar char="•"/>
+            </a:pPr>
+            <a:r>
+              <a:rPr lang="de-DE" baseline="0" dirty="0"/>
+              <a:t>5 Familien</a:t>
+            </a:r>
+          </a:p>
+          <a:p>
+            <a:pPr marL="1085850" lvl="2" indent="-171450">
+              <a:buFont typeface="Arial" panose="020B0604020202020204" pitchFamily="34" charset="0"/>
+              <a:buChar char="•"/>
+            </a:pPr>
+            <a:r>
+              <a:rPr lang="de-DE" baseline="0" dirty="0"/>
+              <a:t>Immer auf Basis der vorherigen Familie</a:t>
+            </a:r>
+          </a:p>
+          <a:p>
+            <a:pPr marL="171450" lvl="0" indent="-171450">
+              <a:buFont typeface="Arial" panose="020B0604020202020204" pitchFamily="34" charset="0"/>
+              <a:buChar char="•"/>
+            </a:pPr>
+            <a:r>
+              <a:rPr lang="de-DE" baseline="0" dirty="0"/>
+              <a:t>Dauer der Implementierung des Algorithmus (ca. 6-7 Wochen)</a:t>
+            </a:r>
+          </a:p>
+          <a:p>
+            <a:pPr marL="628650" lvl="1" indent="-171450">
+              <a:buFont typeface="Arial" panose="020B0604020202020204" pitchFamily="34" charset="0"/>
+              <a:buChar char="•"/>
+            </a:pPr>
+            <a:r>
+              <a:rPr lang="de-DE" baseline="0" dirty="0"/>
+              <a:t>Erste Code Zeile bis erster verifizierter Plan</a:t>
+            </a:r>
+            <a:endParaRPr lang="de-DE" dirty="0"/>
+          </a:p>
+        </p:txBody>
+      </p:sp>
+      <p:sp>
+        <p:nvSpPr>
+          <p:cNvPr id="4" name="Foliennummernplatzhalter 3"/>
+          <p:cNvSpPr>
+            <a:spLocks noGrp="1"/>
+          </p:cNvSpPr>
+          <p:nvPr>
+            <p:ph type="sldNum" sz="quarter" idx="10"/>
+          </p:nvPr>
+        </p:nvSpPr>
+        <p:spPr/>
+        <p:txBody>
+          <a:bodyPr/>
+          <a:lstStyle/>
+          <a:p>
+            <a:fld id="{10623EF1-A4FE-4F69-895D-EDE1FA958D12}" type="slidenum">
+              <a:rPr lang="de-DE" smtClean="0"/>
+              <a:t>8</a:t>
+            </a:fld>
+            <a:endParaRPr lang="de-DE"/>
+          </a:p>
+        </p:txBody>
+      </p:sp>
+    </p:spTree>
+    <p:extLst>
+      <p:ext uri="{BB962C8B-B14F-4D97-AF65-F5344CB8AC3E}">
+        <p14:creationId xmlns:p14="http://schemas.microsoft.com/office/powerpoint/2010/main" val="2108860238"/>
+      </p:ext>
+    </p:extLst>
+  </p:cSld>
+  <p:clrMapOvr>
+    <a:masterClrMapping/>
+  </p:clrMapOvr>
+</p:notes>
+</file>
+
+<file path=ppt/notesSlides/notesSlide7.xml><?xml version="1.0" encoding="utf-8"?>
+<p:notes xmlns:a="http://schemas.openxmlformats.org/drawingml/2006/main" xmlns:r="http://schemas.openxmlformats.org/officeDocument/2006/relationships" xmlns:p="http://schemas.openxmlformats.org/presentationml/2006/main">
+  <p:cSld>
+    <p:spTree>
+      <p:nvGrpSpPr>
+        <p:cNvPr id="1" name=""/>
+        <p:cNvGrpSpPr/>
+        <p:nvPr/>
+      </p:nvGrpSpPr>
+      <p:grpSpPr>
+        <a:xfrm>
+          <a:off x="0" y="0"/>
+          <a:ext cx="0" cy="0"/>
+          <a:chOff x="0" y="0"/>
+          <a:chExt cx="0" cy="0"/>
+        </a:xfrm>
+      </p:grpSpPr>
+      <p:sp>
+        <p:nvSpPr>
+          <p:cNvPr id="2" name="Folienbildplatzhalter 1"/>
+          <p:cNvSpPr>
+            <a:spLocks noGrp="1" noRot="1" noChangeAspect="1"/>
+          </p:cNvSpPr>
+          <p:nvPr>
+            <p:ph type="sldImg"/>
+          </p:nvPr>
+        </p:nvSpPr>
+        <p:spPr/>
+      </p:sp>
+      <p:sp>
+        <p:nvSpPr>
+          <p:cNvPr id="3" name="Notizenplatzhalter 2"/>
+          <p:cNvSpPr>
+            <a:spLocks noGrp="1"/>
+          </p:cNvSpPr>
+          <p:nvPr>
+            <p:ph type="body" idx="1"/>
+          </p:nvPr>
+        </p:nvSpPr>
+        <p:spPr/>
+        <p:txBody>
+          <a:bodyPr/>
+          <a:lstStyle/>
+          <a:p>
+            <a:pPr marL="171450" indent="-171450">
+              <a:buFont typeface="Arial" panose="020B0604020202020204" pitchFamily="34" charset="0"/>
+              <a:buChar char="•"/>
+            </a:pPr>
+            <a:r>
+              <a:rPr lang="de-DE" dirty="0"/>
+              <a:t>„Wasserfall mit Rückkopplung“ hat für uns funktioniert</a:t>
+            </a:r>
+          </a:p>
+          <a:p>
+            <a:pPr marL="628650" lvl="1" indent="-171450">
+              <a:buFont typeface="Arial" panose="020B0604020202020204" pitchFamily="34" charset="0"/>
+              <a:buChar char="•"/>
+            </a:pPr>
+            <a:r>
+              <a:rPr lang="de-DE" dirty="0"/>
+              <a:t>Pflichtenheft: Gute</a:t>
+            </a:r>
+            <a:r>
+              <a:rPr lang="de-DE" baseline="0" dirty="0"/>
+              <a:t> Grundlage =&gt; „Alle sprechen die selbe Sprache“</a:t>
+            </a:r>
+          </a:p>
+          <a:p>
+            <a:pPr marL="628650" lvl="1" indent="-171450">
+              <a:buFont typeface="Arial" panose="020B0604020202020204" pitchFamily="34" charset="0"/>
+              <a:buChar char="•"/>
+            </a:pPr>
+            <a:r>
+              <a:rPr lang="de-DE" baseline="0" dirty="0"/>
+              <a:t>Entwurf: Erfolgreich</a:t>
+            </a:r>
+          </a:p>
+          <a:p>
+            <a:pPr marL="628650" lvl="1" indent="-171450">
+              <a:buFont typeface="Arial" panose="020B0604020202020204" pitchFamily="34" charset="0"/>
+              <a:buChar char="•"/>
+            </a:pPr>
+            <a:r>
+              <a:rPr lang="de-DE" baseline="0" dirty="0"/>
+              <a:t>Wenig Änderungen in Implementierung notwendig</a:t>
+            </a:r>
+          </a:p>
+          <a:p>
+            <a:pPr marL="628650" lvl="1" indent="-171450">
+              <a:buFont typeface="Arial" panose="020B0604020202020204" pitchFamily="34" charset="0"/>
+              <a:buChar char="•"/>
+            </a:pPr>
+            <a:r>
+              <a:rPr lang="de-DE" baseline="0" dirty="0"/>
+              <a:t>„Perfektionierung“ während Qualitätssicherung</a:t>
+            </a:r>
+          </a:p>
+          <a:p>
+            <a:pPr marL="171450" lvl="0" indent="-171450">
+              <a:buFont typeface="Arial" panose="020B0604020202020204" pitchFamily="34" charset="0"/>
+              <a:buChar char="•"/>
+            </a:pPr>
+            <a:r>
+              <a:rPr lang="de-DE" baseline="0" dirty="0"/>
+              <a:t>Insgesamt: Sehr erfolgreiches Projekt mit zufriedenstellendem Ergebnis</a:t>
+            </a:r>
+            <a:endParaRPr lang="de-DE" dirty="0"/>
+          </a:p>
+        </p:txBody>
+      </p:sp>
+      <p:sp>
+        <p:nvSpPr>
+          <p:cNvPr id="4" name="Foliennummernplatzhalter 3"/>
+          <p:cNvSpPr>
+            <a:spLocks noGrp="1"/>
+          </p:cNvSpPr>
+          <p:nvPr>
+            <p:ph type="sldNum" sz="quarter" idx="10"/>
+          </p:nvPr>
+        </p:nvSpPr>
+        <p:spPr/>
+        <p:txBody>
+          <a:bodyPr/>
+          <a:lstStyle/>
+          <a:p>
+            <a:fld id="{10623EF1-A4FE-4F69-895D-EDE1FA958D12}" type="slidenum">
+              <a:rPr lang="de-DE" smtClean="0"/>
+              <a:t>11</a:t>
+            </a:fld>
+            <a:endParaRPr lang="de-DE"/>
+          </a:p>
+        </p:txBody>
+      </p:sp>
+    </p:spTree>
+    <p:extLst>
+      <p:ext uri="{BB962C8B-B14F-4D97-AF65-F5344CB8AC3E}">
+        <p14:creationId xmlns:p14="http://schemas.microsoft.com/office/powerpoint/2010/main" val="1164759449"/>
       </p:ext>
     </p:extLst>
   </p:cSld>
@@ -1716,7 +2039,7 @@
           <a:p>
             <a:fld id="{78ABE3C1-DBE1-495D-B57B-2849774B866A}" type="datetimeFigureOut">
               <a:rPr lang="en-US" dirty="0"/>
-              <a:t>3/18/17</a:t>
+              <a:t>3/19/2017</a:t>
             </a:fld>
             <a:endParaRPr lang="en-US" dirty="0"/>
           </a:p>
@@ -2125,7 +2448,7 @@
           <a:p>
             <a:fld id="{446C117F-5CCF-4837-BE5F-2B92066CAFAF}" type="datetimeFigureOut">
               <a:rPr lang="en-US" dirty="0"/>
-              <a:t>3/18/17</a:t>
+              <a:t>3/19/2017</a:t>
             </a:fld>
             <a:endParaRPr lang="en-US" dirty="0"/>
           </a:p>
@@ -2456,7 +2779,7 @@
           <a:p>
             <a:fld id="{84EB90BD-B6CE-46B7-997F-7313B992CCDC}" type="datetimeFigureOut">
               <a:rPr lang="en-US" dirty="0"/>
-              <a:t>3/18/17</a:t>
+              <a:t>3/19/2017</a:t>
             </a:fld>
             <a:endParaRPr lang="en-US" dirty="0"/>
           </a:p>
@@ -2856,7 +3179,7 @@
           <a:p>
             <a:fld id="{CDB9D11F-B188-461D-B23F-39381795C052}" type="datetimeFigureOut">
               <a:rPr lang="en-US" dirty="0"/>
-              <a:t>3/18/17</a:t>
+              <a:t>3/19/2017</a:t>
             </a:fld>
             <a:endParaRPr lang="en-US" dirty="0"/>
           </a:p>
@@ -3419,7 +3742,7 @@
           <a:p>
             <a:fld id="{52E6D8D9-55A2-4063-B0F3-121F44549695}" type="datetimeFigureOut">
               <a:rPr lang="en-US" dirty="0"/>
-              <a:t>3/18/17</a:t>
+              <a:t>3/19/2017</a:t>
             </a:fld>
             <a:endParaRPr lang="en-US" dirty="0"/>
           </a:p>
@@ -4095,7 +4418,7 @@
           <a:p>
             <a:fld id="{D4B24536-994D-4021-A283-9F449C0DB509}" type="datetimeFigureOut">
               <a:rPr lang="en-US" dirty="0"/>
-              <a:t>3/18/17</a:t>
+              <a:t>3/19/2017</a:t>
             </a:fld>
             <a:endParaRPr lang="en-US" dirty="0"/>
           </a:p>
@@ -5003,7 +5326,7 @@
           <a:p>
             <a:fld id="{3CBBBB78-C96F-47B7-AB17-D852CA960AC9}" type="datetimeFigureOut">
               <a:rPr lang="en-US" dirty="0"/>
-              <a:t>3/18/17</a:t>
+              <a:t>3/19/2017</a:t>
             </a:fld>
             <a:endParaRPr lang="en-US" dirty="0"/>
           </a:p>
@@ -5311,7 +5634,7 @@
           <a:p>
             <a:fld id="{1FA3F48C-C7C6-4055-9F49-3777875E72AE}" type="datetimeFigureOut">
               <a:rPr lang="en-US" dirty="0"/>
-              <a:t>3/18/17</a:t>
+              <a:t>3/19/2017</a:t>
             </a:fld>
             <a:endParaRPr lang="en-US" dirty="0"/>
           </a:p>
@@ -5570,7 +5893,7 @@
           <a:p>
             <a:fld id="{6178E61D-D431-422C-9764-11DAFE33AB63}" type="datetimeFigureOut">
               <a:rPr lang="en-US" dirty="0"/>
-              <a:t>3/18/17</a:t>
+              <a:t>3/19/2017</a:t>
             </a:fld>
             <a:endParaRPr lang="en-US" dirty="0"/>
           </a:p>
@@ -5889,7 +6212,7 @@
           <a:p>
             <a:fld id="{12DE42F4-6EEF-4EF7-8ED4-2208F0F89A08}" type="datetimeFigureOut">
               <a:rPr lang="en-US" dirty="0"/>
-              <a:t>3/18/17</a:t>
+              <a:t>3/19/2017</a:t>
             </a:fld>
             <a:endParaRPr lang="en-US" dirty="0"/>
           </a:p>
@@ -6273,7 +6596,7 @@
           <a:p>
             <a:fld id="{30578ACC-22D6-47C1-A373-4FD133E34F3C}" type="datetimeFigureOut">
               <a:rPr lang="en-US" dirty="0"/>
-              <a:t>3/18/17</a:t>
+              <a:t>3/19/2017</a:t>
             </a:fld>
             <a:endParaRPr lang="en-US" dirty="0"/>
           </a:p>
@@ -6644,7 +6967,7 @@
           <a:p>
             <a:fld id="{4E5A6C69-6797-4E8A-BF37-F2C3751466E9}" type="datetimeFigureOut">
               <a:rPr lang="en-US" dirty="0"/>
-              <a:t>3/18/17</a:t>
+              <a:t>3/19/2017</a:t>
             </a:fld>
             <a:endParaRPr lang="en-US" dirty="0"/>
           </a:p>
@@ -7145,7 +7468,7 @@
           <a:p>
             <a:fld id="{D82014A1-A632-4878-A0D3-F52BA7563730}" type="datetimeFigureOut">
               <a:rPr lang="en-US" dirty="0"/>
-              <a:t>3/18/17</a:t>
+              <a:t>3/19/2017</a:t>
             </a:fld>
             <a:endParaRPr lang="en-US" dirty="0"/>
           </a:p>
@@ -7397,7 +7720,7 @@
           <a:p>
             <a:fld id="{CE99F462-093F-4566-844B-4C71F2739DA5}" type="datetimeFigureOut">
               <a:rPr lang="en-US" dirty="0"/>
-              <a:t>3/18/17</a:t>
+              <a:t>3/19/2017</a:t>
             </a:fld>
             <a:endParaRPr lang="en-US" dirty="0"/>
           </a:p>
@@ -7555,7 +7878,7 @@
           <a:p>
             <a:fld id="{3D24A7AC-904D-4781-85BA-7D10C17ED021}" type="datetimeFigureOut">
               <a:rPr lang="en-US" dirty="0"/>
-              <a:t>3/18/17</a:t>
+              <a:t>3/19/2017</a:t>
             </a:fld>
             <a:endParaRPr lang="en-US" dirty="0"/>
           </a:p>
@@ -7940,7 +8263,7 @@
           <a:p>
             <a:fld id="{E331444B-B92B-4E27-8C94-BB93EAF5CB18}" type="datetimeFigureOut">
               <a:rPr lang="en-US" dirty="0"/>
-              <a:t>3/18/17</a:t>
+              <a:t>3/19/2017</a:t>
             </a:fld>
             <a:endParaRPr lang="en-US" dirty="0"/>
           </a:p>
@@ -8344,7 +8667,7 @@
           <a:p>
             <a:fld id="{363EFA5E-FA76-400D-B3DC-F0BA90E6D107}" type="datetimeFigureOut">
               <a:rPr lang="en-US" dirty="0"/>
-              <a:t>3/18/17</a:t>
+              <a:t>3/19/2017</a:t>
             </a:fld>
             <a:endParaRPr lang="en-US" dirty="0"/>
           </a:p>
@@ -8409,10 +8732,10 @@
           <a:gsLst>
             <a:gs pos="0">
               <a:schemeClr val="accent2">
-                <a:lumMod val="67000"/>
+                <a:lumMod val="77000"/>
               </a:schemeClr>
             </a:gs>
-            <a:gs pos="32000">
+            <a:gs pos="8000">
               <a:schemeClr val="accent2">
                 <a:lumMod val="97000"/>
                 <a:lumOff val="3000"/>
@@ -8425,7 +8748,7 @@
               </a:schemeClr>
             </a:gs>
           </a:gsLst>
-          <a:lin ang="16200000" scaled="1"/>
+          <a:lin ang="16200000" scaled="0"/>
           <a:tileRect/>
         </a:gradFill>
         <a:effectLst/>
@@ -8606,7 +8929,7 @@
           <a:p>
             <a:fld id="{9D6E9DEC-419B-4CC5-A080-3B06BD5A8291}" type="datetimeFigureOut">
               <a:rPr lang="en-US" dirty="0"/>
-              <a:t>3/18/17</a:t>
+              <a:t>3/19/2017</a:t>
             </a:fld>
             <a:endParaRPr lang="en-US" dirty="0"/>
           </a:p>
@@ -9000,34 +9323,6 @@
 <file path=ppt/slides/slide1.xml><?xml version="1.0" encoding="utf-8"?>
 <p:sld xmlns:a="http://schemas.openxmlformats.org/drawingml/2006/main" xmlns:r="http://schemas.openxmlformats.org/officeDocument/2006/relationships" xmlns:p="http://schemas.openxmlformats.org/presentationml/2006/main">
   <p:cSld>
-    <p:bg>
-      <p:bgPr>
-        <a:gradFill flip="none" rotWithShape="1">
-          <a:gsLst>
-            <a:gs pos="0">
-              <a:schemeClr val="accent2">
-                <a:lumMod val="77000"/>
-              </a:schemeClr>
-            </a:gs>
-            <a:gs pos="32000">
-              <a:schemeClr val="accent2">
-                <a:lumMod val="97000"/>
-                <a:lumOff val="3000"/>
-              </a:schemeClr>
-            </a:gs>
-            <a:gs pos="100000">
-              <a:schemeClr val="accent2">
-                <a:lumMod val="60000"/>
-                <a:lumOff val="40000"/>
-              </a:schemeClr>
-            </a:gs>
-          </a:gsLst>
-          <a:lin ang="16200000" scaled="1"/>
-          <a:tileRect/>
-        </a:gradFill>
-        <a:effectLst/>
-      </p:bgPr>
-    </p:bg>
     <p:spTree>
       <p:nvGrpSpPr>
         <p:cNvPr id="1" name=""/>
@@ -9175,13 +9470,187 @@
   <p:clrMapOvr>
     <a:masterClrMapping/>
   </p:clrMapOvr>
-  <p:timing>
-    <p:tnLst>
-      <p:par>
-        <p:cTn id="1" dur="indefinite" restart="never" nodeType="tmRoot"/>
-      </p:par>
-    </p:tnLst>
-  </p:timing>
+</p:sld>
+</file>
+
+<file path=ppt/slides/slide10.xml><?xml version="1.0" encoding="utf-8"?>
+<p:sld xmlns:a="http://schemas.openxmlformats.org/drawingml/2006/main" xmlns:r="http://schemas.openxmlformats.org/officeDocument/2006/relationships" xmlns:p="http://schemas.openxmlformats.org/presentationml/2006/main">
+  <p:cSld>
+    <p:spTree>
+      <p:nvGrpSpPr>
+        <p:cNvPr id="1" name=""/>
+        <p:cNvGrpSpPr/>
+        <p:nvPr/>
+      </p:nvGrpSpPr>
+      <p:grpSpPr>
+        <a:xfrm>
+          <a:off x="0" y="0"/>
+          <a:ext cx="0" cy="0"/>
+          <a:chOff x="0" y="0"/>
+          <a:chExt cx="0" cy="0"/>
+        </a:xfrm>
+      </p:grpSpPr>
+      <p:sp>
+        <p:nvSpPr>
+          <p:cNvPr id="2" name="Titel 1"/>
+          <p:cNvSpPr>
+            <a:spLocks noGrp="1"/>
+          </p:cNvSpPr>
+          <p:nvPr>
+            <p:ph type="title"/>
+          </p:nvPr>
+        </p:nvSpPr>
+        <p:spPr/>
+        <p:txBody>
+          <a:bodyPr/>
+          <a:lstStyle/>
+          <a:p>
+            <a:r>
+              <a:rPr lang="de-DE" dirty="0"/>
+              <a:t>Vorführung</a:t>
+            </a:r>
+          </a:p>
+        </p:txBody>
+      </p:sp>
+      <p:sp>
+        <p:nvSpPr>
+          <p:cNvPr id="3" name="Textplatzhalter 2"/>
+          <p:cNvSpPr>
+            <a:spLocks noGrp="1"/>
+          </p:cNvSpPr>
+          <p:nvPr>
+            <p:ph type="body" idx="1"/>
+          </p:nvPr>
+        </p:nvSpPr>
+        <p:spPr/>
+        <p:txBody>
+          <a:bodyPr/>
+          <a:lstStyle/>
+          <a:p>
+            <a:r>
+              <a:rPr lang="de-DE" dirty="0"/>
+              <a:t>Denn was helfen 220 Seiten Dokumentation,</a:t>
+            </a:r>
+            <a:br>
+              <a:rPr lang="de-DE" dirty="0"/>
+            </a:br>
+            <a:r>
+              <a:rPr lang="de-DE" dirty="0"/>
+              <a:t>wenn das Produkt nicht funktioniert?</a:t>
+            </a:r>
+          </a:p>
+        </p:txBody>
+      </p:sp>
+    </p:spTree>
+    <p:extLst>
+      <p:ext uri="{BB962C8B-B14F-4D97-AF65-F5344CB8AC3E}">
+        <p14:creationId xmlns:p14="http://schemas.microsoft.com/office/powerpoint/2010/main" val="3526958010"/>
+      </p:ext>
+    </p:extLst>
+  </p:cSld>
+  <p:clrMapOvr>
+    <a:masterClrMapping/>
+  </p:clrMapOvr>
+</p:sld>
+</file>
+
+<file path=ppt/slides/slide11.xml><?xml version="1.0" encoding="utf-8"?>
+<p:sld xmlns:a="http://schemas.openxmlformats.org/drawingml/2006/main" xmlns:r="http://schemas.openxmlformats.org/officeDocument/2006/relationships" xmlns:p="http://schemas.openxmlformats.org/presentationml/2006/main">
+  <p:cSld>
+    <p:spTree>
+      <p:nvGrpSpPr>
+        <p:cNvPr id="1" name=""/>
+        <p:cNvGrpSpPr/>
+        <p:nvPr/>
+      </p:nvGrpSpPr>
+      <p:grpSpPr>
+        <a:xfrm>
+          <a:off x="0" y="0"/>
+          <a:ext cx="0" cy="0"/>
+          <a:chOff x="0" y="0"/>
+          <a:chExt cx="0" cy="0"/>
+        </a:xfrm>
+      </p:grpSpPr>
+      <p:sp>
+        <p:nvSpPr>
+          <p:cNvPr id="2" name="Titel 1"/>
+          <p:cNvSpPr>
+            <a:spLocks noGrp="1"/>
+          </p:cNvSpPr>
+          <p:nvPr>
+            <p:ph type="title"/>
+          </p:nvPr>
+        </p:nvSpPr>
+        <p:spPr/>
+        <p:txBody>
+          <a:bodyPr/>
+          <a:lstStyle/>
+          <a:p>
+            <a:r>
+              <a:rPr lang="de-DE" dirty="0"/>
+              <a:t>Zusammenfassung</a:t>
+            </a:r>
+          </a:p>
+        </p:txBody>
+      </p:sp>
+      <p:sp>
+        <p:nvSpPr>
+          <p:cNvPr id="3" name="Inhaltsplatzhalter 2"/>
+          <p:cNvSpPr>
+            <a:spLocks noGrp="1"/>
+          </p:cNvSpPr>
+          <p:nvPr>
+            <p:ph idx="1"/>
+          </p:nvPr>
+        </p:nvSpPr>
+        <p:spPr/>
+        <p:txBody>
+          <a:bodyPr/>
+          <a:lstStyle/>
+          <a:p>
+            <a:r>
+              <a:rPr lang="de-DE" dirty="0"/>
+              <a:t>Erfolgreicher Entwurf</a:t>
+            </a:r>
+          </a:p>
+          <a:p>
+            <a:pPr lvl="1">
+              <a:buFont typeface="Wingdings" panose="05000000000000000000" pitchFamily="2" charset="2"/>
+              <a:buChar char="Ø"/>
+            </a:pPr>
+            <a:r>
+              <a:rPr lang="de-DE" dirty="0"/>
+              <a:t>Wenige Änderungen in Implementierungsphase notwendig</a:t>
+            </a:r>
+          </a:p>
+          <a:p>
+            <a:r>
+              <a:rPr lang="de-DE" dirty="0"/>
+              <a:t>Erfolgreiches Projekt</a:t>
+            </a:r>
+          </a:p>
+          <a:p>
+            <a:pPr lvl="1">
+              <a:buFont typeface="Wingdings" panose="05000000000000000000" pitchFamily="2" charset="2"/>
+              <a:buChar char="Ø"/>
+            </a:pPr>
+            <a:r>
+              <a:rPr lang="de-DE" dirty="0"/>
+              <a:t>Software entspricht allen Spezifikationen des Pflichtenhefts</a:t>
+            </a:r>
+          </a:p>
+        </p:txBody>
+      </p:sp>
+    </p:spTree>
+    <p:extLst>
+      <p:ext uri="{BB962C8B-B14F-4D97-AF65-F5344CB8AC3E}">
+        <p14:creationId xmlns:p14="http://schemas.microsoft.com/office/powerpoint/2010/main" val="2148954173"/>
+      </p:ext>
+    </p:extLst>
+  </p:cSld>
+  <p:clrMapOvr>
+    <a:masterClrMapping/>
+  </p:clrMapOvr>
 </p:sld>
 </file>
 
@@ -9298,13 +9767,6 @@
   <p:clrMapOvr>
     <a:masterClrMapping/>
   </p:clrMapOvr>
-  <p:timing>
-    <p:tnLst>
-      <p:par>
-        <p:cTn id="1" dur="indefinite" restart="never" nodeType="tmRoot"/>
-      </p:par>
-    </p:tnLst>
-  </p:timing>
 </p:sld>
 </file>
 
@@ -9417,13 +9879,6 @@
   <p:clrMapOvr>
     <a:masterClrMapping/>
   </p:clrMapOvr>
-  <p:timing>
-    <p:tnLst>
-      <p:par>
-        <p:cTn id="1" dur="indefinite" restart="never" nodeType="tmRoot"/>
-      </p:par>
-    </p:tnLst>
-  </p:timing>
 </p:sld>
 </file>
 
@@ -9652,13 +10107,6 @@
   <p:clrMapOvr>
     <a:masterClrMapping/>
   </p:clrMapOvr>
-  <p:timing>
-    <p:tnLst>
-      <p:par>
-        <p:cTn id="1" dur="indefinite" restart="never" nodeType="tmRoot"/>
-      </p:par>
-    </p:tnLst>
-  </p:timing>
 </p:sld>
 </file>
 
@@ -9934,13 +10382,6 @@
   <p:clrMapOvr>
     <a:masterClrMapping/>
   </p:clrMapOvr>
-  <p:timing>
-    <p:tnLst>
-      <p:par>
-        <p:cTn id="1" dur="indefinite" restart="never" nodeType="tmRoot"/>
-      </p:par>
-    </p:tnLst>
-  </p:timing>
 </p:sld>
 </file>
 
@@ -9978,7 +10419,7 @@
           <a:p>
             <a:r>
               <a:rPr lang="de-DE" dirty="0"/>
-              <a:t>Zielfunktionen für Generierung</a:t>
+              <a:t>Entwurf: Zielfunktionen für Generierung</a:t>
             </a:r>
           </a:p>
         </p:txBody>
@@ -9998,27 +10439,44 @@
           <a:bodyPr/>
           <a:lstStyle/>
           <a:p>
+            <a:pPr>
+              <a:lnSpc>
+                <a:spcPct val="150000"/>
+              </a:lnSpc>
+            </a:pPr>
             <a:r>
               <a:rPr lang="de-DE" dirty="0"/>
               <a:t>Mögliche Ziele</a:t>
             </a:r>
           </a:p>
           <a:p>
-            <a:pPr lvl="1"/>
+            <a:pPr lvl="1">
+              <a:lnSpc>
+                <a:spcPct val="150000"/>
+              </a:lnSpc>
+            </a:pPr>
             <a:r>
               <a:rPr lang="de-DE" dirty="0"/>
               <a:t>Minimale ECTS-Zahl</a:t>
             </a:r>
           </a:p>
           <a:p>
-            <a:pPr lvl="1"/>
+            <a:pPr lvl="1">
+              <a:lnSpc>
+                <a:spcPct val="150000"/>
+              </a:lnSpc>
+            </a:pPr>
             <a:r>
               <a:rPr lang="de-DE" dirty="0"/>
               <a:t>Minimale Semester Zahl</a:t>
             </a:r>
           </a:p>
           <a:p>
-            <a:pPr lvl="1"/>
+            <a:pPr lvl="1">
+              <a:lnSpc>
+                <a:spcPct val="150000"/>
+              </a:lnSpc>
+            </a:pPr>
             <a:r>
               <a:rPr lang="de-DE" dirty="0"/>
               <a:t>Präferenzen</a:t>
@@ -10036,13 +10494,6 @@
   <p:clrMapOvr>
     <a:masterClrMapping/>
   </p:clrMapOvr>
-  <p:timing>
-    <p:tnLst>
-      <p:par>
-        <p:cTn id="1" dur="indefinite" restart="never" nodeType="tmRoot"/>
-      </p:par>
-    </p:tnLst>
-  </p:timing>
 </p:sld>
 </file>
 
@@ -10080,7 +10531,7 @@
           <a:p>
             <a:r>
               <a:rPr lang="de-DE" dirty="0"/>
-              <a:t>Zielfunktionen für Generierung</a:t>
+              <a:t>Entwurf: Zielfunktionen für Generierung</a:t>
             </a:r>
           </a:p>
         </p:txBody>
@@ -10211,7 +10662,7 @@
               <a:p>
                 <a:pPr algn="ctr"/>
                 <a:r>
-                  <a:rPr lang="de-DE" dirty="0" smtClean="0">
+                  <a:rPr lang="de-DE" dirty="0">
                     <a:solidFill>
                       <a:schemeClr val="tx2"/>
                     </a:solidFill>
@@ -10281,7 +10732,7 @@
               <a:p>
                 <a:pPr algn="ctr"/>
                 <a:r>
-                  <a:rPr lang="de-DE" dirty="0" smtClean="0">
+                  <a:rPr lang="de-DE" dirty="0">
                     <a:solidFill>
                       <a:schemeClr val="tx2"/>
                     </a:solidFill>
@@ -10351,7 +10802,7 @@
               <a:p>
                 <a:pPr algn="ctr"/>
                 <a:r>
-                  <a:rPr lang="de-DE" dirty="0" smtClean="0">
+                  <a:rPr lang="de-DE" dirty="0">
                     <a:solidFill>
                       <a:schemeClr val="tx2"/>
                     </a:solidFill>
@@ -10421,14 +10872,14 @@
               <a:p>
                 <a:pPr algn="ctr"/>
                 <a:r>
-                  <a:rPr lang="de-DE" dirty="0" err="1" smtClean="0">
+                  <a:rPr lang="de-DE" dirty="0" err="1">
                     <a:solidFill>
                       <a:schemeClr val="tx2"/>
                     </a:solidFill>
                   </a:rPr>
                   <a:t>Preferences</a:t>
                 </a:r>
-                <a:endParaRPr lang="de-DE" dirty="0" smtClean="0">
+                <a:endParaRPr lang="de-DE" dirty="0">
                   <a:solidFill>
                     <a:schemeClr val="tx2"/>
                   </a:solidFill>
@@ -10493,7 +10944,7 @@
               <a:p>
                 <a:pPr algn="ctr"/>
                 <a:r>
-                  <a:rPr lang="de-DE" dirty="0" smtClean="0">
+                  <a:rPr lang="de-DE" dirty="0">
                     <a:solidFill>
                       <a:schemeClr val="accent1"/>
                     </a:solidFill>
@@ -10501,14 +10952,14 @@
                   <a:t>User </a:t>
                 </a:r>
                 <a:r>
-                  <a:rPr lang="de-DE" dirty="0" err="1" smtClean="0">
+                  <a:rPr lang="de-DE" dirty="0" err="1">
                     <a:solidFill>
                       <a:schemeClr val="accent1"/>
                     </a:solidFill>
                   </a:rPr>
                   <a:t>Selection</a:t>
                 </a:r>
-                <a:endParaRPr lang="de-DE" dirty="0" smtClean="0">
+                <a:endParaRPr lang="de-DE" dirty="0">
                   <a:solidFill>
                     <a:schemeClr val="accent1"/>
                   </a:solidFill>
@@ -10576,14 +11027,14 @@
               <a:p>
                 <a:pPr algn="ctr"/>
                 <a:r>
-                  <a:rPr lang="de-DE" sz="6600" dirty="0" smtClean="0">
+                  <a:rPr lang="de-DE" sz="6600" dirty="0">
                     <a:solidFill>
                       <a:schemeClr val="tx2"/>
                     </a:solidFill>
                   </a:rPr>
                   <a:t>∅</a:t>
                 </a:r>
-                <a:endParaRPr lang="de-DE" dirty="0" smtClean="0">
+                <a:endParaRPr lang="de-DE" dirty="0">
                   <a:solidFill>
                     <a:schemeClr val="tx2"/>
                   </a:solidFill>
@@ -10802,17 +11253,9 @@
                       <a:schemeClr val="tx2"/>
                     </a:solidFill>
                   </a:rPr>
-                  <a:t>x</a:t>
+                  <a:t>x &lt; 0.5 ? 0 : x</a:t>
                 </a:r>
-                <a:r>
-                  <a:rPr lang="de-DE" sz="2000" dirty="0" smtClean="0">
-                    <a:solidFill>
-                      <a:schemeClr val="tx2"/>
-                    </a:solidFill>
-                  </a:rPr>
-                  <a:t> &lt; 0.5 ? 0 : x</a:t>
-                </a:r>
-                <a:endParaRPr lang="de-DE" sz="1400" dirty="0" smtClean="0">
+                <a:endParaRPr lang="de-DE" sz="1400" dirty="0">
                   <a:solidFill>
                     <a:schemeClr val="tx2"/>
                   </a:solidFill>
@@ -10923,7 +11366,7 @@
                   </a:rPr>
                   <a:t>*</a:t>
                 </a:r>
-                <a:endParaRPr lang="de-DE" sz="1400" dirty="0" smtClean="0">
+                <a:endParaRPr lang="de-DE" sz="1400" dirty="0">
                   <a:solidFill>
                     <a:schemeClr val="tx2"/>
                   </a:solidFill>
@@ -11026,7 +11469,7 @@
               <a:lstStyle/>
               <a:p>
                 <a:r>
-                  <a:rPr lang="de-DE" sz="2000" dirty="0" smtClean="0"/>
+                  <a:rPr lang="de-DE" sz="2000" dirty="0"/>
                   <a:t>score</a:t>
                 </a:r>
               </a:p>
@@ -11093,11 +11536,7 @@
             <a:p>
               <a:r>
                 <a:rPr lang="de-DE" sz="2000"/>
-                <a:t>p</a:t>
-              </a:r>
-              <a:r>
-                <a:rPr lang="de-DE" sz="2000" smtClean="0"/>
-                <a:t>lan</a:t>
+                <a:t>plan</a:t>
               </a:r>
             </a:p>
           </p:txBody>
@@ -11293,13 +11732,6 @@
   <p:clrMapOvr>
     <a:masterClrMapping/>
   </p:clrMapOvr>
-  <p:timing>
-    <p:tnLst>
-      <p:par>
-        <p:cTn id="1" dur="indefinite" restart="never" nodeType="tmRoot"/>
-      </p:par>
-    </p:tnLst>
-  </p:timing>
 </p:sld>
 </file>
 
@@ -11336,8 +11768,8 @@
           <a:lstStyle/>
           <a:p>
             <a:r>
-              <a:rPr lang="de-DE"/>
-              <a:t>Generierung</a:t>
+              <a:rPr lang="de-DE" dirty="0"/>
+              <a:t>Entwurf: Generierungsalgorithmus</a:t>
             </a:r>
           </a:p>
         </p:txBody>
@@ -11352,12 +11784,110 @@
             <p:ph idx="1"/>
           </p:nvPr>
         </p:nvSpPr>
-        <p:spPr/>
-        <p:txBody>
-          <a:bodyPr/>
+        <p:spPr>
+          <a:xfrm>
+            <a:off x="680321" y="2336872"/>
+            <a:ext cx="9613861" cy="4075959"/>
+          </a:xfrm>
+        </p:spPr>
+        <p:txBody>
+          <a:bodyPr>
+            <a:noAutofit/>
+          </a:bodyPr>
           <a:lstStyle/>
           <a:p>
-            <a:endParaRPr lang="de-DE"/>
+            <a:pPr>
+              <a:lnSpc>
+                <a:spcPct val="150000"/>
+              </a:lnSpc>
+            </a:pPr>
+            <a:r>
+              <a:rPr lang="de-DE" dirty="0"/>
+              <a:t>Evolutionärer Algorithmus</a:t>
+            </a:r>
+          </a:p>
+          <a:p>
+            <a:pPr lvl="1">
+              <a:lnSpc>
+                <a:spcPct val="150000"/>
+              </a:lnSpc>
+              <a:buFont typeface="Wingdings" panose="05000000000000000000" pitchFamily="2" charset="2"/>
+              <a:buChar char="Ø"/>
+            </a:pPr>
+            <a:r>
+              <a:rPr lang="de-DE" dirty="0"/>
+              <a:t>Mehrfache Generierung/Modifizierung von Plänen</a:t>
+            </a:r>
+          </a:p>
+          <a:p>
+            <a:pPr>
+              <a:lnSpc>
+                <a:spcPct val="150000"/>
+              </a:lnSpc>
+            </a:pPr>
+            <a:r>
+              <a:rPr lang="de-DE" dirty="0"/>
+              <a:t>Schritte:</a:t>
+            </a:r>
+          </a:p>
+          <a:p>
+            <a:pPr marL="914400" lvl="1" indent="-457200">
+              <a:lnSpc>
+                <a:spcPct val="150000"/>
+              </a:lnSpc>
+              <a:buFont typeface="+mj-lt"/>
+              <a:buAutoNum type="arabicPeriod"/>
+            </a:pPr>
+            <a:r>
+              <a:rPr lang="de-DE" dirty="0"/>
+              <a:t>Erstellung eines Abhängigkeitsgraphen</a:t>
+            </a:r>
+          </a:p>
+          <a:p>
+            <a:pPr marL="914400" lvl="1" indent="-457200">
+              <a:lnSpc>
+                <a:spcPct val="150000"/>
+              </a:lnSpc>
+              <a:buFont typeface="+mj-lt"/>
+              <a:buAutoNum type="arabicPeriod"/>
+            </a:pPr>
+            <a:r>
+              <a:rPr lang="de-DE" dirty="0"/>
+              <a:t>Zufälliges hinzufügen/austauschen von Module</a:t>
+            </a:r>
+          </a:p>
+          <a:p>
+            <a:pPr marL="914400" lvl="1" indent="-457200">
+              <a:lnSpc>
+                <a:spcPct val="150000"/>
+              </a:lnSpc>
+              <a:buFont typeface="+mj-lt"/>
+              <a:buAutoNum type="arabicPeriod"/>
+            </a:pPr>
+            <a:r>
+              <a:rPr lang="de-DE" dirty="0"/>
+              <a:t>Topologische Sortierung des Graphs</a:t>
+            </a:r>
+          </a:p>
+          <a:p>
+            <a:pPr marL="914400" lvl="1" indent="-457200">
+              <a:lnSpc>
+                <a:spcPct val="150000"/>
+              </a:lnSpc>
+              <a:buFont typeface="+mj-lt"/>
+              <a:buAutoNum type="arabicPeriod"/>
+            </a:pPr>
+            <a:r>
+              <a:rPr lang="de-DE" dirty="0"/>
+              <a:t>„Parallelisierung“ der Sortierung</a:t>
+            </a:r>
+          </a:p>
+          <a:p>
+            <a:pPr marL="914400" lvl="1" indent="-457200">
+              <a:buFont typeface="+mj-lt"/>
+              <a:buAutoNum type="arabicPeriod"/>
+            </a:pPr>
+            <a:endParaRPr lang="de-DE" dirty="0"/>
           </a:p>
         </p:txBody>
       </p:sp>
@@ -11371,13 +11901,1138 @@
   <p:clrMapOvr>
     <a:masterClrMapping/>
   </p:clrMapOvr>
-  <p:timing>
-    <p:tnLst>
-      <p:par>
-        <p:cTn id="1" dur="indefinite" restart="never" nodeType="tmRoot"/>
-      </p:par>
-    </p:tnLst>
-  </p:timing>
+</p:sld>
+</file>
+
+<file path=ppt/slides/slide9.xml><?xml version="1.0" encoding="utf-8"?>
+<p:sld xmlns:a="http://schemas.openxmlformats.org/drawingml/2006/main" xmlns:r="http://schemas.openxmlformats.org/officeDocument/2006/relationships" xmlns:p="http://schemas.openxmlformats.org/presentationml/2006/main">
+  <p:cSld>
+    <p:spTree>
+      <p:nvGrpSpPr>
+        <p:cNvPr id="1" name=""/>
+        <p:cNvGrpSpPr/>
+        <p:nvPr/>
+      </p:nvGrpSpPr>
+      <p:grpSpPr>
+        <a:xfrm>
+          <a:off x="0" y="0"/>
+          <a:ext cx="0" cy="0"/>
+          <a:chOff x="0" y="0"/>
+          <a:chExt cx="0" cy="0"/>
+        </a:xfrm>
+      </p:grpSpPr>
+      <p:sp>
+        <p:nvSpPr>
+          <p:cNvPr id="2" name="Titel 1"/>
+          <p:cNvSpPr>
+            <a:spLocks noGrp="1"/>
+          </p:cNvSpPr>
+          <p:nvPr>
+            <p:ph type="title"/>
+          </p:nvPr>
+        </p:nvSpPr>
+        <p:spPr/>
+        <p:txBody>
+          <a:bodyPr/>
+          <a:lstStyle/>
+          <a:p>
+            <a:r>
+              <a:rPr lang="de-DE" dirty="0"/>
+              <a:t>Implementierung &amp; Qualitätssicherung</a:t>
+            </a:r>
+          </a:p>
+        </p:txBody>
+      </p:sp>
+      <p:sp>
+        <p:nvSpPr>
+          <p:cNvPr id="3" name="Inhaltsplatzhalter 2"/>
+          <p:cNvSpPr>
+            <a:spLocks noGrp="1"/>
+          </p:cNvSpPr>
+          <p:nvPr>
+            <p:ph idx="1"/>
+          </p:nvPr>
+        </p:nvSpPr>
+        <p:spPr>
+          <a:xfrm>
+            <a:off x="680321" y="2613601"/>
+            <a:ext cx="2291478" cy="1164316"/>
+          </a:xfrm>
+        </p:spPr>
+        <p:txBody>
+          <a:bodyPr>
+            <a:normAutofit/>
+          </a:bodyPr>
+          <a:lstStyle/>
+          <a:p>
+            <a:pPr marL="0" indent="0" algn="ctr">
+              <a:buNone/>
+            </a:pPr>
+            <a:r>
+              <a:rPr lang="de-DE" sz="4800" b="1" dirty="0"/>
+              <a:t>~15.000</a:t>
+            </a:r>
+            <a:br>
+              <a:rPr lang="de-DE" sz="3600" b="1" dirty="0"/>
+            </a:br>
+            <a:r>
+              <a:rPr lang="de-DE" sz="1800" b="1" dirty="0"/>
+              <a:t>Lines </a:t>
+            </a:r>
+            <a:r>
+              <a:rPr lang="de-DE" sz="1800" b="1" dirty="0" err="1"/>
+              <a:t>of</a:t>
+            </a:r>
+            <a:r>
+              <a:rPr lang="de-DE" sz="1800" b="1" dirty="0"/>
+              <a:t> Code</a:t>
+            </a:r>
+            <a:endParaRPr lang="de-DE" sz="3600" b="1" dirty="0"/>
+          </a:p>
+        </p:txBody>
+      </p:sp>
+      <p:sp>
+        <p:nvSpPr>
+          <p:cNvPr id="4" name="Inhaltsplatzhalter 2"/>
+          <p:cNvSpPr txBox="1">
+            <a:spLocks/>
+          </p:cNvSpPr>
+          <p:nvPr/>
+        </p:nvSpPr>
+        <p:spPr>
+          <a:xfrm>
+            <a:off x="388286" y="4586913"/>
+            <a:ext cx="2875547" cy="1164316"/>
+          </a:xfrm>
+          <a:prstGeom prst="rect">
+            <a:avLst/>
+          </a:prstGeom>
+        </p:spPr>
+        <p:txBody>
+          <a:bodyPr vert="horz" lIns="91440" tIns="45720" rIns="91440" bIns="45720" rtlCol="0">
+            <a:normAutofit/>
+          </a:bodyPr>
+          <a:lstStyle>
+            <a:lvl1pPr marL="228600" indent="-228600" algn="l" defTabSz="914400" rtl="0" eaLnBrk="1" latinLnBrk="0" hangingPunct="1">
+              <a:lnSpc>
+                <a:spcPct val="90000"/>
+              </a:lnSpc>
+              <a:spcBef>
+                <a:spcPts val="1000"/>
+              </a:spcBef>
+              <a:buFont typeface="Arial" panose="020B0604020202020204" pitchFamily="34" charset="0"/>
+              <a:buChar char="•"/>
+              <a:defRPr sz="2400" kern="1200">
+                <a:solidFill>
+                  <a:schemeClr val="tx1"/>
+                </a:solidFill>
+                <a:latin typeface="+mn-lt"/>
+                <a:ea typeface="+mn-ea"/>
+                <a:cs typeface="+mn-cs"/>
+              </a:defRPr>
+            </a:lvl1pPr>
+            <a:lvl2pPr marL="685800" indent="-228600" algn="l" defTabSz="914400" rtl="0" eaLnBrk="1" latinLnBrk="0" hangingPunct="1">
+              <a:lnSpc>
+                <a:spcPct val="90000"/>
+              </a:lnSpc>
+              <a:spcBef>
+                <a:spcPts val="500"/>
+              </a:spcBef>
+              <a:buFont typeface="Arial" panose="020B0604020202020204" pitchFamily="34" charset="0"/>
+              <a:buChar char="•"/>
+              <a:defRPr sz="2000" kern="1200">
+                <a:solidFill>
+                  <a:schemeClr val="tx1"/>
+                </a:solidFill>
+                <a:latin typeface="+mn-lt"/>
+                <a:ea typeface="+mn-ea"/>
+                <a:cs typeface="+mn-cs"/>
+              </a:defRPr>
+            </a:lvl2pPr>
+            <a:lvl3pPr marL="1143000" indent="-228600" algn="l" defTabSz="914400" rtl="0" eaLnBrk="1" latinLnBrk="0" hangingPunct="1">
+              <a:lnSpc>
+                <a:spcPct val="90000"/>
+              </a:lnSpc>
+              <a:spcBef>
+                <a:spcPts val="500"/>
+              </a:spcBef>
+              <a:buFont typeface="Arial" panose="020B0604020202020204" pitchFamily="34" charset="0"/>
+              <a:buChar char="•"/>
+              <a:defRPr sz="1800" kern="1200">
+                <a:solidFill>
+                  <a:schemeClr val="tx1"/>
+                </a:solidFill>
+                <a:latin typeface="+mn-lt"/>
+                <a:ea typeface="+mn-ea"/>
+                <a:cs typeface="+mn-cs"/>
+              </a:defRPr>
+            </a:lvl3pPr>
+            <a:lvl4pPr marL="1600200" indent="-228600" algn="l" defTabSz="914400" rtl="0" eaLnBrk="1" latinLnBrk="0" hangingPunct="1">
+              <a:lnSpc>
+                <a:spcPct val="90000"/>
+              </a:lnSpc>
+              <a:spcBef>
+                <a:spcPts val="500"/>
+              </a:spcBef>
+              <a:buFont typeface="Arial" panose="020B0604020202020204" pitchFamily="34" charset="0"/>
+              <a:buChar char="•"/>
+              <a:defRPr sz="1600" kern="1200">
+                <a:solidFill>
+                  <a:schemeClr val="tx1"/>
+                </a:solidFill>
+                <a:latin typeface="+mn-lt"/>
+                <a:ea typeface="+mn-ea"/>
+                <a:cs typeface="+mn-cs"/>
+              </a:defRPr>
+            </a:lvl4pPr>
+            <a:lvl5pPr marL="2057400" indent="-228600" algn="l" defTabSz="914400" rtl="0" eaLnBrk="1" latinLnBrk="0" hangingPunct="1">
+              <a:lnSpc>
+                <a:spcPct val="90000"/>
+              </a:lnSpc>
+              <a:spcBef>
+                <a:spcPts val="500"/>
+              </a:spcBef>
+              <a:buFont typeface="Arial" panose="020B0604020202020204" pitchFamily="34" charset="0"/>
+              <a:buChar char="•"/>
+              <a:defRPr sz="1600" kern="1200">
+                <a:solidFill>
+                  <a:schemeClr val="tx1"/>
+                </a:solidFill>
+                <a:latin typeface="+mn-lt"/>
+                <a:ea typeface="+mn-ea"/>
+                <a:cs typeface="+mn-cs"/>
+              </a:defRPr>
+            </a:lvl5pPr>
+            <a:lvl6pPr marL="2514600" indent="-228600" algn="l" defTabSz="914400" rtl="0" eaLnBrk="1" latinLnBrk="0" hangingPunct="1">
+              <a:lnSpc>
+                <a:spcPct val="90000"/>
+              </a:lnSpc>
+              <a:spcBef>
+                <a:spcPts val="500"/>
+              </a:spcBef>
+              <a:buFont typeface="Arial" panose="020B0604020202020204" pitchFamily="34" charset="0"/>
+              <a:buChar char="•"/>
+              <a:defRPr sz="1400" kern="1200">
+                <a:solidFill>
+                  <a:schemeClr val="tx1"/>
+                </a:solidFill>
+                <a:latin typeface="+mn-lt"/>
+                <a:ea typeface="+mn-ea"/>
+                <a:cs typeface="+mn-cs"/>
+              </a:defRPr>
+            </a:lvl6pPr>
+            <a:lvl7pPr marL="2971800" indent="-228600" algn="l" defTabSz="914400" rtl="0" eaLnBrk="1" latinLnBrk="0" hangingPunct="1">
+              <a:lnSpc>
+                <a:spcPct val="90000"/>
+              </a:lnSpc>
+              <a:spcBef>
+                <a:spcPts val="500"/>
+              </a:spcBef>
+              <a:buFont typeface="Arial" panose="020B0604020202020204" pitchFamily="34" charset="0"/>
+              <a:buChar char="•"/>
+              <a:defRPr sz="1400" kern="1200">
+                <a:solidFill>
+                  <a:schemeClr val="tx1"/>
+                </a:solidFill>
+                <a:latin typeface="+mn-lt"/>
+                <a:ea typeface="+mn-ea"/>
+                <a:cs typeface="+mn-cs"/>
+              </a:defRPr>
+            </a:lvl7pPr>
+            <a:lvl8pPr marL="3429000" indent="-228600" algn="l" defTabSz="914400" rtl="0" eaLnBrk="1" latinLnBrk="0" hangingPunct="1">
+              <a:lnSpc>
+                <a:spcPct val="90000"/>
+              </a:lnSpc>
+              <a:spcBef>
+                <a:spcPts val="500"/>
+              </a:spcBef>
+              <a:buFont typeface="Arial" panose="020B0604020202020204" pitchFamily="34" charset="0"/>
+              <a:buChar char="•"/>
+              <a:defRPr sz="1400" kern="1200">
+                <a:solidFill>
+                  <a:schemeClr val="tx1"/>
+                </a:solidFill>
+                <a:latin typeface="+mn-lt"/>
+                <a:ea typeface="+mn-ea"/>
+                <a:cs typeface="+mn-cs"/>
+              </a:defRPr>
+            </a:lvl8pPr>
+            <a:lvl9pPr marL="3886200" indent="-228600" algn="l" defTabSz="914400" rtl="0" eaLnBrk="1" latinLnBrk="0" hangingPunct="1">
+              <a:lnSpc>
+                <a:spcPct val="90000"/>
+              </a:lnSpc>
+              <a:spcBef>
+                <a:spcPts val="500"/>
+              </a:spcBef>
+              <a:buFont typeface="Arial" panose="020B0604020202020204" pitchFamily="34" charset="0"/>
+              <a:buChar char="•"/>
+              <a:defRPr sz="1400" kern="1200">
+                <a:solidFill>
+                  <a:schemeClr val="tx1"/>
+                </a:solidFill>
+                <a:latin typeface="+mn-lt"/>
+                <a:ea typeface="+mn-ea"/>
+                <a:cs typeface="+mn-cs"/>
+              </a:defRPr>
+            </a:lvl9pPr>
+          </a:lstStyle>
+          <a:p>
+            <a:pPr marL="0" indent="0" algn="ctr">
+              <a:buFont typeface="Arial" panose="020B0604020202020204" pitchFamily="34" charset="0"/>
+              <a:buNone/>
+            </a:pPr>
+            <a:r>
+              <a:rPr lang="de-DE" sz="4800" b="1" dirty="0"/>
+              <a:t>~45%</a:t>
+            </a:r>
+            <a:br>
+              <a:rPr lang="de-DE" sz="3600" b="1" dirty="0"/>
+            </a:br>
+            <a:r>
+              <a:rPr lang="de-DE" sz="1800" b="1" dirty="0"/>
+              <a:t>Testüberdeckung Client</a:t>
+            </a:r>
+            <a:endParaRPr lang="de-DE" sz="3600" b="1" dirty="0"/>
+          </a:p>
+        </p:txBody>
+      </p:sp>
+      <p:sp>
+        <p:nvSpPr>
+          <p:cNvPr id="5" name="Inhaltsplatzhalter 2"/>
+          <p:cNvSpPr txBox="1">
+            <a:spLocks/>
+          </p:cNvSpPr>
+          <p:nvPr/>
+        </p:nvSpPr>
+        <p:spPr>
+          <a:xfrm>
+            <a:off x="4049476" y="4586913"/>
+            <a:ext cx="2875547" cy="1537294"/>
+          </a:xfrm>
+          <a:prstGeom prst="rect">
+            <a:avLst/>
+          </a:prstGeom>
+        </p:spPr>
+        <p:txBody>
+          <a:bodyPr vert="horz" lIns="91440" tIns="45720" rIns="91440" bIns="45720" rtlCol="0">
+            <a:normAutofit/>
+          </a:bodyPr>
+          <a:lstStyle>
+            <a:lvl1pPr marL="228600" indent="-228600" algn="l" defTabSz="914400" rtl="0" eaLnBrk="1" latinLnBrk="0" hangingPunct="1">
+              <a:lnSpc>
+                <a:spcPct val="90000"/>
+              </a:lnSpc>
+              <a:spcBef>
+                <a:spcPts val="1000"/>
+              </a:spcBef>
+              <a:buFont typeface="Arial" panose="020B0604020202020204" pitchFamily="34" charset="0"/>
+              <a:buChar char="•"/>
+              <a:defRPr sz="2400" kern="1200">
+                <a:solidFill>
+                  <a:schemeClr val="tx1"/>
+                </a:solidFill>
+                <a:latin typeface="+mn-lt"/>
+                <a:ea typeface="+mn-ea"/>
+                <a:cs typeface="+mn-cs"/>
+              </a:defRPr>
+            </a:lvl1pPr>
+            <a:lvl2pPr marL="685800" indent="-228600" algn="l" defTabSz="914400" rtl="0" eaLnBrk="1" latinLnBrk="0" hangingPunct="1">
+              <a:lnSpc>
+                <a:spcPct val="90000"/>
+              </a:lnSpc>
+              <a:spcBef>
+                <a:spcPts val="500"/>
+              </a:spcBef>
+              <a:buFont typeface="Arial" panose="020B0604020202020204" pitchFamily="34" charset="0"/>
+              <a:buChar char="•"/>
+              <a:defRPr sz="2000" kern="1200">
+                <a:solidFill>
+                  <a:schemeClr val="tx1"/>
+                </a:solidFill>
+                <a:latin typeface="+mn-lt"/>
+                <a:ea typeface="+mn-ea"/>
+                <a:cs typeface="+mn-cs"/>
+              </a:defRPr>
+            </a:lvl2pPr>
+            <a:lvl3pPr marL="1143000" indent="-228600" algn="l" defTabSz="914400" rtl="0" eaLnBrk="1" latinLnBrk="0" hangingPunct="1">
+              <a:lnSpc>
+                <a:spcPct val="90000"/>
+              </a:lnSpc>
+              <a:spcBef>
+                <a:spcPts val="500"/>
+              </a:spcBef>
+              <a:buFont typeface="Arial" panose="020B0604020202020204" pitchFamily="34" charset="0"/>
+              <a:buChar char="•"/>
+              <a:defRPr sz="1800" kern="1200">
+                <a:solidFill>
+                  <a:schemeClr val="tx1"/>
+                </a:solidFill>
+                <a:latin typeface="+mn-lt"/>
+                <a:ea typeface="+mn-ea"/>
+                <a:cs typeface="+mn-cs"/>
+              </a:defRPr>
+            </a:lvl3pPr>
+            <a:lvl4pPr marL="1600200" indent="-228600" algn="l" defTabSz="914400" rtl="0" eaLnBrk="1" latinLnBrk="0" hangingPunct="1">
+              <a:lnSpc>
+                <a:spcPct val="90000"/>
+              </a:lnSpc>
+              <a:spcBef>
+                <a:spcPts val="500"/>
+              </a:spcBef>
+              <a:buFont typeface="Arial" panose="020B0604020202020204" pitchFamily="34" charset="0"/>
+              <a:buChar char="•"/>
+              <a:defRPr sz="1600" kern="1200">
+                <a:solidFill>
+                  <a:schemeClr val="tx1"/>
+                </a:solidFill>
+                <a:latin typeface="+mn-lt"/>
+                <a:ea typeface="+mn-ea"/>
+                <a:cs typeface="+mn-cs"/>
+              </a:defRPr>
+            </a:lvl4pPr>
+            <a:lvl5pPr marL="2057400" indent="-228600" algn="l" defTabSz="914400" rtl="0" eaLnBrk="1" latinLnBrk="0" hangingPunct="1">
+              <a:lnSpc>
+                <a:spcPct val="90000"/>
+              </a:lnSpc>
+              <a:spcBef>
+                <a:spcPts val="500"/>
+              </a:spcBef>
+              <a:buFont typeface="Arial" panose="020B0604020202020204" pitchFamily="34" charset="0"/>
+              <a:buChar char="•"/>
+              <a:defRPr sz="1600" kern="1200">
+                <a:solidFill>
+                  <a:schemeClr val="tx1"/>
+                </a:solidFill>
+                <a:latin typeface="+mn-lt"/>
+                <a:ea typeface="+mn-ea"/>
+                <a:cs typeface="+mn-cs"/>
+              </a:defRPr>
+            </a:lvl5pPr>
+            <a:lvl6pPr marL="2514600" indent="-228600" algn="l" defTabSz="914400" rtl="0" eaLnBrk="1" latinLnBrk="0" hangingPunct="1">
+              <a:lnSpc>
+                <a:spcPct val="90000"/>
+              </a:lnSpc>
+              <a:spcBef>
+                <a:spcPts val="500"/>
+              </a:spcBef>
+              <a:buFont typeface="Arial" panose="020B0604020202020204" pitchFamily="34" charset="0"/>
+              <a:buChar char="•"/>
+              <a:defRPr sz="1400" kern="1200">
+                <a:solidFill>
+                  <a:schemeClr val="tx1"/>
+                </a:solidFill>
+                <a:latin typeface="+mn-lt"/>
+                <a:ea typeface="+mn-ea"/>
+                <a:cs typeface="+mn-cs"/>
+              </a:defRPr>
+            </a:lvl6pPr>
+            <a:lvl7pPr marL="2971800" indent="-228600" algn="l" defTabSz="914400" rtl="0" eaLnBrk="1" latinLnBrk="0" hangingPunct="1">
+              <a:lnSpc>
+                <a:spcPct val="90000"/>
+              </a:lnSpc>
+              <a:spcBef>
+                <a:spcPts val="500"/>
+              </a:spcBef>
+              <a:buFont typeface="Arial" panose="020B0604020202020204" pitchFamily="34" charset="0"/>
+              <a:buChar char="•"/>
+              <a:defRPr sz="1400" kern="1200">
+                <a:solidFill>
+                  <a:schemeClr val="tx1"/>
+                </a:solidFill>
+                <a:latin typeface="+mn-lt"/>
+                <a:ea typeface="+mn-ea"/>
+                <a:cs typeface="+mn-cs"/>
+              </a:defRPr>
+            </a:lvl7pPr>
+            <a:lvl8pPr marL="3429000" indent="-228600" algn="l" defTabSz="914400" rtl="0" eaLnBrk="1" latinLnBrk="0" hangingPunct="1">
+              <a:lnSpc>
+                <a:spcPct val="90000"/>
+              </a:lnSpc>
+              <a:spcBef>
+                <a:spcPts val="500"/>
+              </a:spcBef>
+              <a:buFont typeface="Arial" panose="020B0604020202020204" pitchFamily="34" charset="0"/>
+              <a:buChar char="•"/>
+              <a:defRPr sz="1400" kern="1200">
+                <a:solidFill>
+                  <a:schemeClr val="tx1"/>
+                </a:solidFill>
+                <a:latin typeface="+mn-lt"/>
+                <a:ea typeface="+mn-ea"/>
+                <a:cs typeface="+mn-cs"/>
+              </a:defRPr>
+            </a:lvl8pPr>
+            <a:lvl9pPr marL="3886200" indent="-228600" algn="l" defTabSz="914400" rtl="0" eaLnBrk="1" latinLnBrk="0" hangingPunct="1">
+              <a:lnSpc>
+                <a:spcPct val="90000"/>
+              </a:lnSpc>
+              <a:spcBef>
+                <a:spcPts val="500"/>
+              </a:spcBef>
+              <a:buFont typeface="Arial" panose="020B0604020202020204" pitchFamily="34" charset="0"/>
+              <a:buChar char="•"/>
+              <a:defRPr sz="1400" kern="1200">
+                <a:solidFill>
+                  <a:schemeClr val="tx1"/>
+                </a:solidFill>
+                <a:latin typeface="+mn-lt"/>
+                <a:ea typeface="+mn-ea"/>
+                <a:cs typeface="+mn-cs"/>
+              </a:defRPr>
+            </a:lvl9pPr>
+          </a:lstStyle>
+          <a:p>
+            <a:pPr marL="0" indent="0" algn="ctr">
+              <a:buFont typeface="Arial" panose="020B0604020202020204" pitchFamily="34" charset="0"/>
+              <a:buNone/>
+            </a:pPr>
+            <a:r>
+              <a:rPr lang="de-DE" sz="4800" b="1" dirty="0"/>
+              <a:t>~60%</a:t>
+            </a:r>
+            <a:br>
+              <a:rPr lang="de-DE" sz="3600" b="1" dirty="0"/>
+            </a:br>
+            <a:r>
+              <a:rPr lang="de-DE" sz="1800" b="1" dirty="0"/>
+              <a:t>Testüberdeckung</a:t>
+            </a:r>
+            <a:br>
+              <a:rPr lang="de-DE" sz="1800" b="1" dirty="0"/>
+            </a:br>
+            <a:r>
+              <a:rPr lang="de-DE" sz="1800" b="1" dirty="0"/>
+              <a:t>(ohne REST-Paket) </a:t>
+            </a:r>
+            <a:endParaRPr lang="de-DE" sz="3600" b="1" dirty="0"/>
+          </a:p>
+        </p:txBody>
+      </p:sp>
+      <p:sp>
+        <p:nvSpPr>
+          <p:cNvPr id="6" name="Inhaltsplatzhalter 2"/>
+          <p:cNvSpPr txBox="1">
+            <a:spLocks/>
+          </p:cNvSpPr>
+          <p:nvPr/>
+        </p:nvSpPr>
+        <p:spPr>
+          <a:xfrm>
+            <a:off x="8002702" y="4586913"/>
+            <a:ext cx="2875547" cy="1164316"/>
+          </a:xfrm>
+          <a:prstGeom prst="rect">
+            <a:avLst/>
+          </a:prstGeom>
+        </p:spPr>
+        <p:txBody>
+          <a:bodyPr vert="horz" lIns="91440" tIns="45720" rIns="91440" bIns="45720" rtlCol="0">
+            <a:normAutofit/>
+          </a:bodyPr>
+          <a:lstStyle>
+            <a:lvl1pPr marL="228600" indent="-228600" algn="l" defTabSz="914400" rtl="0" eaLnBrk="1" latinLnBrk="0" hangingPunct="1">
+              <a:lnSpc>
+                <a:spcPct val="90000"/>
+              </a:lnSpc>
+              <a:spcBef>
+                <a:spcPts val="1000"/>
+              </a:spcBef>
+              <a:buFont typeface="Arial" panose="020B0604020202020204" pitchFamily="34" charset="0"/>
+              <a:buChar char="•"/>
+              <a:defRPr sz="2400" kern="1200">
+                <a:solidFill>
+                  <a:schemeClr val="tx1"/>
+                </a:solidFill>
+                <a:latin typeface="+mn-lt"/>
+                <a:ea typeface="+mn-ea"/>
+                <a:cs typeface="+mn-cs"/>
+              </a:defRPr>
+            </a:lvl1pPr>
+            <a:lvl2pPr marL="685800" indent="-228600" algn="l" defTabSz="914400" rtl="0" eaLnBrk="1" latinLnBrk="0" hangingPunct="1">
+              <a:lnSpc>
+                <a:spcPct val="90000"/>
+              </a:lnSpc>
+              <a:spcBef>
+                <a:spcPts val="500"/>
+              </a:spcBef>
+              <a:buFont typeface="Arial" panose="020B0604020202020204" pitchFamily="34" charset="0"/>
+              <a:buChar char="•"/>
+              <a:defRPr sz="2000" kern="1200">
+                <a:solidFill>
+                  <a:schemeClr val="tx1"/>
+                </a:solidFill>
+                <a:latin typeface="+mn-lt"/>
+                <a:ea typeface="+mn-ea"/>
+                <a:cs typeface="+mn-cs"/>
+              </a:defRPr>
+            </a:lvl2pPr>
+            <a:lvl3pPr marL="1143000" indent="-228600" algn="l" defTabSz="914400" rtl="0" eaLnBrk="1" latinLnBrk="0" hangingPunct="1">
+              <a:lnSpc>
+                <a:spcPct val="90000"/>
+              </a:lnSpc>
+              <a:spcBef>
+                <a:spcPts val="500"/>
+              </a:spcBef>
+              <a:buFont typeface="Arial" panose="020B0604020202020204" pitchFamily="34" charset="0"/>
+              <a:buChar char="•"/>
+              <a:defRPr sz="1800" kern="1200">
+                <a:solidFill>
+                  <a:schemeClr val="tx1"/>
+                </a:solidFill>
+                <a:latin typeface="+mn-lt"/>
+                <a:ea typeface="+mn-ea"/>
+                <a:cs typeface="+mn-cs"/>
+              </a:defRPr>
+            </a:lvl3pPr>
+            <a:lvl4pPr marL="1600200" indent="-228600" algn="l" defTabSz="914400" rtl="0" eaLnBrk="1" latinLnBrk="0" hangingPunct="1">
+              <a:lnSpc>
+                <a:spcPct val="90000"/>
+              </a:lnSpc>
+              <a:spcBef>
+                <a:spcPts val="500"/>
+              </a:spcBef>
+              <a:buFont typeface="Arial" panose="020B0604020202020204" pitchFamily="34" charset="0"/>
+              <a:buChar char="•"/>
+              <a:defRPr sz="1600" kern="1200">
+                <a:solidFill>
+                  <a:schemeClr val="tx1"/>
+                </a:solidFill>
+                <a:latin typeface="+mn-lt"/>
+                <a:ea typeface="+mn-ea"/>
+                <a:cs typeface="+mn-cs"/>
+              </a:defRPr>
+            </a:lvl4pPr>
+            <a:lvl5pPr marL="2057400" indent="-228600" algn="l" defTabSz="914400" rtl="0" eaLnBrk="1" latinLnBrk="0" hangingPunct="1">
+              <a:lnSpc>
+                <a:spcPct val="90000"/>
+              </a:lnSpc>
+              <a:spcBef>
+                <a:spcPts val="500"/>
+              </a:spcBef>
+              <a:buFont typeface="Arial" panose="020B0604020202020204" pitchFamily="34" charset="0"/>
+              <a:buChar char="•"/>
+              <a:defRPr sz="1600" kern="1200">
+                <a:solidFill>
+                  <a:schemeClr val="tx1"/>
+                </a:solidFill>
+                <a:latin typeface="+mn-lt"/>
+                <a:ea typeface="+mn-ea"/>
+                <a:cs typeface="+mn-cs"/>
+              </a:defRPr>
+            </a:lvl5pPr>
+            <a:lvl6pPr marL="2514600" indent="-228600" algn="l" defTabSz="914400" rtl="0" eaLnBrk="1" latinLnBrk="0" hangingPunct="1">
+              <a:lnSpc>
+                <a:spcPct val="90000"/>
+              </a:lnSpc>
+              <a:spcBef>
+                <a:spcPts val="500"/>
+              </a:spcBef>
+              <a:buFont typeface="Arial" panose="020B0604020202020204" pitchFamily="34" charset="0"/>
+              <a:buChar char="•"/>
+              <a:defRPr sz="1400" kern="1200">
+                <a:solidFill>
+                  <a:schemeClr val="tx1"/>
+                </a:solidFill>
+                <a:latin typeface="+mn-lt"/>
+                <a:ea typeface="+mn-ea"/>
+                <a:cs typeface="+mn-cs"/>
+              </a:defRPr>
+            </a:lvl6pPr>
+            <a:lvl7pPr marL="2971800" indent="-228600" algn="l" defTabSz="914400" rtl="0" eaLnBrk="1" latinLnBrk="0" hangingPunct="1">
+              <a:lnSpc>
+                <a:spcPct val="90000"/>
+              </a:lnSpc>
+              <a:spcBef>
+                <a:spcPts val="500"/>
+              </a:spcBef>
+              <a:buFont typeface="Arial" panose="020B0604020202020204" pitchFamily="34" charset="0"/>
+              <a:buChar char="•"/>
+              <a:defRPr sz="1400" kern="1200">
+                <a:solidFill>
+                  <a:schemeClr val="tx1"/>
+                </a:solidFill>
+                <a:latin typeface="+mn-lt"/>
+                <a:ea typeface="+mn-ea"/>
+                <a:cs typeface="+mn-cs"/>
+              </a:defRPr>
+            </a:lvl7pPr>
+            <a:lvl8pPr marL="3429000" indent="-228600" algn="l" defTabSz="914400" rtl="0" eaLnBrk="1" latinLnBrk="0" hangingPunct="1">
+              <a:lnSpc>
+                <a:spcPct val="90000"/>
+              </a:lnSpc>
+              <a:spcBef>
+                <a:spcPts val="500"/>
+              </a:spcBef>
+              <a:buFont typeface="Arial" panose="020B0604020202020204" pitchFamily="34" charset="0"/>
+              <a:buChar char="•"/>
+              <a:defRPr sz="1400" kern="1200">
+                <a:solidFill>
+                  <a:schemeClr val="tx1"/>
+                </a:solidFill>
+                <a:latin typeface="+mn-lt"/>
+                <a:ea typeface="+mn-ea"/>
+                <a:cs typeface="+mn-cs"/>
+              </a:defRPr>
+            </a:lvl8pPr>
+            <a:lvl9pPr marL="3886200" indent="-228600" algn="l" defTabSz="914400" rtl="0" eaLnBrk="1" latinLnBrk="0" hangingPunct="1">
+              <a:lnSpc>
+                <a:spcPct val="90000"/>
+              </a:lnSpc>
+              <a:spcBef>
+                <a:spcPts val="500"/>
+              </a:spcBef>
+              <a:buFont typeface="Arial" panose="020B0604020202020204" pitchFamily="34" charset="0"/>
+              <a:buChar char="•"/>
+              <a:defRPr sz="1400" kern="1200">
+                <a:solidFill>
+                  <a:schemeClr val="tx1"/>
+                </a:solidFill>
+                <a:latin typeface="+mn-lt"/>
+                <a:ea typeface="+mn-ea"/>
+                <a:cs typeface="+mn-cs"/>
+              </a:defRPr>
+            </a:lvl9pPr>
+          </a:lstStyle>
+          <a:p>
+            <a:pPr marL="0" indent="0" algn="ctr">
+              <a:buFont typeface="Arial" panose="020B0604020202020204" pitchFamily="34" charset="0"/>
+              <a:buNone/>
+            </a:pPr>
+            <a:r>
+              <a:rPr lang="de-DE" sz="4800" b="1" dirty="0"/>
+              <a:t>viele</a:t>
+            </a:r>
+            <a:br>
+              <a:rPr lang="de-DE" sz="4800" b="1" dirty="0"/>
+            </a:br>
+            <a:r>
+              <a:rPr lang="de-DE" sz="1800" b="1" dirty="0"/>
+              <a:t>durchgemachte Nächte</a:t>
+            </a:r>
+            <a:endParaRPr lang="de-DE" sz="3600" b="1" dirty="0"/>
+          </a:p>
+        </p:txBody>
+      </p:sp>
+      <p:sp>
+        <p:nvSpPr>
+          <p:cNvPr id="7" name="Inhaltsplatzhalter 2"/>
+          <p:cNvSpPr txBox="1">
+            <a:spLocks/>
+          </p:cNvSpPr>
+          <p:nvPr/>
+        </p:nvSpPr>
+        <p:spPr>
+          <a:xfrm>
+            <a:off x="4049477" y="2613601"/>
+            <a:ext cx="2875547" cy="1164316"/>
+          </a:xfrm>
+          <a:prstGeom prst="rect">
+            <a:avLst/>
+          </a:prstGeom>
+        </p:spPr>
+        <p:txBody>
+          <a:bodyPr vert="horz" lIns="91440" tIns="45720" rIns="91440" bIns="45720" rtlCol="0">
+            <a:normAutofit/>
+          </a:bodyPr>
+          <a:lstStyle>
+            <a:lvl1pPr marL="228600" indent="-228600" algn="l" defTabSz="914400" rtl="0" eaLnBrk="1" latinLnBrk="0" hangingPunct="1">
+              <a:lnSpc>
+                <a:spcPct val="90000"/>
+              </a:lnSpc>
+              <a:spcBef>
+                <a:spcPts val="1000"/>
+              </a:spcBef>
+              <a:buFont typeface="Arial" panose="020B0604020202020204" pitchFamily="34" charset="0"/>
+              <a:buChar char="•"/>
+              <a:defRPr sz="2400" kern="1200">
+                <a:solidFill>
+                  <a:schemeClr val="tx1"/>
+                </a:solidFill>
+                <a:latin typeface="+mn-lt"/>
+                <a:ea typeface="+mn-ea"/>
+                <a:cs typeface="+mn-cs"/>
+              </a:defRPr>
+            </a:lvl1pPr>
+            <a:lvl2pPr marL="685800" indent="-228600" algn="l" defTabSz="914400" rtl="0" eaLnBrk="1" latinLnBrk="0" hangingPunct="1">
+              <a:lnSpc>
+                <a:spcPct val="90000"/>
+              </a:lnSpc>
+              <a:spcBef>
+                <a:spcPts val="500"/>
+              </a:spcBef>
+              <a:buFont typeface="Arial" panose="020B0604020202020204" pitchFamily="34" charset="0"/>
+              <a:buChar char="•"/>
+              <a:defRPr sz="2000" kern="1200">
+                <a:solidFill>
+                  <a:schemeClr val="tx1"/>
+                </a:solidFill>
+                <a:latin typeface="+mn-lt"/>
+                <a:ea typeface="+mn-ea"/>
+                <a:cs typeface="+mn-cs"/>
+              </a:defRPr>
+            </a:lvl2pPr>
+            <a:lvl3pPr marL="1143000" indent="-228600" algn="l" defTabSz="914400" rtl="0" eaLnBrk="1" latinLnBrk="0" hangingPunct="1">
+              <a:lnSpc>
+                <a:spcPct val="90000"/>
+              </a:lnSpc>
+              <a:spcBef>
+                <a:spcPts val="500"/>
+              </a:spcBef>
+              <a:buFont typeface="Arial" panose="020B0604020202020204" pitchFamily="34" charset="0"/>
+              <a:buChar char="•"/>
+              <a:defRPr sz="1800" kern="1200">
+                <a:solidFill>
+                  <a:schemeClr val="tx1"/>
+                </a:solidFill>
+                <a:latin typeface="+mn-lt"/>
+                <a:ea typeface="+mn-ea"/>
+                <a:cs typeface="+mn-cs"/>
+              </a:defRPr>
+            </a:lvl3pPr>
+            <a:lvl4pPr marL="1600200" indent="-228600" algn="l" defTabSz="914400" rtl="0" eaLnBrk="1" latinLnBrk="0" hangingPunct="1">
+              <a:lnSpc>
+                <a:spcPct val="90000"/>
+              </a:lnSpc>
+              <a:spcBef>
+                <a:spcPts val="500"/>
+              </a:spcBef>
+              <a:buFont typeface="Arial" panose="020B0604020202020204" pitchFamily="34" charset="0"/>
+              <a:buChar char="•"/>
+              <a:defRPr sz="1600" kern="1200">
+                <a:solidFill>
+                  <a:schemeClr val="tx1"/>
+                </a:solidFill>
+                <a:latin typeface="+mn-lt"/>
+                <a:ea typeface="+mn-ea"/>
+                <a:cs typeface="+mn-cs"/>
+              </a:defRPr>
+            </a:lvl4pPr>
+            <a:lvl5pPr marL="2057400" indent="-228600" algn="l" defTabSz="914400" rtl="0" eaLnBrk="1" latinLnBrk="0" hangingPunct="1">
+              <a:lnSpc>
+                <a:spcPct val="90000"/>
+              </a:lnSpc>
+              <a:spcBef>
+                <a:spcPts val="500"/>
+              </a:spcBef>
+              <a:buFont typeface="Arial" panose="020B0604020202020204" pitchFamily="34" charset="0"/>
+              <a:buChar char="•"/>
+              <a:defRPr sz="1600" kern="1200">
+                <a:solidFill>
+                  <a:schemeClr val="tx1"/>
+                </a:solidFill>
+                <a:latin typeface="+mn-lt"/>
+                <a:ea typeface="+mn-ea"/>
+                <a:cs typeface="+mn-cs"/>
+              </a:defRPr>
+            </a:lvl5pPr>
+            <a:lvl6pPr marL="2514600" indent="-228600" algn="l" defTabSz="914400" rtl="0" eaLnBrk="1" latinLnBrk="0" hangingPunct="1">
+              <a:lnSpc>
+                <a:spcPct val="90000"/>
+              </a:lnSpc>
+              <a:spcBef>
+                <a:spcPts val="500"/>
+              </a:spcBef>
+              <a:buFont typeface="Arial" panose="020B0604020202020204" pitchFamily="34" charset="0"/>
+              <a:buChar char="•"/>
+              <a:defRPr sz="1400" kern="1200">
+                <a:solidFill>
+                  <a:schemeClr val="tx1"/>
+                </a:solidFill>
+                <a:latin typeface="+mn-lt"/>
+                <a:ea typeface="+mn-ea"/>
+                <a:cs typeface="+mn-cs"/>
+              </a:defRPr>
+            </a:lvl6pPr>
+            <a:lvl7pPr marL="2971800" indent="-228600" algn="l" defTabSz="914400" rtl="0" eaLnBrk="1" latinLnBrk="0" hangingPunct="1">
+              <a:lnSpc>
+                <a:spcPct val="90000"/>
+              </a:lnSpc>
+              <a:spcBef>
+                <a:spcPts val="500"/>
+              </a:spcBef>
+              <a:buFont typeface="Arial" panose="020B0604020202020204" pitchFamily="34" charset="0"/>
+              <a:buChar char="•"/>
+              <a:defRPr sz="1400" kern="1200">
+                <a:solidFill>
+                  <a:schemeClr val="tx1"/>
+                </a:solidFill>
+                <a:latin typeface="+mn-lt"/>
+                <a:ea typeface="+mn-ea"/>
+                <a:cs typeface="+mn-cs"/>
+              </a:defRPr>
+            </a:lvl7pPr>
+            <a:lvl8pPr marL="3429000" indent="-228600" algn="l" defTabSz="914400" rtl="0" eaLnBrk="1" latinLnBrk="0" hangingPunct="1">
+              <a:lnSpc>
+                <a:spcPct val="90000"/>
+              </a:lnSpc>
+              <a:spcBef>
+                <a:spcPts val="500"/>
+              </a:spcBef>
+              <a:buFont typeface="Arial" panose="020B0604020202020204" pitchFamily="34" charset="0"/>
+              <a:buChar char="•"/>
+              <a:defRPr sz="1400" kern="1200">
+                <a:solidFill>
+                  <a:schemeClr val="tx1"/>
+                </a:solidFill>
+                <a:latin typeface="+mn-lt"/>
+                <a:ea typeface="+mn-ea"/>
+                <a:cs typeface="+mn-cs"/>
+              </a:defRPr>
+            </a:lvl8pPr>
+            <a:lvl9pPr marL="3886200" indent="-228600" algn="l" defTabSz="914400" rtl="0" eaLnBrk="1" latinLnBrk="0" hangingPunct="1">
+              <a:lnSpc>
+                <a:spcPct val="90000"/>
+              </a:lnSpc>
+              <a:spcBef>
+                <a:spcPts val="500"/>
+              </a:spcBef>
+              <a:buFont typeface="Arial" panose="020B0604020202020204" pitchFamily="34" charset="0"/>
+              <a:buChar char="•"/>
+              <a:defRPr sz="1400" kern="1200">
+                <a:solidFill>
+                  <a:schemeClr val="tx1"/>
+                </a:solidFill>
+                <a:latin typeface="+mn-lt"/>
+                <a:ea typeface="+mn-ea"/>
+                <a:cs typeface="+mn-cs"/>
+              </a:defRPr>
+            </a:lvl9pPr>
+          </a:lstStyle>
+          <a:p>
+            <a:pPr marL="0" indent="0" algn="ctr">
+              <a:buFont typeface="Arial" panose="020B0604020202020204" pitchFamily="34" charset="0"/>
+              <a:buNone/>
+            </a:pPr>
+            <a:r>
+              <a:rPr lang="de-DE" sz="4800" b="1" dirty="0"/>
+              <a:t>&gt;1.400</a:t>
+            </a:r>
+            <a:br>
+              <a:rPr lang="de-DE" sz="3600" b="1" dirty="0"/>
+            </a:br>
+            <a:r>
+              <a:rPr lang="de-DE" sz="1800" b="1" dirty="0" err="1"/>
+              <a:t>Commits</a:t>
+            </a:r>
+            <a:endParaRPr lang="de-DE" sz="3600" b="1" dirty="0"/>
+          </a:p>
+        </p:txBody>
+      </p:sp>
+      <p:sp>
+        <p:nvSpPr>
+          <p:cNvPr id="8" name="Inhaltsplatzhalter 2"/>
+          <p:cNvSpPr txBox="1">
+            <a:spLocks/>
+          </p:cNvSpPr>
+          <p:nvPr/>
+        </p:nvSpPr>
+        <p:spPr>
+          <a:xfrm>
+            <a:off x="8002702" y="2613601"/>
+            <a:ext cx="2875547" cy="1164316"/>
+          </a:xfrm>
+          <a:prstGeom prst="rect">
+            <a:avLst/>
+          </a:prstGeom>
+        </p:spPr>
+        <p:txBody>
+          <a:bodyPr vert="horz" lIns="91440" tIns="45720" rIns="91440" bIns="45720" rtlCol="0">
+            <a:normAutofit/>
+          </a:bodyPr>
+          <a:lstStyle>
+            <a:lvl1pPr marL="228600" indent="-228600" algn="l" defTabSz="914400" rtl="0" eaLnBrk="1" latinLnBrk="0" hangingPunct="1">
+              <a:lnSpc>
+                <a:spcPct val="90000"/>
+              </a:lnSpc>
+              <a:spcBef>
+                <a:spcPts val="1000"/>
+              </a:spcBef>
+              <a:buFont typeface="Arial" panose="020B0604020202020204" pitchFamily="34" charset="0"/>
+              <a:buChar char="•"/>
+              <a:defRPr sz="2400" kern="1200">
+                <a:solidFill>
+                  <a:schemeClr val="tx1"/>
+                </a:solidFill>
+                <a:latin typeface="+mn-lt"/>
+                <a:ea typeface="+mn-ea"/>
+                <a:cs typeface="+mn-cs"/>
+              </a:defRPr>
+            </a:lvl1pPr>
+            <a:lvl2pPr marL="685800" indent="-228600" algn="l" defTabSz="914400" rtl="0" eaLnBrk="1" latinLnBrk="0" hangingPunct="1">
+              <a:lnSpc>
+                <a:spcPct val="90000"/>
+              </a:lnSpc>
+              <a:spcBef>
+                <a:spcPts val="500"/>
+              </a:spcBef>
+              <a:buFont typeface="Arial" panose="020B0604020202020204" pitchFamily="34" charset="0"/>
+              <a:buChar char="•"/>
+              <a:defRPr sz="2000" kern="1200">
+                <a:solidFill>
+                  <a:schemeClr val="tx1"/>
+                </a:solidFill>
+                <a:latin typeface="+mn-lt"/>
+                <a:ea typeface="+mn-ea"/>
+                <a:cs typeface="+mn-cs"/>
+              </a:defRPr>
+            </a:lvl2pPr>
+            <a:lvl3pPr marL="1143000" indent="-228600" algn="l" defTabSz="914400" rtl="0" eaLnBrk="1" latinLnBrk="0" hangingPunct="1">
+              <a:lnSpc>
+                <a:spcPct val="90000"/>
+              </a:lnSpc>
+              <a:spcBef>
+                <a:spcPts val="500"/>
+              </a:spcBef>
+              <a:buFont typeface="Arial" panose="020B0604020202020204" pitchFamily="34" charset="0"/>
+              <a:buChar char="•"/>
+              <a:defRPr sz="1800" kern="1200">
+                <a:solidFill>
+                  <a:schemeClr val="tx1"/>
+                </a:solidFill>
+                <a:latin typeface="+mn-lt"/>
+                <a:ea typeface="+mn-ea"/>
+                <a:cs typeface="+mn-cs"/>
+              </a:defRPr>
+            </a:lvl3pPr>
+            <a:lvl4pPr marL="1600200" indent="-228600" algn="l" defTabSz="914400" rtl="0" eaLnBrk="1" latinLnBrk="0" hangingPunct="1">
+              <a:lnSpc>
+                <a:spcPct val="90000"/>
+              </a:lnSpc>
+              <a:spcBef>
+                <a:spcPts val="500"/>
+              </a:spcBef>
+              <a:buFont typeface="Arial" panose="020B0604020202020204" pitchFamily="34" charset="0"/>
+              <a:buChar char="•"/>
+              <a:defRPr sz="1600" kern="1200">
+                <a:solidFill>
+                  <a:schemeClr val="tx1"/>
+                </a:solidFill>
+                <a:latin typeface="+mn-lt"/>
+                <a:ea typeface="+mn-ea"/>
+                <a:cs typeface="+mn-cs"/>
+              </a:defRPr>
+            </a:lvl4pPr>
+            <a:lvl5pPr marL="2057400" indent="-228600" algn="l" defTabSz="914400" rtl="0" eaLnBrk="1" latinLnBrk="0" hangingPunct="1">
+              <a:lnSpc>
+                <a:spcPct val="90000"/>
+              </a:lnSpc>
+              <a:spcBef>
+                <a:spcPts val="500"/>
+              </a:spcBef>
+              <a:buFont typeface="Arial" panose="020B0604020202020204" pitchFamily="34" charset="0"/>
+              <a:buChar char="•"/>
+              <a:defRPr sz="1600" kern="1200">
+                <a:solidFill>
+                  <a:schemeClr val="tx1"/>
+                </a:solidFill>
+                <a:latin typeface="+mn-lt"/>
+                <a:ea typeface="+mn-ea"/>
+                <a:cs typeface="+mn-cs"/>
+              </a:defRPr>
+            </a:lvl5pPr>
+            <a:lvl6pPr marL="2514600" indent="-228600" algn="l" defTabSz="914400" rtl="0" eaLnBrk="1" latinLnBrk="0" hangingPunct="1">
+              <a:lnSpc>
+                <a:spcPct val="90000"/>
+              </a:lnSpc>
+              <a:spcBef>
+                <a:spcPts val="500"/>
+              </a:spcBef>
+              <a:buFont typeface="Arial" panose="020B0604020202020204" pitchFamily="34" charset="0"/>
+              <a:buChar char="•"/>
+              <a:defRPr sz="1400" kern="1200">
+                <a:solidFill>
+                  <a:schemeClr val="tx1"/>
+                </a:solidFill>
+                <a:latin typeface="+mn-lt"/>
+                <a:ea typeface="+mn-ea"/>
+                <a:cs typeface="+mn-cs"/>
+              </a:defRPr>
+            </a:lvl6pPr>
+            <a:lvl7pPr marL="2971800" indent="-228600" algn="l" defTabSz="914400" rtl="0" eaLnBrk="1" latinLnBrk="0" hangingPunct="1">
+              <a:lnSpc>
+                <a:spcPct val="90000"/>
+              </a:lnSpc>
+              <a:spcBef>
+                <a:spcPts val="500"/>
+              </a:spcBef>
+              <a:buFont typeface="Arial" panose="020B0604020202020204" pitchFamily="34" charset="0"/>
+              <a:buChar char="•"/>
+              <a:defRPr sz="1400" kern="1200">
+                <a:solidFill>
+                  <a:schemeClr val="tx1"/>
+                </a:solidFill>
+                <a:latin typeface="+mn-lt"/>
+                <a:ea typeface="+mn-ea"/>
+                <a:cs typeface="+mn-cs"/>
+              </a:defRPr>
+            </a:lvl7pPr>
+            <a:lvl8pPr marL="3429000" indent="-228600" algn="l" defTabSz="914400" rtl="0" eaLnBrk="1" latinLnBrk="0" hangingPunct="1">
+              <a:lnSpc>
+                <a:spcPct val="90000"/>
+              </a:lnSpc>
+              <a:spcBef>
+                <a:spcPts val="500"/>
+              </a:spcBef>
+              <a:buFont typeface="Arial" panose="020B0604020202020204" pitchFamily="34" charset="0"/>
+              <a:buChar char="•"/>
+              <a:defRPr sz="1400" kern="1200">
+                <a:solidFill>
+                  <a:schemeClr val="tx1"/>
+                </a:solidFill>
+                <a:latin typeface="+mn-lt"/>
+                <a:ea typeface="+mn-ea"/>
+                <a:cs typeface="+mn-cs"/>
+              </a:defRPr>
+            </a:lvl8pPr>
+            <a:lvl9pPr marL="3886200" indent="-228600" algn="l" defTabSz="914400" rtl="0" eaLnBrk="1" latinLnBrk="0" hangingPunct="1">
+              <a:lnSpc>
+                <a:spcPct val="90000"/>
+              </a:lnSpc>
+              <a:spcBef>
+                <a:spcPts val="500"/>
+              </a:spcBef>
+              <a:buFont typeface="Arial" panose="020B0604020202020204" pitchFamily="34" charset="0"/>
+              <a:buChar char="•"/>
+              <a:defRPr sz="1400" kern="1200">
+                <a:solidFill>
+                  <a:schemeClr val="tx1"/>
+                </a:solidFill>
+                <a:latin typeface="+mn-lt"/>
+                <a:ea typeface="+mn-ea"/>
+                <a:cs typeface="+mn-cs"/>
+              </a:defRPr>
+            </a:lvl9pPr>
+          </a:lstStyle>
+          <a:p>
+            <a:pPr marL="0" indent="0" algn="ctr">
+              <a:buFont typeface="Arial" panose="020B0604020202020204" pitchFamily="34" charset="0"/>
+              <a:buNone/>
+            </a:pPr>
+            <a:r>
+              <a:rPr lang="de-DE" sz="4800" b="1" dirty="0"/>
+              <a:t>&gt;220</a:t>
+            </a:r>
+            <a:br>
+              <a:rPr lang="de-DE" sz="3600" b="1" dirty="0"/>
+            </a:br>
+            <a:r>
+              <a:rPr lang="de-DE" sz="1800" b="1" dirty="0"/>
+              <a:t>Seiten Dokumentation</a:t>
+            </a:r>
+            <a:endParaRPr lang="de-DE" sz="3600" b="1" dirty="0"/>
+          </a:p>
+        </p:txBody>
+      </p:sp>
+    </p:spTree>
+    <p:extLst>
+      <p:ext uri="{BB962C8B-B14F-4D97-AF65-F5344CB8AC3E}">
+        <p14:creationId xmlns:p14="http://schemas.microsoft.com/office/powerpoint/2010/main" val="3463086847"/>
+      </p:ext>
+    </p:extLst>
+  </p:cSld>
+  <p:clrMapOvr>
+    <a:masterClrMapping/>
+  </p:clrMapOvr>
 </p:sld>
 </file>
 

</xml_diff>

<commit_message>
Added LOC-calculation and revolutionized presentation.
</commit_message>
<xml_diff>
--- a/Abschlusspräsentation/Praesentation_newdesign.pptx
+++ b/Abschlusspräsentation/Praesentation_newdesign.pptx
@@ -221,7 +221,7 @@
           <a:p>
             <a:fld id="{74D74940-F9E6-439C-A55C-AF525C59EADC}" type="datetimeFigureOut">
               <a:rPr lang="de-DE" smtClean="0"/>
-              <a:t>19.03.2017</a:t>
+              <a:t>20.03.2017</a:t>
             </a:fld>
             <a:endParaRPr lang="de-DE"/>
           </a:p>
@@ -828,6 +828,16 @@
             </a:pPr>
             <a:r>
               <a:rPr lang="de-DE" dirty="0"/>
+              <a:t>Zunächst Ideensammlung</a:t>
+            </a:r>
+          </a:p>
+          <a:p>
+            <a:pPr marL="171450" indent="-171450">
+              <a:buFont typeface="Arial" panose="020B0604020202020204" pitchFamily="34" charset="0"/>
+              <a:buChar char="•"/>
+            </a:pPr>
+            <a:r>
+              <a:rPr lang="de-DE" dirty="0"/>
               <a:t>Ziele:</a:t>
             </a:r>
           </a:p>
@@ -1507,6 +1517,101 @@
           <a:bodyPr/>
           <a:lstStyle/>
           <a:p>
+            <a:r>
+              <a:rPr lang="de-DE" dirty="0"/>
+              <a:t>Alle geben einen Wert aus dem </a:t>
+            </a:r>
+            <a:r>
+              <a:rPr lang="de-DE" dirty="0" err="1"/>
+              <a:t>Interval</a:t>
+            </a:r>
+            <a:r>
+              <a:rPr lang="de-DE" dirty="0"/>
+              <a:t> [0,1] zurück</a:t>
+            </a:r>
+          </a:p>
+        </p:txBody>
+      </p:sp>
+      <p:sp>
+        <p:nvSpPr>
+          <p:cNvPr id="4" name="Foliennummernplatzhalter 3"/>
+          <p:cNvSpPr>
+            <a:spLocks noGrp="1"/>
+          </p:cNvSpPr>
+          <p:nvPr>
+            <p:ph type="sldNum" sz="quarter" idx="10"/>
+          </p:nvPr>
+        </p:nvSpPr>
+        <p:spPr/>
+        <p:txBody>
+          <a:bodyPr/>
+          <a:lstStyle/>
+          <a:p>
+            <a:fld id="{10623EF1-A4FE-4F69-895D-EDE1FA958D12}" type="slidenum">
+              <a:rPr lang="de-DE" smtClean="0"/>
+              <a:t>7</a:t>
+            </a:fld>
+            <a:endParaRPr lang="de-DE"/>
+          </a:p>
+        </p:txBody>
+      </p:sp>
+    </p:spTree>
+    <p:extLst>
+      <p:ext uri="{BB962C8B-B14F-4D97-AF65-F5344CB8AC3E}">
+        <p14:creationId xmlns:p14="http://schemas.microsoft.com/office/powerpoint/2010/main" val="1278445858"/>
+      </p:ext>
+    </p:extLst>
+  </p:cSld>
+  <p:clrMapOvr>
+    <a:masterClrMapping/>
+  </p:clrMapOvr>
+</p:notes>
+</file>
+
+<file path=ppt/notesSlides/notesSlide7.xml><?xml version="1.0" encoding="utf-8"?>
+<p:notes xmlns:a="http://schemas.openxmlformats.org/drawingml/2006/main" xmlns:r="http://schemas.openxmlformats.org/officeDocument/2006/relationships" xmlns:p="http://schemas.openxmlformats.org/presentationml/2006/main">
+  <p:cSld>
+    <p:spTree>
+      <p:nvGrpSpPr>
+        <p:cNvPr id="1" name=""/>
+        <p:cNvGrpSpPr/>
+        <p:nvPr/>
+      </p:nvGrpSpPr>
+      <p:grpSpPr>
+        <a:xfrm>
+          <a:off x="0" y="0"/>
+          <a:ext cx="0" cy="0"/>
+          <a:chOff x="0" y="0"/>
+          <a:chExt cx="0" cy="0"/>
+        </a:xfrm>
+      </p:grpSpPr>
+      <p:sp>
+        <p:nvSpPr>
+          <p:cNvPr id="2" name="Folienbildplatzhalter 1"/>
+          <p:cNvSpPr>
+            <a:spLocks noGrp="1" noRot="1" noChangeAspect="1"/>
+          </p:cNvSpPr>
+          <p:nvPr>
+            <p:ph type="sldImg"/>
+          </p:nvPr>
+        </p:nvSpPr>
+        <p:spPr/>
+      </p:sp>
+      <p:sp>
+        <p:nvSpPr>
+          <p:cNvPr id="3" name="Notizenplatzhalter 2"/>
+          <p:cNvSpPr>
+            <a:spLocks noGrp="1"/>
+          </p:cNvSpPr>
+          <p:nvPr>
+            <p:ph type="body" idx="1"/>
+          </p:nvPr>
+        </p:nvSpPr>
+        <p:spPr/>
+        <p:txBody>
+          <a:bodyPr/>
+          <a:lstStyle/>
+          <a:p>
             <a:pPr marL="171450" indent="-171450">
               <a:buFont typeface="Arial" panose="020B0604020202020204" pitchFamily="34" charset="0"/>
               <a:buChar char="•"/>
@@ -1619,7 +1724,7 @@
 </p:notes>
 </file>
 
-<file path=ppt/notesSlides/notesSlide7.xml><?xml version="1.0" encoding="utf-8"?>
+<file path=ppt/notesSlides/notesSlide8.xml><?xml version="1.0" encoding="utf-8"?>
 <p:notes xmlns:a="http://schemas.openxmlformats.org/drawingml/2006/main" xmlns:r="http://schemas.openxmlformats.org/officeDocument/2006/relationships" xmlns:p="http://schemas.openxmlformats.org/presentationml/2006/main">
   <p:cSld>
     <p:spTree>
@@ -2039,7 +2144,7 @@
           <a:p>
             <a:fld id="{78ABE3C1-DBE1-495D-B57B-2849774B866A}" type="datetimeFigureOut">
               <a:rPr lang="en-US" dirty="0"/>
-              <a:t>3/19/2017</a:t>
+              <a:t>3/20/2017</a:t>
             </a:fld>
             <a:endParaRPr lang="en-US" dirty="0"/>
           </a:p>
@@ -2448,7 +2553,7 @@
           <a:p>
             <a:fld id="{446C117F-5CCF-4837-BE5F-2B92066CAFAF}" type="datetimeFigureOut">
               <a:rPr lang="en-US" dirty="0"/>
-              <a:t>3/19/2017</a:t>
+              <a:t>3/20/2017</a:t>
             </a:fld>
             <a:endParaRPr lang="en-US" dirty="0"/>
           </a:p>
@@ -2779,7 +2884,7 @@
           <a:p>
             <a:fld id="{84EB90BD-B6CE-46B7-997F-7313B992CCDC}" type="datetimeFigureOut">
               <a:rPr lang="en-US" dirty="0"/>
-              <a:t>3/19/2017</a:t>
+              <a:t>3/20/2017</a:t>
             </a:fld>
             <a:endParaRPr lang="en-US" dirty="0"/>
           </a:p>
@@ -3179,7 +3284,7 @@
           <a:p>
             <a:fld id="{CDB9D11F-B188-461D-B23F-39381795C052}" type="datetimeFigureOut">
               <a:rPr lang="en-US" dirty="0"/>
-              <a:t>3/19/2017</a:t>
+              <a:t>3/20/2017</a:t>
             </a:fld>
             <a:endParaRPr lang="en-US" dirty="0"/>
           </a:p>
@@ -3742,7 +3847,7 @@
           <a:p>
             <a:fld id="{52E6D8D9-55A2-4063-B0F3-121F44549695}" type="datetimeFigureOut">
               <a:rPr lang="en-US" dirty="0"/>
-              <a:t>3/19/2017</a:t>
+              <a:t>3/20/2017</a:t>
             </a:fld>
             <a:endParaRPr lang="en-US" dirty="0"/>
           </a:p>
@@ -4418,7 +4523,7 @@
           <a:p>
             <a:fld id="{D4B24536-994D-4021-A283-9F449C0DB509}" type="datetimeFigureOut">
               <a:rPr lang="en-US" dirty="0"/>
-              <a:t>3/19/2017</a:t>
+              <a:t>3/20/2017</a:t>
             </a:fld>
             <a:endParaRPr lang="en-US" dirty="0"/>
           </a:p>
@@ -5326,7 +5431,7 @@
           <a:p>
             <a:fld id="{3CBBBB78-C96F-47B7-AB17-D852CA960AC9}" type="datetimeFigureOut">
               <a:rPr lang="en-US" dirty="0"/>
-              <a:t>3/19/2017</a:t>
+              <a:t>3/20/2017</a:t>
             </a:fld>
             <a:endParaRPr lang="en-US" dirty="0"/>
           </a:p>
@@ -5634,7 +5739,7 @@
           <a:p>
             <a:fld id="{1FA3F48C-C7C6-4055-9F49-3777875E72AE}" type="datetimeFigureOut">
               <a:rPr lang="en-US" dirty="0"/>
-              <a:t>3/19/2017</a:t>
+              <a:t>3/20/2017</a:t>
             </a:fld>
             <a:endParaRPr lang="en-US" dirty="0"/>
           </a:p>
@@ -5893,7 +5998,7 @@
           <a:p>
             <a:fld id="{6178E61D-D431-422C-9764-11DAFE33AB63}" type="datetimeFigureOut">
               <a:rPr lang="en-US" dirty="0"/>
-              <a:t>3/19/2017</a:t>
+              <a:t>3/20/2017</a:t>
             </a:fld>
             <a:endParaRPr lang="en-US" dirty="0"/>
           </a:p>
@@ -6212,7 +6317,7 @@
           <a:p>
             <a:fld id="{12DE42F4-6EEF-4EF7-8ED4-2208F0F89A08}" type="datetimeFigureOut">
               <a:rPr lang="en-US" dirty="0"/>
-              <a:t>3/19/2017</a:t>
+              <a:t>3/20/2017</a:t>
             </a:fld>
             <a:endParaRPr lang="en-US" dirty="0"/>
           </a:p>
@@ -6596,7 +6701,7 @@
           <a:p>
             <a:fld id="{30578ACC-22D6-47C1-A373-4FD133E34F3C}" type="datetimeFigureOut">
               <a:rPr lang="en-US" dirty="0"/>
-              <a:t>3/19/2017</a:t>
+              <a:t>3/20/2017</a:t>
             </a:fld>
             <a:endParaRPr lang="en-US" dirty="0"/>
           </a:p>
@@ -6967,7 +7072,7 @@
           <a:p>
             <a:fld id="{4E5A6C69-6797-4E8A-BF37-F2C3751466E9}" type="datetimeFigureOut">
               <a:rPr lang="en-US" dirty="0"/>
-              <a:t>3/19/2017</a:t>
+              <a:t>3/20/2017</a:t>
             </a:fld>
             <a:endParaRPr lang="en-US" dirty="0"/>
           </a:p>
@@ -7468,7 +7573,7 @@
           <a:p>
             <a:fld id="{D82014A1-A632-4878-A0D3-F52BA7563730}" type="datetimeFigureOut">
               <a:rPr lang="en-US" dirty="0"/>
-              <a:t>3/19/2017</a:t>
+              <a:t>3/20/2017</a:t>
             </a:fld>
             <a:endParaRPr lang="en-US" dirty="0"/>
           </a:p>
@@ -7720,7 +7825,7 @@
           <a:p>
             <a:fld id="{CE99F462-093F-4566-844B-4C71F2739DA5}" type="datetimeFigureOut">
               <a:rPr lang="en-US" dirty="0"/>
-              <a:t>3/19/2017</a:t>
+              <a:t>3/20/2017</a:t>
             </a:fld>
             <a:endParaRPr lang="en-US" dirty="0"/>
           </a:p>
@@ -7878,7 +7983,7 @@
           <a:p>
             <a:fld id="{3D24A7AC-904D-4781-85BA-7D10C17ED021}" type="datetimeFigureOut">
               <a:rPr lang="en-US" dirty="0"/>
-              <a:t>3/19/2017</a:t>
+              <a:t>3/20/2017</a:t>
             </a:fld>
             <a:endParaRPr lang="en-US" dirty="0"/>
           </a:p>
@@ -8263,7 +8368,7 @@
           <a:p>
             <a:fld id="{E331444B-B92B-4E27-8C94-BB93EAF5CB18}" type="datetimeFigureOut">
               <a:rPr lang="en-US" dirty="0"/>
-              <a:t>3/19/2017</a:t>
+              <a:t>3/20/2017</a:t>
             </a:fld>
             <a:endParaRPr lang="en-US" dirty="0"/>
           </a:p>
@@ -8667,7 +8772,7 @@
           <a:p>
             <a:fld id="{363EFA5E-FA76-400D-B3DC-F0BA90E6D107}" type="datetimeFigureOut">
               <a:rPr lang="en-US" dirty="0"/>
-              <a:t>3/19/2017</a:t>
+              <a:t>3/20/2017</a:t>
             </a:fld>
             <a:endParaRPr lang="en-US" dirty="0"/>
           </a:p>
@@ -8929,7 +9034,7 @@
           <a:p>
             <a:fld id="{9D6E9DEC-419B-4CC5-A080-3B06BD5A8291}" type="datetimeFigureOut">
               <a:rPr lang="en-US" dirty="0"/>
-              <a:t>3/19/2017</a:t>
+              <a:t>3/20/2017</a:t>
             </a:fld>
             <a:endParaRPr lang="en-US" dirty="0"/>
           </a:p>
@@ -10568,950 +10673,773 @@
       </p:sp>
       <p:grpSp>
         <p:nvGrpSpPr>
-          <p:cNvPr id="83" name="Gruppierung 82"/>
+          <p:cNvPr id="24" name="Gruppieren 23"/>
           <p:cNvGrpSpPr/>
           <p:nvPr/>
         </p:nvGrpSpPr>
         <p:grpSpPr>
           <a:xfrm>
-            <a:off x="757457" y="3024994"/>
-            <a:ext cx="10110409" cy="3413902"/>
-            <a:chOff x="757457" y="3024994"/>
-            <a:chExt cx="10110409" cy="3413902"/>
-          </a:xfrm>
-          <a:effectLst>
-            <a:outerShdw blurRad="50800" dist="38100" dir="2700000" algn="tl" rotWithShape="0">
-              <a:prstClr val="black">
-                <a:alpha val="40000"/>
-              </a:prstClr>
-            </a:outerShdw>
-          </a:effectLst>
+            <a:off x="808669" y="3024994"/>
+            <a:ext cx="10059197" cy="3413902"/>
+            <a:chOff x="808669" y="3024994"/>
+            <a:chExt cx="10059197" cy="3413902"/>
+          </a:xfrm>
         </p:grpSpPr>
-        <p:grpSp>
-          <p:nvGrpSpPr>
-            <p:cNvPr id="58" name="Gruppierung 57"/>
-            <p:cNvGrpSpPr/>
+        <p:sp>
+          <p:nvSpPr>
+            <p:cNvPr id="4" name="Rechteck 3"/>
+            <p:cNvSpPr/>
             <p:nvPr/>
-          </p:nvGrpSpPr>
-          <p:grpSpPr>
+          </p:nvSpPr>
+          <p:spPr>
             <a:xfrm>
-              <a:off x="2600787" y="3024994"/>
-              <a:ext cx="8267079" cy="3413902"/>
-              <a:chOff x="1371596" y="3024994"/>
-              <a:chExt cx="8994196" cy="3599316"/>
+              <a:off x="2600787" y="4983014"/>
+              <a:ext cx="2406823" cy="519241"/>
             </a:xfrm>
-            <a:effectLst/>
-          </p:grpSpPr>
-          <p:sp>
-            <p:nvSpPr>
-              <p:cNvPr id="4" name="Rechteck 3"/>
-              <p:cNvSpPr/>
-              <p:nvPr/>
-            </p:nvSpPr>
-            <p:spPr>
-              <a:xfrm>
-                <a:off x="1371596" y="5089357"/>
-                <a:ext cx="2618511" cy="547442"/>
-              </a:xfrm>
-              <a:prstGeom prst="rect">
-                <a:avLst/>
-              </a:prstGeom>
-              <a:gradFill flip="none" rotWithShape="1">
-                <a:gsLst>
-                  <a:gs pos="0">
-                    <a:schemeClr val="accent1">
-                      <a:lumMod val="67000"/>
-                    </a:schemeClr>
-                  </a:gs>
-                  <a:gs pos="48000">
-                    <a:schemeClr val="accent1">
-                      <a:lumMod val="97000"/>
-                      <a:lumOff val="3000"/>
-                    </a:schemeClr>
-                  </a:gs>
-                  <a:gs pos="100000">
-                    <a:schemeClr val="accent1">
-                      <a:lumMod val="60000"/>
-                      <a:lumOff val="40000"/>
-                    </a:schemeClr>
-                  </a:gs>
-                </a:gsLst>
-                <a:lin ang="16200000" scaled="1"/>
-                <a:tileRect/>
-              </a:gradFill>
-            </p:spPr>
-            <p:style>
-              <a:lnRef idx="2">
-                <a:schemeClr val="accent1">
-                  <a:shade val="50000"/>
-                </a:schemeClr>
-              </a:lnRef>
-              <a:fillRef idx="1">
-                <a:schemeClr val="accent1"/>
-              </a:fillRef>
-              <a:effectRef idx="0">
-                <a:schemeClr val="accent1"/>
-              </a:effectRef>
-              <a:fontRef idx="minor">
-                <a:schemeClr val="lt1"/>
-              </a:fontRef>
-            </p:style>
-            <p:txBody>
-              <a:bodyPr rtlCol="0" anchor="ctr"/>
-              <a:lstStyle/>
-              <a:p>
-                <a:pPr algn="ctr"/>
-                <a:r>
-                  <a:rPr lang="de-DE" dirty="0">
-                    <a:solidFill>
-                      <a:schemeClr val="tx2"/>
-                    </a:solidFill>
-                  </a:rPr>
-                  <a:t>ECTS Standard Deviation</a:t>
-                </a:r>
-              </a:p>
-            </p:txBody>
-          </p:sp>
-          <p:sp>
-            <p:nvSpPr>
-              <p:cNvPr id="5" name="Rechteck 4"/>
-              <p:cNvSpPr/>
-              <p:nvPr/>
-            </p:nvSpPr>
-            <p:spPr>
-              <a:xfrm>
-                <a:off x="1371598" y="3024994"/>
-                <a:ext cx="2618511" cy="547442"/>
-              </a:xfrm>
-              <a:prstGeom prst="rect">
-                <a:avLst/>
-              </a:prstGeom>
-              <a:gradFill flip="none" rotWithShape="1">
-                <a:gsLst>
-                  <a:gs pos="0">
-                    <a:schemeClr val="accent1">
-                      <a:lumMod val="67000"/>
-                    </a:schemeClr>
-                  </a:gs>
-                  <a:gs pos="48000">
-                    <a:schemeClr val="accent1">
-                      <a:lumMod val="97000"/>
-                      <a:lumOff val="3000"/>
-                    </a:schemeClr>
-                  </a:gs>
-                  <a:gs pos="100000">
-                    <a:schemeClr val="accent1">
-                      <a:lumMod val="60000"/>
-                      <a:lumOff val="40000"/>
-                    </a:schemeClr>
-                  </a:gs>
-                </a:gsLst>
-                <a:lin ang="16200000" scaled="1"/>
-                <a:tileRect/>
-              </a:gradFill>
-            </p:spPr>
-            <p:style>
-              <a:lnRef idx="2">
-                <a:schemeClr val="accent1">
-                  <a:shade val="50000"/>
-                </a:schemeClr>
-              </a:lnRef>
-              <a:fillRef idx="1">
-                <a:schemeClr val="accent1"/>
-              </a:fillRef>
-              <a:effectRef idx="0">
-                <a:schemeClr val="accent1"/>
-              </a:effectRef>
-              <a:fontRef idx="minor">
-                <a:schemeClr val="lt1"/>
-              </a:fontRef>
-            </p:style>
-            <p:txBody>
-              <a:bodyPr rtlCol="0" anchor="ctr"/>
-              <a:lstStyle/>
-              <a:p>
-                <a:pPr algn="ctr"/>
-                <a:r>
-                  <a:rPr lang="de-DE" dirty="0">
-                    <a:solidFill>
-                      <a:schemeClr val="tx2"/>
-                    </a:solidFill>
-                  </a:rPr>
-                  <a:t>Minimal ECTS</a:t>
-                </a:r>
-              </a:p>
-            </p:txBody>
-          </p:sp>
-          <p:sp>
-            <p:nvSpPr>
-              <p:cNvPr id="6" name="Rechteck 5"/>
-              <p:cNvSpPr/>
-              <p:nvPr/>
-            </p:nvSpPr>
-            <p:spPr>
-              <a:xfrm>
-                <a:off x="1371598" y="3713115"/>
-                <a:ext cx="2618511" cy="547442"/>
-              </a:xfrm>
-              <a:prstGeom prst="rect">
-                <a:avLst/>
-              </a:prstGeom>
-              <a:gradFill flip="none" rotWithShape="1">
-                <a:gsLst>
-                  <a:gs pos="0">
-                    <a:schemeClr val="accent1">
-                      <a:lumMod val="67000"/>
-                    </a:schemeClr>
-                  </a:gs>
-                  <a:gs pos="48000">
-                    <a:schemeClr val="accent1">
-                      <a:lumMod val="97000"/>
-                      <a:lumOff val="3000"/>
-                    </a:schemeClr>
-                  </a:gs>
-                  <a:gs pos="100000">
-                    <a:schemeClr val="accent1">
-                      <a:lumMod val="60000"/>
-                      <a:lumOff val="40000"/>
-                    </a:schemeClr>
-                  </a:gs>
-                </a:gsLst>
-                <a:lin ang="16200000" scaled="1"/>
-                <a:tileRect/>
-              </a:gradFill>
-            </p:spPr>
-            <p:style>
-              <a:lnRef idx="2">
-                <a:schemeClr val="accent1">
-                  <a:shade val="50000"/>
-                </a:schemeClr>
-              </a:lnRef>
-              <a:fillRef idx="1">
-                <a:schemeClr val="accent1"/>
-              </a:fillRef>
-              <a:effectRef idx="0">
-                <a:schemeClr val="accent1"/>
-              </a:effectRef>
-              <a:fontRef idx="minor">
-                <a:schemeClr val="lt1"/>
-              </a:fontRef>
-            </p:style>
-            <p:txBody>
-              <a:bodyPr rtlCol="0" anchor="ctr"/>
-              <a:lstStyle/>
-              <a:p>
-                <a:pPr algn="ctr"/>
-                <a:r>
-                  <a:rPr lang="de-DE" dirty="0">
-                    <a:solidFill>
-                      <a:schemeClr val="tx2"/>
-                    </a:solidFill>
-                  </a:rPr>
-                  <a:t>Minimal Semester</a:t>
-                </a:r>
-              </a:p>
-            </p:txBody>
-          </p:sp>
-          <p:sp>
-            <p:nvSpPr>
-              <p:cNvPr id="7" name="Rechteck 6"/>
-              <p:cNvSpPr/>
-              <p:nvPr/>
-            </p:nvSpPr>
-            <p:spPr>
-              <a:xfrm>
-                <a:off x="1371597" y="4401236"/>
-                <a:ext cx="2618511" cy="547442"/>
-              </a:xfrm>
-              <a:prstGeom prst="rect">
-                <a:avLst/>
-              </a:prstGeom>
-              <a:gradFill flip="none" rotWithShape="1">
-                <a:gsLst>
-                  <a:gs pos="0">
-                    <a:schemeClr val="accent1">
-                      <a:lumMod val="67000"/>
-                    </a:schemeClr>
-                  </a:gs>
-                  <a:gs pos="48000">
-                    <a:schemeClr val="accent1">
-                      <a:lumMod val="97000"/>
-                      <a:lumOff val="3000"/>
-                    </a:schemeClr>
-                  </a:gs>
-                  <a:gs pos="100000">
-                    <a:schemeClr val="accent1">
-                      <a:lumMod val="60000"/>
-                      <a:lumOff val="40000"/>
-                    </a:schemeClr>
-                  </a:gs>
-                </a:gsLst>
-                <a:lin ang="16200000" scaled="1"/>
-                <a:tileRect/>
-              </a:gradFill>
-            </p:spPr>
-            <p:style>
-              <a:lnRef idx="2">
-                <a:schemeClr val="accent1">
-                  <a:shade val="50000"/>
-                </a:schemeClr>
-              </a:lnRef>
-              <a:fillRef idx="1">
-                <a:schemeClr val="accent1"/>
-              </a:fillRef>
-              <a:effectRef idx="0">
-                <a:schemeClr val="accent1"/>
-              </a:effectRef>
-              <a:fontRef idx="minor">
-                <a:schemeClr val="lt1"/>
-              </a:fontRef>
-            </p:style>
-            <p:txBody>
-              <a:bodyPr rtlCol="0" anchor="ctr"/>
-              <a:lstStyle/>
-              <a:p>
-                <a:pPr algn="ctr"/>
-                <a:r>
-                  <a:rPr lang="de-DE" dirty="0" err="1">
-                    <a:solidFill>
-                      <a:schemeClr val="tx2"/>
-                    </a:solidFill>
-                  </a:rPr>
-                  <a:t>Preferences</a:t>
-                </a:r>
-                <a:endParaRPr lang="de-DE" dirty="0">
+            <a:prstGeom prst="rect">
+              <a:avLst/>
+            </a:prstGeom>
+            <a:solidFill>
+              <a:schemeClr val="accent1"/>
+            </a:solidFill>
+          </p:spPr>
+          <p:style>
+            <a:lnRef idx="2">
+              <a:schemeClr val="accent1">
+                <a:shade val="50000"/>
+              </a:schemeClr>
+            </a:lnRef>
+            <a:fillRef idx="1">
+              <a:schemeClr val="accent1"/>
+            </a:fillRef>
+            <a:effectRef idx="0">
+              <a:schemeClr val="accent1"/>
+            </a:effectRef>
+            <a:fontRef idx="minor">
+              <a:schemeClr val="lt1"/>
+            </a:fontRef>
+          </p:style>
+          <p:txBody>
+            <a:bodyPr rtlCol="0" anchor="ctr"/>
+            <a:lstStyle/>
+            <a:p>
+              <a:pPr algn="ctr"/>
+              <a:r>
+                <a:rPr lang="de-DE" dirty="0">
                   <a:solidFill>
                     <a:schemeClr val="tx2"/>
                   </a:solidFill>
-                </a:endParaRPr>
-              </a:p>
-            </p:txBody>
-          </p:sp>
-          <p:sp>
-            <p:nvSpPr>
-              <p:cNvPr id="8" name="Rechteck 7"/>
-              <p:cNvSpPr/>
-              <p:nvPr/>
-            </p:nvSpPr>
-            <p:spPr>
-              <a:xfrm>
-                <a:off x="1371596" y="6051199"/>
-                <a:ext cx="2618511" cy="547442"/>
-              </a:xfrm>
-              <a:prstGeom prst="rect">
-                <a:avLst/>
-              </a:prstGeom>
-              <a:gradFill>
-                <a:gsLst>
-                  <a:gs pos="1000">
-                    <a:schemeClr val="accent3"/>
-                  </a:gs>
-                  <a:gs pos="87000">
-                    <a:schemeClr val="accent2">
-                      <a:lumMod val="97000"/>
-                      <a:lumOff val="3000"/>
-                    </a:schemeClr>
-                  </a:gs>
-                  <a:gs pos="100000">
-                    <a:schemeClr val="accent2">
-                      <a:lumMod val="60000"/>
-                      <a:lumOff val="40000"/>
-                    </a:schemeClr>
-                  </a:gs>
-                </a:gsLst>
-                <a:lin ang="16200000" scaled="1"/>
-              </a:gradFill>
-            </p:spPr>
-            <p:style>
-              <a:lnRef idx="2">
-                <a:schemeClr val="accent1">
-                  <a:shade val="50000"/>
-                </a:schemeClr>
-              </a:lnRef>
-              <a:fillRef idx="1">
-                <a:schemeClr val="accent1"/>
-              </a:fillRef>
-              <a:effectRef idx="0">
-                <a:schemeClr val="accent1"/>
-              </a:effectRef>
-              <a:fontRef idx="minor">
-                <a:schemeClr val="lt1"/>
-              </a:fontRef>
-            </p:style>
-            <p:txBody>
-              <a:bodyPr rtlCol="0" anchor="ctr"/>
-              <a:lstStyle/>
-              <a:p>
-                <a:pPr algn="ctr"/>
-                <a:r>
-                  <a:rPr lang="de-DE" dirty="0">
-                    <a:solidFill>
-                      <a:schemeClr val="accent1"/>
-                    </a:solidFill>
-                  </a:rPr>
-                  <a:t>User </a:t>
-                </a:r>
-                <a:r>
-                  <a:rPr lang="de-DE" dirty="0" err="1">
-                    <a:solidFill>
-                      <a:schemeClr val="accent1"/>
-                    </a:solidFill>
-                  </a:rPr>
-                  <a:t>Selection</a:t>
-                </a:r>
-                <a:endParaRPr lang="de-DE" dirty="0">
+                </a:rPr>
+                <a:t>ECTS Standard Deviation</a:t>
+              </a:r>
+            </a:p>
+          </p:txBody>
+        </p:sp>
+        <p:sp>
+          <p:nvSpPr>
+            <p:cNvPr id="5" name="Rechteck 4"/>
+            <p:cNvSpPr/>
+            <p:nvPr/>
+          </p:nvSpPr>
+          <p:spPr>
+            <a:xfrm>
+              <a:off x="2600789" y="3024994"/>
+              <a:ext cx="2406823" cy="519241"/>
+            </a:xfrm>
+            <a:prstGeom prst="rect">
+              <a:avLst/>
+            </a:prstGeom>
+            <a:solidFill>
+              <a:schemeClr val="accent1"/>
+            </a:solidFill>
+          </p:spPr>
+          <p:style>
+            <a:lnRef idx="2">
+              <a:schemeClr val="accent1">
+                <a:shade val="50000"/>
+              </a:schemeClr>
+            </a:lnRef>
+            <a:fillRef idx="1">
+              <a:schemeClr val="accent1"/>
+            </a:fillRef>
+            <a:effectRef idx="0">
+              <a:schemeClr val="accent1"/>
+            </a:effectRef>
+            <a:fontRef idx="minor">
+              <a:schemeClr val="lt1"/>
+            </a:fontRef>
+          </p:style>
+          <p:txBody>
+            <a:bodyPr rtlCol="0" anchor="ctr"/>
+            <a:lstStyle/>
+            <a:p>
+              <a:pPr algn="ctr"/>
+              <a:r>
+                <a:rPr lang="de-DE" dirty="0">
+                  <a:solidFill>
+                    <a:schemeClr val="tx2"/>
+                  </a:solidFill>
+                </a:rPr>
+                <a:t>Minimal ECTS</a:t>
+              </a:r>
+            </a:p>
+          </p:txBody>
+        </p:sp>
+        <p:sp>
+          <p:nvSpPr>
+            <p:cNvPr id="6" name="Rechteck 5"/>
+            <p:cNvSpPr/>
+            <p:nvPr/>
+          </p:nvSpPr>
+          <p:spPr>
+            <a:xfrm>
+              <a:off x="2600789" y="3677667"/>
+              <a:ext cx="2406823" cy="519241"/>
+            </a:xfrm>
+            <a:prstGeom prst="rect">
+              <a:avLst/>
+            </a:prstGeom>
+            <a:solidFill>
+              <a:schemeClr val="accent1"/>
+            </a:solidFill>
+          </p:spPr>
+          <p:style>
+            <a:lnRef idx="2">
+              <a:schemeClr val="accent1">
+                <a:shade val="50000"/>
+              </a:schemeClr>
+            </a:lnRef>
+            <a:fillRef idx="1">
+              <a:schemeClr val="accent1"/>
+            </a:fillRef>
+            <a:effectRef idx="0">
+              <a:schemeClr val="accent1"/>
+            </a:effectRef>
+            <a:fontRef idx="minor">
+              <a:schemeClr val="lt1"/>
+            </a:fontRef>
+          </p:style>
+          <p:txBody>
+            <a:bodyPr rtlCol="0" anchor="ctr"/>
+            <a:lstStyle/>
+            <a:p>
+              <a:pPr algn="ctr"/>
+              <a:r>
+                <a:rPr lang="de-DE" dirty="0">
+                  <a:solidFill>
+                    <a:schemeClr val="tx2"/>
+                  </a:solidFill>
+                </a:rPr>
+                <a:t>Minimal Semester</a:t>
+              </a:r>
+            </a:p>
+          </p:txBody>
+        </p:sp>
+        <p:sp>
+          <p:nvSpPr>
+            <p:cNvPr id="7" name="Rechteck 6"/>
+            <p:cNvSpPr/>
+            <p:nvPr/>
+          </p:nvSpPr>
+          <p:spPr>
+            <a:xfrm>
+              <a:off x="2600788" y="4330341"/>
+              <a:ext cx="2406823" cy="519241"/>
+            </a:xfrm>
+            <a:prstGeom prst="rect">
+              <a:avLst/>
+            </a:prstGeom>
+            <a:solidFill>
+              <a:schemeClr val="accent1"/>
+            </a:solidFill>
+          </p:spPr>
+          <p:style>
+            <a:lnRef idx="2">
+              <a:schemeClr val="accent1">
+                <a:shade val="50000"/>
+              </a:schemeClr>
+            </a:lnRef>
+            <a:fillRef idx="1">
+              <a:schemeClr val="accent1"/>
+            </a:fillRef>
+            <a:effectRef idx="0">
+              <a:schemeClr val="accent1"/>
+            </a:effectRef>
+            <a:fontRef idx="minor">
+              <a:schemeClr val="lt1"/>
+            </a:fontRef>
+          </p:style>
+          <p:txBody>
+            <a:bodyPr rtlCol="0" anchor="ctr"/>
+            <a:lstStyle/>
+            <a:p>
+              <a:pPr algn="ctr"/>
+              <a:r>
+                <a:rPr lang="de-DE" dirty="0" err="1">
+                  <a:solidFill>
+                    <a:schemeClr val="tx2"/>
+                  </a:solidFill>
+                </a:rPr>
+                <a:t>Preferences</a:t>
+              </a:r>
+              <a:endParaRPr lang="de-DE" dirty="0">
+                <a:solidFill>
+                  <a:schemeClr val="tx2"/>
+                </a:solidFill>
+              </a:endParaRPr>
+            </a:p>
+          </p:txBody>
+        </p:sp>
+        <p:sp>
+          <p:nvSpPr>
+            <p:cNvPr id="8" name="Rechteck 7"/>
+            <p:cNvSpPr/>
+            <p:nvPr/>
+          </p:nvSpPr>
+          <p:spPr>
+            <a:xfrm>
+              <a:off x="2600787" y="5895308"/>
+              <a:ext cx="2406823" cy="519241"/>
+            </a:xfrm>
+            <a:prstGeom prst="rect">
+              <a:avLst/>
+            </a:prstGeom>
+            <a:solidFill>
+              <a:schemeClr val="accent3">
+                <a:lumMod val="60000"/>
+                <a:lumOff val="40000"/>
+              </a:schemeClr>
+            </a:solidFill>
+          </p:spPr>
+          <p:style>
+            <a:lnRef idx="2">
+              <a:schemeClr val="accent1">
+                <a:shade val="50000"/>
+              </a:schemeClr>
+            </a:lnRef>
+            <a:fillRef idx="1">
+              <a:schemeClr val="accent1"/>
+            </a:fillRef>
+            <a:effectRef idx="0">
+              <a:schemeClr val="accent1"/>
+            </a:effectRef>
+            <a:fontRef idx="minor">
+              <a:schemeClr val="lt1"/>
+            </a:fontRef>
+          </p:style>
+          <p:txBody>
+            <a:bodyPr rtlCol="0" anchor="ctr"/>
+            <a:lstStyle/>
+            <a:p>
+              <a:pPr algn="ctr"/>
+              <a:r>
+                <a:rPr lang="de-DE" dirty="0">
                   <a:solidFill>
                     <a:schemeClr val="accent1"/>
                   </a:solidFill>
-                </a:endParaRPr>
-              </a:p>
-            </p:txBody>
-          </p:sp>
-          <p:sp>
-            <p:nvSpPr>
-              <p:cNvPr id="9" name="Rechteck 8"/>
-              <p:cNvSpPr/>
-              <p:nvPr/>
-            </p:nvSpPr>
-            <p:spPr>
-              <a:xfrm>
-                <a:off x="5798380" y="3962744"/>
-                <a:ext cx="698805" cy="696469"/>
-              </a:xfrm>
-              <a:prstGeom prst="rect">
-                <a:avLst/>
-              </a:prstGeom>
-              <a:gradFill flip="none" rotWithShape="1">
-                <a:gsLst>
-                  <a:gs pos="0">
-                    <a:schemeClr val="accent1">
-                      <a:lumMod val="67000"/>
-                    </a:schemeClr>
-                  </a:gs>
-                  <a:gs pos="48000">
-                    <a:schemeClr val="accent1">
-                      <a:lumMod val="97000"/>
-                      <a:lumOff val="3000"/>
-                    </a:schemeClr>
-                  </a:gs>
-                  <a:gs pos="100000">
-                    <a:schemeClr val="accent1">
-                      <a:lumMod val="60000"/>
-                      <a:lumOff val="40000"/>
-                    </a:schemeClr>
-                  </a:gs>
-                </a:gsLst>
-                <a:lin ang="16200000" scaled="1"/>
-                <a:tileRect/>
-              </a:gradFill>
-            </p:spPr>
-            <p:style>
-              <a:lnRef idx="2">
-                <a:schemeClr val="accent1">
-                  <a:shade val="50000"/>
-                </a:schemeClr>
-              </a:lnRef>
-              <a:fillRef idx="1">
-                <a:schemeClr val="accent1"/>
-              </a:fillRef>
-              <a:effectRef idx="0">
-                <a:schemeClr val="accent1"/>
-              </a:effectRef>
-              <a:fontRef idx="minor">
-                <a:schemeClr val="lt1"/>
-              </a:fontRef>
-            </p:style>
-            <p:txBody>
-              <a:bodyPr rtlCol="0" anchor="ctr"/>
-              <a:lstStyle/>
-              <a:p>
-                <a:pPr algn="ctr"/>
-                <a:r>
-                  <a:rPr lang="de-DE" sz="6600" dirty="0">
-                    <a:solidFill>
-                      <a:schemeClr val="tx2"/>
-                    </a:solidFill>
-                  </a:rPr>
-                  <a:t>∅</a:t>
-                </a:r>
-                <a:endParaRPr lang="de-DE" dirty="0">
+                </a:rPr>
+                <a:t>User </a:t>
+              </a:r>
+              <a:r>
+                <a:rPr lang="de-DE" dirty="0" err="1">
+                  <a:solidFill>
+                    <a:schemeClr val="accent1"/>
+                  </a:solidFill>
+                </a:rPr>
+                <a:t>Selection</a:t>
+              </a:r>
+              <a:endParaRPr lang="de-DE" dirty="0">
+                <a:solidFill>
+                  <a:schemeClr val="accent1"/>
+                </a:solidFill>
+              </a:endParaRPr>
+            </a:p>
+          </p:txBody>
+        </p:sp>
+        <p:sp>
+          <p:nvSpPr>
+            <p:cNvPr id="9" name="Rechteck 8"/>
+            <p:cNvSpPr/>
+            <p:nvPr/>
+          </p:nvSpPr>
+          <p:spPr>
+            <a:xfrm>
+              <a:off x="6669697" y="3914437"/>
+              <a:ext cx="642312" cy="660591"/>
+            </a:xfrm>
+            <a:prstGeom prst="rect">
+              <a:avLst/>
+            </a:prstGeom>
+            <a:solidFill>
+              <a:schemeClr val="accent1"/>
+            </a:solidFill>
+          </p:spPr>
+          <p:style>
+            <a:lnRef idx="2">
+              <a:schemeClr val="accent1">
+                <a:shade val="50000"/>
+              </a:schemeClr>
+            </a:lnRef>
+            <a:fillRef idx="1">
+              <a:schemeClr val="accent1"/>
+            </a:fillRef>
+            <a:effectRef idx="0">
+              <a:schemeClr val="accent1"/>
+            </a:effectRef>
+            <a:fontRef idx="minor">
+              <a:schemeClr val="lt1"/>
+            </a:fontRef>
+          </p:style>
+          <p:txBody>
+            <a:bodyPr rtlCol="0" anchor="ctr"/>
+            <a:lstStyle/>
+            <a:p>
+              <a:pPr algn="ctr"/>
+              <a:r>
+                <a:rPr lang="de-DE" sz="4800" dirty="0">
                   <a:solidFill>
                     <a:schemeClr val="tx2"/>
                   </a:solidFill>
-                </a:endParaRPr>
-              </a:p>
-            </p:txBody>
-          </p:sp>
-          <p:cxnSp>
-            <p:nvCxnSpPr>
-              <p:cNvPr id="11" name="Gewinkelte Verbindung 10"/>
-              <p:cNvCxnSpPr>
-                <a:stCxn id="5" idx="3"/>
-                <a:endCxn id="9" idx="1"/>
-              </p:cNvCxnSpPr>
-              <p:nvPr/>
-            </p:nvCxnSpPr>
-            <p:spPr>
-              <a:xfrm>
-                <a:off x="3990109" y="3298715"/>
-                <a:ext cx="1808271" cy="1012264"/>
-              </a:xfrm>
-              <a:prstGeom prst="bentConnector3">
-                <a:avLst/>
-              </a:prstGeom>
-              <a:ln>
-                <a:tailEnd type="triangle"/>
-              </a:ln>
-            </p:spPr>
-            <p:style>
-              <a:lnRef idx="1">
-                <a:schemeClr val="accent1"/>
-              </a:lnRef>
-              <a:fillRef idx="0">
-                <a:schemeClr val="accent1"/>
-              </a:fillRef>
-              <a:effectRef idx="0">
-                <a:schemeClr val="accent1"/>
-              </a:effectRef>
-              <a:fontRef idx="minor">
-                <a:schemeClr val="tx1"/>
-              </a:fontRef>
-            </p:style>
-          </p:cxnSp>
-          <p:cxnSp>
-            <p:nvCxnSpPr>
-              <p:cNvPr id="12" name="Gewinkelte Verbindung 11"/>
-              <p:cNvCxnSpPr>
-                <a:stCxn id="6" idx="3"/>
-                <a:endCxn id="9" idx="1"/>
-              </p:cNvCxnSpPr>
-              <p:nvPr/>
-            </p:nvCxnSpPr>
-            <p:spPr>
-              <a:xfrm>
-                <a:off x="3990109" y="3986836"/>
-                <a:ext cx="1808271" cy="324143"/>
-              </a:xfrm>
-              <a:prstGeom prst="bentConnector3">
-                <a:avLst/>
-              </a:prstGeom>
-              <a:ln>
-                <a:tailEnd type="triangle"/>
-              </a:ln>
-            </p:spPr>
-            <p:style>
-              <a:lnRef idx="1">
-                <a:schemeClr val="accent1"/>
-              </a:lnRef>
-              <a:fillRef idx="0">
-                <a:schemeClr val="accent1"/>
-              </a:fillRef>
-              <a:effectRef idx="0">
-                <a:schemeClr val="accent1"/>
-              </a:effectRef>
-              <a:fontRef idx="minor">
-                <a:schemeClr val="tx1"/>
-              </a:fontRef>
-            </p:style>
-          </p:cxnSp>
-          <p:cxnSp>
-            <p:nvCxnSpPr>
-              <p:cNvPr id="15" name="Gewinkelte Verbindung 14"/>
-              <p:cNvCxnSpPr>
-                <a:stCxn id="7" idx="3"/>
-                <a:endCxn id="9" idx="1"/>
-              </p:cNvCxnSpPr>
-              <p:nvPr/>
-            </p:nvCxnSpPr>
-            <p:spPr>
-              <a:xfrm flipV="1">
-                <a:off x="3990108" y="4310979"/>
-                <a:ext cx="1808272" cy="363978"/>
-              </a:xfrm>
-              <a:prstGeom prst="bentConnector3">
-                <a:avLst/>
-              </a:prstGeom>
-              <a:ln>
-                <a:tailEnd type="triangle"/>
-              </a:ln>
-            </p:spPr>
-            <p:style>
-              <a:lnRef idx="1">
-                <a:schemeClr val="accent1"/>
-              </a:lnRef>
-              <a:fillRef idx="0">
-                <a:schemeClr val="accent1"/>
-              </a:fillRef>
-              <a:effectRef idx="0">
-                <a:schemeClr val="accent1"/>
-              </a:effectRef>
-              <a:fontRef idx="minor">
-                <a:schemeClr val="tx1"/>
-              </a:fontRef>
-            </p:style>
-          </p:cxnSp>
-          <p:cxnSp>
-            <p:nvCxnSpPr>
-              <p:cNvPr id="18" name="Gewinkelte Verbindung 17"/>
-              <p:cNvCxnSpPr>
-                <a:stCxn id="4" idx="3"/>
-                <a:endCxn id="9" idx="1"/>
-              </p:cNvCxnSpPr>
-              <p:nvPr/>
-            </p:nvCxnSpPr>
-            <p:spPr>
-              <a:xfrm flipV="1">
-                <a:off x="3990107" y="4310979"/>
-                <a:ext cx="1808273" cy="1052099"/>
-              </a:xfrm>
-              <a:prstGeom prst="bentConnector3">
-                <a:avLst>
-                  <a:gd name="adj1" fmla="val 50000"/>
-                </a:avLst>
-              </a:prstGeom>
-              <a:ln>
-                <a:tailEnd type="triangle"/>
-              </a:ln>
-            </p:spPr>
-            <p:style>
-              <a:lnRef idx="1">
-                <a:schemeClr val="accent1"/>
-              </a:lnRef>
-              <a:fillRef idx="0">
-                <a:schemeClr val="accent1"/>
-              </a:fillRef>
-              <a:effectRef idx="0">
-                <a:schemeClr val="accent1"/>
-              </a:effectRef>
-              <a:fontRef idx="minor">
-                <a:schemeClr val="tx1"/>
-              </a:fontRef>
-            </p:style>
-          </p:cxnSp>
-          <p:sp>
-            <p:nvSpPr>
-              <p:cNvPr id="35" name="Rechteck 34"/>
-              <p:cNvSpPr/>
-              <p:nvPr/>
-            </p:nvSpPr>
-            <p:spPr>
-              <a:xfrm>
-                <a:off x="4811842" y="6051199"/>
-                <a:ext cx="1685343" cy="573111"/>
-              </a:xfrm>
-              <a:prstGeom prst="rect">
-                <a:avLst/>
-              </a:prstGeom>
-              <a:gradFill flip="none" rotWithShape="1">
-                <a:gsLst>
-                  <a:gs pos="0">
-                    <a:schemeClr val="accent1">
-                      <a:lumMod val="67000"/>
-                    </a:schemeClr>
-                  </a:gs>
-                  <a:gs pos="48000">
-                    <a:schemeClr val="accent1">
-                      <a:lumMod val="97000"/>
-                      <a:lumOff val="3000"/>
-                    </a:schemeClr>
-                  </a:gs>
-                  <a:gs pos="100000">
-                    <a:schemeClr val="accent1">
-                      <a:lumMod val="60000"/>
-                      <a:lumOff val="40000"/>
-                    </a:schemeClr>
-                  </a:gs>
-                </a:gsLst>
-                <a:lin ang="16200000" scaled="1"/>
-                <a:tileRect/>
-              </a:gradFill>
-            </p:spPr>
-            <p:style>
-              <a:lnRef idx="2">
-                <a:schemeClr val="accent1">
-                  <a:shade val="50000"/>
-                </a:schemeClr>
-              </a:lnRef>
-              <a:fillRef idx="1">
-                <a:schemeClr val="accent1"/>
-              </a:fillRef>
-              <a:effectRef idx="0">
-                <a:schemeClr val="accent1"/>
-              </a:effectRef>
-              <a:fontRef idx="minor">
-                <a:schemeClr val="lt1"/>
-              </a:fontRef>
-            </p:style>
-            <p:txBody>
-              <a:bodyPr rtlCol="0" anchor="ctr"/>
-              <a:lstStyle/>
-              <a:p>
-                <a:pPr algn="ctr"/>
-                <a:r>
-                  <a:rPr lang="de-DE" sz="2000" dirty="0">
-                    <a:solidFill>
-                      <a:schemeClr val="tx2"/>
-                    </a:solidFill>
-                  </a:rPr>
-                  <a:t>x &lt; 0.5 ? 0 : x</a:t>
-                </a:r>
-                <a:endParaRPr lang="de-DE" sz="1400" dirty="0">
+                </a:rPr>
+                <a:t>∅</a:t>
+              </a:r>
+              <a:endParaRPr lang="de-DE" dirty="0">
+                <a:solidFill>
+                  <a:schemeClr val="tx2"/>
+                </a:solidFill>
+              </a:endParaRPr>
+            </a:p>
+          </p:txBody>
+        </p:sp>
+        <p:cxnSp>
+          <p:nvCxnSpPr>
+            <p:cNvPr id="11" name="Gewinkelte Verbindung 10"/>
+            <p:cNvCxnSpPr>
+              <a:stCxn id="5" idx="3"/>
+              <a:endCxn id="9" idx="1"/>
+            </p:cNvCxnSpPr>
+            <p:nvPr/>
+          </p:nvCxnSpPr>
+          <p:spPr>
+            <a:xfrm>
+              <a:off x="5007612" y="3284615"/>
+              <a:ext cx="1662085" cy="960119"/>
+            </a:xfrm>
+            <a:prstGeom prst="bentConnector3">
+              <a:avLst/>
+            </a:prstGeom>
+            <a:ln>
+              <a:tailEnd type="triangle"/>
+            </a:ln>
+          </p:spPr>
+          <p:style>
+            <a:lnRef idx="1">
+              <a:schemeClr val="accent1"/>
+            </a:lnRef>
+            <a:fillRef idx="0">
+              <a:schemeClr val="accent1"/>
+            </a:fillRef>
+            <a:effectRef idx="0">
+              <a:schemeClr val="accent1"/>
+            </a:effectRef>
+            <a:fontRef idx="minor">
+              <a:schemeClr val="tx1"/>
+            </a:fontRef>
+          </p:style>
+        </p:cxnSp>
+        <p:cxnSp>
+          <p:nvCxnSpPr>
+            <p:cNvPr id="12" name="Gewinkelte Verbindung 11"/>
+            <p:cNvCxnSpPr>
+              <a:stCxn id="6" idx="3"/>
+              <a:endCxn id="9" idx="1"/>
+            </p:cNvCxnSpPr>
+            <p:nvPr/>
+          </p:nvCxnSpPr>
+          <p:spPr>
+            <a:xfrm>
+              <a:off x="5007612" y="3937288"/>
+              <a:ext cx="1662085" cy="307445"/>
+            </a:xfrm>
+            <a:prstGeom prst="bentConnector3">
+              <a:avLst/>
+            </a:prstGeom>
+            <a:ln>
+              <a:tailEnd type="triangle"/>
+            </a:ln>
+          </p:spPr>
+          <p:style>
+            <a:lnRef idx="1">
+              <a:schemeClr val="accent1"/>
+            </a:lnRef>
+            <a:fillRef idx="0">
+              <a:schemeClr val="accent1"/>
+            </a:fillRef>
+            <a:effectRef idx="0">
+              <a:schemeClr val="accent1"/>
+            </a:effectRef>
+            <a:fontRef idx="minor">
+              <a:schemeClr val="tx1"/>
+            </a:fontRef>
+          </p:style>
+        </p:cxnSp>
+        <p:cxnSp>
+          <p:nvCxnSpPr>
+            <p:cNvPr id="15" name="Gewinkelte Verbindung 14"/>
+            <p:cNvCxnSpPr>
+              <a:stCxn id="7" idx="3"/>
+              <a:endCxn id="9" idx="1"/>
+            </p:cNvCxnSpPr>
+            <p:nvPr/>
+          </p:nvCxnSpPr>
+          <p:spPr>
+            <a:xfrm flipV="1">
+              <a:off x="5007611" y="4244733"/>
+              <a:ext cx="1662086" cy="345228"/>
+            </a:xfrm>
+            <a:prstGeom prst="bentConnector3">
+              <a:avLst/>
+            </a:prstGeom>
+            <a:ln>
+              <a:tailEnd type="triangle"/>
+            </a:ln>
+          </p:spPr>
+          <p:style>
+            <a:lnRef idx="1">
+              <a:schemeClr val="accent1"/>
+            </a:lnRef>
+            <a:fillRef idx="0">
+              <a:schemeClr val="accent1"/>
+            </a:fillRef>
+            <a:effectRef idx="0">
+              <a:schemeClr val="accent1"/>
+            </a:effectRef>
+            <a:fontRef idx="minor">
+              <a:schemeClr val="tx1"/>
+            </a:fontRef>
+          </p:style>
+        </p:cxnSp>
+        <p:cxnSp>
+          <p:nvCxnSpPr>
+            <p:cNvPr id="18" name="Gewinkelte Verbindung 17"/>
+            <p:cNvCxnSpPr>
+              <a:stCxn id="4" idx="3"/>
+              <a:endCxn id="9" idx="1"/>
+            </p:cNvCxnSpPr>
+            <p:nvPr/>
+          </p:nvCxnSpPr>
+          <p:spPr>
+            <a:xfrm flipV="1">
+              <a:off x="5007610" y="4244733"/>
+              <a:ext cx="1662087" cy="997902"/>
+            </a:xfrm>
+            <a:prstGeom prst="bentConnector3">
+              <a:avLst>
+                <a:gd name="adj1" fmla="val 50000"/>
+              </a:avLst>
+            </a:prstGeom>
+            <a:ln>
+              <a:tailEnd type="triangle"/>
+            </a:ln>
+          </p:spPr>
+          <p:style>
+            <a:lnRef idx="1">
+              <a:schemeClr val="accent1"/>
+            </a:lnRef>
+            <a:fillRef idx="0">
+              <a:schemeClr val="accent1"/>
+            </a:fillRef>
+            <a:effectRef idx="0">
+              <a:schemeClr val="accent1"/>
+            </a:effectRef>
+            <a:fontRef idx="minor">
+              <a:schemeClr val="tx1"/>
+            </a:fontRef>
+          </p:style>
+        </p:cxnSp>
+        <p:sp>
+          <p:nvSpPr>
+            <p:cNvPr id="35" name="Rechteck 34"/>
+            <p:cNvSpPr/>
+            <p:nvPr/>
+          </p:nvSpPr>
+          <p:spPr>
+            <a:xfrm>
+              <a:off x="5762913" y="5895308"/>
+              <a:ext cx="1549095" cy="543588"/>
+            </a:xfrm>
+            <a:prstGeom prst="rect">
+              <a:avLst/>
+            </a:prstGeom>
+            <a:solidFill>
+              <a:schemeClr val="accent1"/>
+            </a:solidFill>
+          </p:spPr>
+          <p:style>
+            <a:lnRef idx="2">
+              <a:schemeClr val="accent1">
+                <a:shade val="50000"/>
+              </a:schemeClr>
+            </a:lnRef>
+            <a:fillRef idx="1">
+              <a:schemeClr val="accent1"/>
+            </a:fillRef>
+            <a:effectRef idx="0">
+              <a:schemeClr val="accent1"/>
+            </a:effectRef>
+            <a:fontRef idx="minor">
+              <a:schemeClr val="lt1"/>
+            </a:fontRef>
+          </p:style>
+          <p:txBody>
+            <a:bodyPr rtlCol="0" anchor="ctr"/>
+            <a:lstStyle/>
+            <a:p>
+              <a:pPr algn="ctr"/>
+              <a:r>
+                <a:rPr lang="de-DE" sz="2000" dirty="0">
                   <a:solidFill>
                     <a:schemeClr val="tx2"/>
                   </a:solidFill>
-                </a:endParaRPr>
-              </a:p>
-            </p:txBody>
-          </p:sp>
-          <p:cxnSp>
-            <p:nvCxnSpPr>
-              <p:cNvPr id="41" name="Gerade Verbindung mit Pfeil 40"/>
-              <p:cNvCxnSpPr>
-                <a:stCxn id="8" idx="3"/>
-                <a:endCxn id="35" idx="1"/>
-              </p:cNvCxnSpPr>
-              <p:nvPr/>
-            </p:nvCxnSpPr>
-            <p:spPr>
-              <a:xfrm>
-                <a:off x="3990107" y="6324920"/>
-                <a:ext cx="821735" cy="12835"/>
-              </a:xfrm>
-              <a:prstGeom prst="straightConnector1">
-                <a:avLst/>
-              </a:prstGeom>
-              <a:ln>
-                <a:tailEnd type="triangle"/>
-              </a:ln>
-            </p:spPr>
-            <p:style>
-              <a:lnRef idx="1">
-                <a:schemeClr val="accent1"/>
-              </a:lnRef>
-              <a:fillRef idx="0">
-                <a:schemeClr val="accent1"/>
-              </a:fillRef>
-              <a:effectRef idx="0">
-                <a:schemeClr val="accent1"/>
-              </a:effectRef>
-              <a:fontRef idx="minor">
-                <a:schemeClr val="tx1"/>
-              </a:fontRef>
-            </p:style>
-          </p:cxnSp>
-          <p:sp>
-            <p:nvSpPr>
-              <p:cNvPr id="45" name="Rechteck 44"/>
-              <p:cNvSpPr/>
-              <p:nvPr/>
-            </p:nvSpPr>
-            <p:spPr>
-              <a:xfrm>
-                <a:off x="8067488" y="4674957"/>
-                <a:ext cx="698805" cy="696469"/>
-              </a:xfrm>
-              <a:prstGeom prst="rect">
-                <a:avLst/>
-              </a:prstGeom>
-              <a:gradFill flip="none" rotWithShape="1">
-                <a:gsLst>
-                  <a:gs pos="0">
-                    <a:schemeClr val="accent1">
-                      <a:lumMod val="67000"/>
-                    </a:schemeClr>
-                  </a:gs>
-                  <a:gs pos="48000">
-                    <a:schemeClr val="accent1">
-                      <a:lumMod val="97000"/>
-                      <a:lumOff val="3000"/>
-                    </a:schemeClr>
-                  </a:gs>
-                  <a:gs pos="100000">
-                    <a:schemeClr val="accent1">
-                      <a:lumMod val="60000"/>
-                      <a:lumOff val="40000"/>
-                    </a:schemeClr>
-                  </a:gs>
-                </a:gsLst>
-                <a:lin ang="16200000" scaled="1"/>
-                <a:tileRect/>
-              </a:gradFill>
-            </p:spPr>
-            <p:style>
-              <a:lnRef idx="2">
-                <a:schemeClr val="accent1">
-                  <a:shade val="50000"/>
-                </a:schemeClr>
-              </a:lnRef>
-              <a:fillRef idx="1">
-                <a:schemeClr val="accent1"/>
-              </a:fillRef>
-              <a:effectRef idx="0">
-                <a:schemeClr val="accent1"/>
-              </a:effectRef>
-              <a:fontRef idx="minor">
-                <a:schemeClr val="lt1"/>
-              </a:fontRef>
-            </p:style>
-            <p:txBody>
-              <a:bodyPr rtlCol="0" anchor="ctr"/>
-              <a:lstStyle/>
-              <a:p>
-                <a:pPr algn="ctr"/>
-                <a:r>
-                  <a:rPr lang="de-DE" sz="5400" dirty="0">
-                    <a:solidFill>
-                      <a:schemeClr val="tx2"/>
-                    </a:solidFill>
-                  </a:rPr>
-                  <a:t>*</a:t>
-                </a:r>
-                <a:endParaRPr lang="de-DE" sz="1400" dirty="0">
+                </a:rPr>
+                <a:t>x &lt; 0.5 ? 0 : x</a:t>
+              </a:r>
+              <a:endParaRPr lang="de-DE" sz="1400" dirty="0">
+                <a:solidFill>
+                  <a:schemeClr val="tx2"/>
+                </a:solidFill>
+              </a:endParaRPr>
+            </a:p>
+          </p:txBody>
+        </p:sp>
+        <p:cxnSp>
+          <p:nvCxnSpPr>
+            <p:cNvPr id="41" name="Gerade Verbindung mit Pfeil 40"/>
+            <p:cNvCxnSpPr>
+              <a:stCxn id="8" idx="3"/>
+              <a:endCxn id="35" idx="1"/>
+            </p:cNvCxnSpPr>
+            <p:nvPr/>
+          </p:nvCxnSpPr>
+          <p:spPr>
+            <a:xfrm>
+              <a:off x="5007610" y="6154929"/>
+              <a:ext cx="755304" cy="12174"/>
+            </a:xfrm>
+            <a:prstGeom prst="straightConnector1">
+              <a:avLst/>
+            </a:prstGeom>
+            <a:ln>
+              <a:tailEnd type="triangle"/>
+            </a:ln>
+          </p:spPr>
+          <p:style>
+            <a:lnRef idx="1">
+              <a:schemeClr val="accent1"/>
+            </a:lnRef>
+            <a:fillRef idx="0">
+              <a:schemeClr val="accent1"/>
+            </a:fillRef>
+            <a:effectRef idx="0">
+              <a:schemeClr val="accent1"/>
+            </a:effectRef>
+            <a:fontRef idx="minor">
+              <a:schemeClr val="tx1"/>
+            </a:fontRef>
+          </p:style>
+        </p:cxnSp>
+        <p:sp>
+          <p:nvSpPr>
+            <p:cNvPr id="45" name="Rechteck 44"/>
+            <p:cNvSpPr/>
+            <p:nvPr/>
+          </p:nvSpPr>
+          <p:spPr>
+            <a:xfrm>
+              <a:off x="8755364" y="4589961"/>
+              <a:ext cx="642312" cy="660591"/>
+            </a:xfrm>
+            <a:prstGeom prst="rect">
+              <a:avLst/>
+            </a:prstGeom>
+            <a:solidFill>
+              <a:schemeClr val="accent1"/>
+            </a:solidFill>
+          </p:spPr>
+          <p:style>
+            <a:lnRef idx="2">
+              <a:schemeClr val="accent1">
+                <a:shade val="50000"/>
+              </a:schemeClr>
+            </a:lnRef>
+            <a:fillRef idx="1">
+              <a:schemeClr val="accent1"/>
+            </a:fillRef>
+            <a:effectRef idx="0">
+              <a:schemeClr val="accent1"/>
+            </a:effectRef>
+            <a:fontRef idx="minor">
+              <a:schemeClr val="lt1"/>
+            </a:fontRef>
+          </p:style>
+          <p:txBody>
+            <a:bodyPr rtlCol="0" anchor="ctr"/>
+            <a:lstStyle/>
+            <a:p>
+              <a:pPr algn="ctr"/>
+              <a:r>
+                <a:rPr lang="de-DE" sz="5400" dirty="0">
                   <a:solidFill>
                     <a:schemeClr val="tx2"/>
                   </a:solidFill>
-                </a:endParaRPr>
-              </a:p>
-            </p:txBody>
-          </p:sp>
-          <p:cxnSp>
-            <p:nvCxnSpPr>
-              <p:cNvPr id="47" name="Gewinkelte Verbindung 46"/>
-              <p:cNvCxnSpPr>
-                <a:stCxn id="35" idx="3"/>
-                <a:endCxn id="45" idx="1"/>
-              </p:cNvCxnSpPr>
-              <p:nvPr/>
-            </p:nvCxnSpPr>
-            <p:spPr>
-              <a:xfrm flipV="1">
-                <a:off x="6497185" y="5023192"/>
-                <a:ext cx="1570303" cy="1314563"/>
-              </a:xfrm>
-              <a:prstGeom prst="bentConnector3">
-                <a:avLst/>
-              </a:prstGeom>
-              <a:ln>
-                <a:tailEnd type="triangle"/>
-              </a:ln>
-            </p:spPr>
-            <p:style>
-              <a:lnRef idx="1">
-                <a:schemeClr val="accent1"/>
-              </a:lnRef>
-              <a:fillRef idx="0">
-                <a:schemeClr val="accent1"/>
-              </a:fillRef>
-              <a:effectRef idx="0">
-                <a:schemeClr val="accent1"/>
-              </a:effectRef>
-              <a:fontRef idx="minor">
-                <a:schemeClr val="tx1"/>
-              </a:fontRef>
-            </p:style>
-          </p:cxnSp>
-          <p:cxnSp>
-            <p:nvCxnSpPr>
-              <p:cNvPr id="49" name="Gewinkelte Verbindung 48"/>
-              <p:cNvCxnSpPr>
-                <a:stCxn id="9" idx="3"/>
-                <a:endCxn id="45" idx="1"/>
-              </p:cNvCxnSpPr>
-              <p:nvPr/>
-            </p:nvCxnSpPr>
-            <p:spPr>
-              <a:xfrm>
-                <a:off x="6497185" y="4310979"/>
-                <a:ext cx="1570303" cy="712213"/>
-              </a:xfrm>
-              <a:prstGeom prst="bentConnector3">
-                <a:avLst/>
-              </a:prstGeom>
-              <a:ln>
-                <a:tailEnd type="triangle"/>
-              </a:ln>
-            </p:spPr>
-            <p:style>
-              <a:lnRef idx="1">
-                <a:schemeClr val="accent1"/>
-              </a:lnRef>
-              <a:fillRef idx="0">
-                <a:schemeClr val="accent1"/>
-              </a:fillRef>
-              <a:effectRef idx="0">
-                <a:schemeClr val="accent1"/>
-              </a:effectRef>
-              <a:fontRef idx="minor">
-                <a:schemeClr val="tx1"/>
-              </a:fontRef>
-            </p:style>
-          </p:cxnSp>
-          <p:sp>
-            <p:nvSpPr>
-              <p:cNvPr id="54" name="Textfeld 53"/>
-              <p:cNvSpPr txBox="1"/>
-              <p:nvPr/>
-            </p:nvSpPr>
-            <p:spPr>
-              <a:xfrm>
-                <a:off x="9613663" y="4823136"/>
-                <a:ext cx="752129" cy="400110"/>
-              </a:xfrm>
-              <a:prstGeom prst="rect">
-                <a:avLst/>
-              </a:prstGeom>
-              <a:noFill/>
-            </p:spPr>
-            <p:txBody>
-              <a:bodyPr wrap="none" rtlCol="0">
-                <a:spAutoFit/>
-              </a:bodyPr>
-              <a:lstStyle/>
-              <a:p>
-                <a:r>
-                  <a:rPr lang="de-DE" sz="2000" dirty="0"/>
-                  <a:t>score</a:t>
-                </a:r>
-              </a:p>
-            </p:txBody>
-          </p:sp>
-          <p:cxnSp>
-            <p:nvCxnSpPr>
-              <p:cNvPr id="57" name="Gerade Verbindung mit Pfeil 56"/>
-              <p:cNvCxnSpPr>
-                <a:stCxn id="45" idx="3"/>
-                <a:endCxn id="54" idx="1"/>
-              </p:cNvCxnSpPr>
-              <p:nvPr/>
-            </p:nvCxnSpPr>
-            <p:spPr>
-              <a:xfrm flipV="1">
-                <a:off x="8766293" y="5023191"/>
-                <a:ext cx="847370" cy="1"/>
-              </a:xfrm>
-              <a:prstGeom prst="straightConnector1">
-                <a:avLst/>
-              </a:prstGeom>
-              <a:ln>
-                <a:tailEnd type="triangle"/>
-              </a:ln>
-            </p:spPr>
-            <p:style>
-              <a:lnRef idx="1">
-                <a:schemeClr val="accent1"/>
-              </a:lnRef>
-              <a:fillRef idx="0">
-                <a:schemeClr val="accent1"/>
-              </a:fillRef>
-              <a:effectRef idx="0">
-                <a:schemeClr val="accent1"/>
-              </a:effectRef>
-              <a:fontRef idx="minor">
-                <a:schemeClr val="tx1"/>
-              </a:fontRef>
-            </p:style>
-          </p:cxnSp>
-        </p:grpSp>
+                </a:rPr>
+                <a:t>*</a:t>
+              </a:r>
+              <a:endParaRPr lang="de-DE" sz="1400" dirty="0">
+                <a:solidFill>
+                  <a:schemeClr val="tx2"/>
+                </a:solidFill>
+              </a:endParaRPr>
+            </a:p>
+          </p:txBody>
+        </p:sp>
+        <p:cxnSp>
+          <p:nvCxnSpPr>
+            <p:cNvPr id="47" name="Gewinkelte Verbindung 46"/>
+            <p:cNvCxnSpPr>
+              <a:stCxn id="35" idx="3"/>
+              <a:endCxn id="45" idx="1"/>
+            </p:cNvCxnSpPr>
+            <p:nvPr/>
+          </p:nvCxnSpPr>
+          <p:spPr>
+            <a:xfrm flipV="1">
+              <a:off x="7312008" y="4920257"/>
+              <a:ext cx="1443355" cy="1246845"/>
+            </a:xfrm>
+            <a:prstGeom prst="bentConnector3">
+              <a:avLst/>
+            </a:prstGeom>
+            <a:ln>
+              <a:tailEnd type="triangle"/>
+            </a:ln>
+          </p:spPr>
+          <p:style>
+            <a:lnRef idx="1">
+              <a:schemeClr val="accent1"/>
+            </a:lnRef>
+            <a:fillRef idx="0">
+              <a:schemeClr val="accent1"/>
+            </a:fillRef>
+            <a:effectRef idx="0">
+              <a:schemeClr val="accent1"/>
+            </a:effectRef>
+            <a:fontRef idx="minor">
+              <a:schemeClr val="tx1"/>
+            </a:fontRef>
+          </p:style>
+        </p:cxnSp>
+        <p:cxnSp>
+          <p:nvCxnSpPr>
+            <p:cNvPr id="49" name="Gewinkelte Verbindung 48"/>
+            <p:cNvCxnSpPr>
+              <a:stCxn id="9" idx="3"/>
+              <a:endCxn id="45" idx="1"/>
+            </p:cNvCxnSpPr>
+            <p:nvPr/>
+          </p:nvCxnSpPr>
+          <p:spPr>
+            <a:xfrm>
+              <a:off x="7312008" y="4244733"/>
+              <a:ext cx="1443355" cy="675524"/>
+            </a:xfrm>
+            <a:prstGeom prst="bentConnector3">
+              <a:avLst/>
+            </a:prstGeom>
+            <a:ln>
+              <a:tailEnd type="triangle"/>
+            </a:ln>
+          </p:spPr>
+          <p:style>
+            <a:lnRef idx="1">
+              <a:schemeClr val="accent1"/>
+            </a:lnRef>
+            <a:fillRef idx="0">
+              <a:schemeClr val="accent1"/>
+            </a:fillRef>
+            <a:effectRef idx="0">
+              <a:schemeClr val="accent1"/>
+            </a:effectRef>
+            <a:fontRef idx="minor">
+              <a:schemeClr val="tx1"/>
+            </a:fontRef>
+          </p:style>
+        </p:cxnSp>
+        <p:sp>
+          <p:nvSpPr>
+            <p:cNvPr id="54" name="Textfeld 53"/>
+            <p:cNvSpPr txBox="1"/>
+            <p:nvPr/>
+          </p:nvSpPr>
+          <p:spPr>
+            <a:xfrm>
+              <a:off x="10176541" y="4730507"/>
+              <a:ext cx="691325" cy="379499"/>
+            </a:xfrm>
+            <a:prstGeom prst="rect">
+              <a:avLst/>
+            </a:prstGeom>
+            <a:noFill/>
+          </p:spPr>
+          <p:txBody>
+            <a:bodyPr wrap="none" rtlCol="0">
+              <a:spAutoFit/>
+            </a:bodyPr>
+            <a:lstStyle/>
+            <a:p>
+              <a:r>
+                <a:rPr lang="de-DE" sz="2000" dirty="0"/>
+                <a:t>score</a:t>
+              </a:r>
+            </a:p>
+          </p:txBody>
+        </p:sp>
+        <p:cxnSp>
+          <p:nvCxnSpPr>
+            <p:cNvPr id="57" name="Gerade Verbindung mit Pfeil 56"/>
+            <p:cNvCxnSpPr>
+              <a:stCxn id="45" idx="3"/>
+              <a:endCxn id="54" idx="1"/>
+            </p:cNvCxnSpPr>
+            <p:nvPr/>
+          </p:nvCxnSpPr>
+          <p:spPr>
+            <a:xfrm flipV="1">
+              <a:off x="9397675" y="4920257"/>
+              <a:ext cx="778866" cy="1"/>
+            </a:xfrm>
+            <a:prstGeom prst="straightConnector1">
+              <a:avLst/>
+            </a:prstGeom>
+            <a:ln>
+              <a:tailEnd type="triangle"/>
+            </a:ln>
+          </p:spPr>
+          <p:style>
+            <a:lnRef idx="1">
+              <a:schemeClr val="accent1"/>
+            </a:lnRef>
+            <a:fillRef idx="0">
+              <a:schemeClr val="accent1"/>
+            </a:fillRef>
+            <a:effectRef idx="0">
+              <a:schemeClr val="accent1"/>
+            </a:effectRef>
+            <a:fontRef idx="minor">
+              <a:schemeClr val="tx1"/>
+            </a:fontRef>
+          </p:style>
+        </p:cxnSp>
         <p:sp>
           <p:nvSpPr>
             <p:cNvPr id="59" name="Textfeld 58"/>
@@ -11520,7 +11448,7 @@
           </p:nvSpPr>
           <p:spPr>
             <a:xfrm>
-              <a:off x="757457" y="4543629"/>
+              <a:off x="808669" y="4720201"/>
               <a:ext cx="639919" cy="400110"/>
             </a:xfrm>
             <a:prstGeom prst="rect">
@@ -11535,7 +11463,7 @@
             <a:lstStyle/>
             <a:p>
               <a:r>
-                <a:rPr lang="de-DE" sz="2000"/>
+                <a:rPr lang="de-DE" sz="2000" dirty="0"/>
                 <a:t>plan</a:t>
               </a:r>
             </a:p>
@@ -11552,8 +11480,8 @@
           </p:nvCxnSpPr>
           <p:spPr>
             <a:xfrm flipV="1">
-              <a:off x="1397376" y="3284615"/>
-              <a:ext cx="1203413" cy="1459069"/>
+              <a:off x="1448588" y="3284615"/>
+              <a:ext cx="1152201" cy="1635641"/>
             </a:xfrm>
             <a:prstGeom prst="bentConnector3">
               <a:avLst/>
@@ -11588,8 +11516,8 @@
           </p:nvCxnSpPr>
           <p:spPr>
             <a:xfrm flipV="1">
-              <a:off x="1397376" y="3937288"/>
-              <a:ext cx="1203413" cy="806396"/>
+              <a:off x="1448588" y="3937288"/>
+              <a:ext cx="1152201" cy="982968"/>
             </a:xfrm>
             <a:prstGeom prst="bentConnector3">
               <a:avLst/>
@@ -11624,8 +11552,8 @@
           </p:nvCxnSpPr>
           <p:spPr>
             <a:xfrm flipV="1">
-              <a:off x="1397376" y="4589962"/>
-              <a:ext cx="1203412" cy="153722"/>
+              <a:off x="1448588" y="4589962"/>
+              <a:ext cx="1152200" cy="330294"/>
             </a:xfrm>
             <a:prstGeom prst="bentConnector3">
               <a:avLst/>
@@ -11660,8 +11588,8 @@
           </p:nvCxnSpPr>
           <p:spPr>
             <a:xfrm>
-              <a:off x="1397376" y="4743684"/>
-              <a:ext cx="1203411" cy="498951"/>
+              <a:off x="1448588" y="4920256"/>
+              <a:ext cx="1152199" cy="322379"/>
             </a:xfrm>
             <a:prstGeom prst="bentConnector3">
               <a:avLst/>
@@ -11696,8 +11624,8 @@
           </p:nvCxnSpPr>
           <p:spPr>
             <a:xfrm>
-              <a:off x="1397376" y="4743684"/>
-              <a:ext cx="1203411" cy="1411245"/>
+              <a:off x="1448588" y="4920256"/>
+              <a:ext cx="1152199" cy="1234673"/>
             </a:xfrm>
             <a:prstGeom prst="bentConnector3">
               <a:avLst/>
@@ -11970,22 +11898,14 @@
             </a:pPr>
             <a:r>
               <a:rPr lang="de-DE" sz="4800" b="1" dirty="0"/>
-              <a:t>~15.000</a:t>
+              <a:t>21.711</a:t>
             </a:r>
             <a:br>
               <a:rPr lang="de-DE" sz="3600" b="1" dirty="0"/>
             </a:br>
             <a:r>
-              <a:rPr lang="de-DE" sz="1800" b="1" dirty="0"/>
-              <a:t>Lines </a:t>
-            </a:r>
-            <a:r>
               <a:rPr lang="de-DE" sz="1800" b="1" dirty="0" err="1"/>
-              <a:t>of</a:t>
-            </a:r>
-            <a:r>
-              <a:rPr lang="de-DE" sz="1800" b="1" dirty="0"/>
-              <a:t> Code</a:t>
+              <a:t>LoC</a:t>
             </a:r>
             <a:endParaRPr lang="de-DE" sz="3600" b="1" dirty="0"/>
           </a:p>

</xml_diff>

<commit_message>
Made presentation even more beautiful
</commit_message>
<xml_diff>
--- a/Abschlusspräsentation/Praesentation_newdesign.pptx
+++ b/Abschlusspräsentation/Praesentation_newdesign.pptx
@@ -16001,6 +16001,54 @@
           </a:p>
         </p:txBody>
       </p:sp>
+      <p:sp>
+        <p:nvSpPr>
+          <p:cNvPr id="5" name="Rechteck 4">
+            <a:hlinkClick r:id="rId2"/>
+          </p:cNvPr>
+          <p:cNvSpPr/>
+          <p:nvPr/>
+        </p:nvSpPr>
+        <p:spPr>
+          <a:xfrm>
+            <a:off x="10611853" y="2755231"/>
+            <a:ext cx="1580147" cy="1335505"/>
+          </a:xfrm>
+          <a:prstGeom prst="rect">
+            <a:avLst/>
+          </a:prstGeom>
+          <a:solidFill>
+            <a:schemeClr val="accent1"/>
+          </a:solidFill>
+          <a:ln>
+            <a:noFill/>
+          </a:ln>
+        </p:spPr>
+        <p:style>
+          <a:lnRef idx="2">
+            <a:schemeClr val="accent1">
+              <a:shade val="50000"/>
+            </a:schemeClr>
+          </a:lnRef>
+          <a:fillRef idx="1">
+            <a:schemeClr val="accent1"/>
+          </a:fillRef>
+          <a:effectRef idx="0">
+            <a:schemeClr val="accent1"/>
+          </a:effectRef>
+          <a:fontRef idx="minor">
+            <a:schemeClr val="lt1"/>
+          </a:fontRef>
+        </p:style>
+        <p:txBody>
+          <a:bodyPr rtlCol="0" anchor="ctr"/>
+          <a:lstStyle/>
+          <a:p>
+            <a:pPr algn="ctr"/>
+            <a:endParaRPr lang="de-DE"/>
+          </a:p>
+        </p:txBody>
+      </p:sp>
     </p:spTree>
     <p:extLst>
       <p:ext uri="{BB962C8B-B14F-4D97-AF65-F5344CB8AC3E}">
@@ -16017,7 +16065,7 @@
 <file path=ppt/theme/theme1.xml><?xml version="1.0" encoding="utf-8"?>
 <a:theme xmlns:a="http://schemas.openxmlformats.org/drawingml/2006/main" name="TM04033917[[fn=Berlin]]_novariants">
   <a:themeElements>
-    <a:clrScheme name="Benutzerdefiniert 17">
+    <a:clrScheme name="Benutzerdefiniert 4">
       <a:dk1>
         <a:srgbClr val="83D9CC"/>
       </a:dk1>
@@ -16049,10 +16097,10 @@
         <a:srgbClr val="51C3F9"/>
       </a:accent6>
       <a:hlink>
-        <a:srgbClr val="6B9F25"/>
+        <a:srgbClr val="FFFFFF"/>
       </a:hlink>
       <a:folHlink>
-        <a:srgbClr val="B26B02"/>
+        <a:srgbClr val="FFFFFF"/>
       </a:folHlink>
     </a:clrScheme>
     <a:fontScheme name="Corbel">

</xml_diff>

<commit_message>
Added visualization for constraints.
</commit_message>
<xml_diff>
--- a/Abschlusspräsentation/Praesentation_newdesign.pptx
+++ b/Abschlusspräsentation/Praesentation_newdesign.pptx
@@ -228,7 +228,7 @@
           <a:p>
             <a:fld id="{D1552242-029C-4138-91BD-3BE315DF1C94}" type="datetimeFigureOut">
               <a:rPr lang="de-DE" smtClean="0"/>
-              <a:t>20.03.2017</a:t>
+              <a:t>20.03.17</a:t>
             </a:fld>
             <a:endParaRPr lang="de-DE"/>
           </a:p>
@@ -393,7 +393,7 @@
           <a:p>
             <a:fld id="{74D74940-F9E6-439C-A55C-AF525C59EADC}" type="datetimeFigureOut">
               <a:rPr lang="de-DE" smtClean="0"/>
-              <a:t>20.03.2017</a:t>
+              <a:t>20.03.17</a:t>
             </a:fld>
             <a:endParaRPr lang="de-DE"/>
           </a:p>
@@ -2150,7 +2150,7 @@
           <a:p>
             <a:fld id="{78ABE3C1-DBE1-495D-B57B-2849774B866A}" type="datetimeFigureOut">
               <a:rPr lang="en-US" dirty="0"/>
-              <a:t>3/20/2017</a:t>
+              <a:t>3/20/17</a:t>
             </a:fld>
             <a:endParaRPr lang="en-US" dirty="0"/>
           </a:p>
@@ -2559,7 +2559,7 @@
           <a:p>
             <a:fld id="{446C117F-5CCF-4837-BE5F-2B92066CAFAF}" type="datetimeFigureOut">
               <a:rPr lang="en-US" dirty="0"/>
-              <a:t>3/20/2017</a:t>
+              <a:t>3/20/17</a:t>
             </a:fld>
             <a:endParaRPr lang="en-US" dirty="0"/>
           </a:p>
@@ -2890,7 +2890,7 @@
           <a:p>
             <a:fld id="{84EB90BD-B6CE-46B7-997F-7313B992CCDC}" type="datetimeFigureOut">
               <a:rPr lang="en-US" dirty="0"/>
-              <a:t>3/20/2017</a:t>
+              <a:t>3/20/17</a:t>
             </a:fld>
             <a:endParaRPr lang="en-US" dirty="0"/>
           </a:p>
@@ -3290,7 +3290,7 @@
           <a:p>
             <a:fld id="{CDB9D11F-B188-461D-B23F-39381795C052}" type="datetimeFigureOut">
               <a:rPr lang="en-US" dirty="0"/>
-              <a:t>3/20/2017</a:t>
+              <a:t>3/20/17</a:t>
             </a:fld>
             <a:endParaRPr lang="en-US" dirty="0"/>
           </a:p>
@@ -3853,7 +3853,7 @@
           <a:p>
             <a:fld id="{52E6D8D9-55A2-4063-B0F3-121F44549695}" type="datetimeFigureOut">
               <a:rPr lang="en-US" dirty="0"/>
-              <a:t>3/20/2017</a:t>
+              <a:t>3/20/17</a:t>
             </a:fld>
             <a:endParaRPr lang="en-US" dirty="0"/>
           </a:p>
@@ -4529,7 +4529,7 @@
           <a:p>
             <a:fld id="{D4B24536-994D-4021-A283-9F449C0DB509}" type="datetimeFigureOut">
               <a:rPr lang="en-US" dirty="0"/>
-              <a:t>3/20/2017</a:t>
+              <a:t>3/20/17</a:t>
             </a:fld>
             <a:endParaRPr lang="en-US" dirty="0"/>
           </a:p>
@@ -5437,7 +5437,7 @@
           <a:p>
             <a:fld id="{3CBBBB78-C96F-47B7-AB17-D852CA960AC9}" type="datetimeFigureOut">
               <a:rPr lang="en-US" dirty="0"/>
-              <a:t>3/20/2017</a:t>
+              <a:t>3/20/17</a:t>
             </a:fld>
             <a:endParaRPr lang="en-US" dirty="0"/>
           </a:p>
@@ -5745,7 +5745,7 @@
           <a:p>
             <a:fld id="{1FA3F48C-C7C6-4055-9F49-3777875E72AE}" type="datetimeFigureOut">
               <a:rPr lang="en-US" dirty="0"/>
-              <a:t>3/20/2017</a:t>
+              <a:t>3/20/17</a:t>
             </a:fld>
             <a:endParaRPr lang="en-US" dirty="0"/>
           </a:p>
@@ -6004,7 +6004,7 @@
           <a:p>
             <a:fld id="{6178E61D-D431-422C-9764-11DAFE33AB63}" type="datetimeFigureOut">
               <a:rPr lang="en-US" dirty="0"/>
-              <a:t>3/20/2017</a:t>
+              <a:t>3/20/17</a:t>
             </a:fld>
             <a:endParaRPr lang="en-US" dirty="0"/>
           </a:p>
@@ -6323,7 +6323,7 @@
           <a:p>
             <a:fld id="{12DE42F4-6EEF-4EF7-8ED4-2208F0F89A08}" type="datetimeFigureOut">
               <a:rPr lang="en-US" dirty="0"/>
-              <a:t>3/20/2017</a:t>
+              <a:t>3/20/17</a:t>
             </a:fld>
             <a:endParaRPr lang="en-US" dirty="0"/>
           </a:p>
@@ -6707,7 +6707,7 @@
           <a:p>
             <a:fld id="{30578ACC-22D6-47C1-A373-4FD133E34F3C}" type="datetimeFigureOut">
               <a:rPr lang="en-US" dirty="0"/>
-              <a:t>3/20/2017</a:t>
+              <a:t>3/20/17</a:t>
             </a:fld>
             <a:endParaRPr lang="en-US" dirty="0"/>
           </a:p>
@@ -7078,7 +7078,7 @@
           <a:p>
             <a:fld id="{4E5A6C69-6797-4E8A-BF37-F2C3751466E9}" type="datetimeFigureOut">
               <a:rPr lang="en-US" dirty="0"/>
-              <a:t>3/20/2017</a:t>
+              <a:t>3/20/17</a:t>
             </a:fld>
             <a:endParaRPr lang="en-US" dirty="0"/>
           </a:p>
@@ -7579,7 +7579,7 @@
           <a:p>
             <a:fld id="{D82014A1-A632-4878-A0D3-F52BA7563730}" type="datetimeFigureOut">
               <a:rPr lang="en-US" dirty="0"/>
-              <a:t>3/20/2017</a:t>
+              <a:t>3/20/17</a:t>
             </a:fld>
             <a:endParaRPr lang="en-US" dirty="0"/>
           </a:p>
@@ -7831,7 +7831,7 @@
           <a:p>
             <a:fld id="{CE99F462-093F-4566-844B-4C71F2739DA5}" type="datetimeFigureOut">
               <a:rPr lang="en-US" dirty="0"/>
-              <a:t>3/20/2017</a:t>
+              <a:t>3/20/17</a:t>
             </a:fld>
             <a:endParaRPr lang="en-US" dirty="0"/>
           </a:p>
@@ -7989,7 +7989,7 @@
           <a:p>
             <a:fld id="{3D24A7AC-904D-4781-85BA-7D10C17ED021}" type="datetimeFigureOut">
               <a:rPr lang="en-US" dirty="0"/>
-              <a:t>3/20/2017</a:t>
+              <a:t>3/20/17</a:t>
             </a:fld>
             <a:endParaRPr lang="en-US" dirty="0"/>
           </a:p>
@@ -8374,7 +8374,7 @@
           <a:p>
             <a:fld id="{E331444B-B92B-4E27-8C94-BB93EAF5CB18}" type="datetimeFigureOut">
               <a:rPr lang="en-US" dirty="0"/>
-              <a:t>3/20/2017</a:t>
+              <a:t>3/20/17</a:t>
             </a:fld>
             <a:endParaRPr lang="en-US" dirty="0"/>
           </a:p>
@@ -8778,7 +8778,7 @@
           <a:p>
             <a:fld id="{363EFA5E-FA76-400D-B3DC-F0BA90E6D107}" type="datetimeFigureOut">
               <a:rPr lang="en-US" dirty="0"/>
-              <a:t>3/20/2017</a:t>
+              <a:t>3/20/17</a:t>
             </a:fld>
             <a:endParaRPr lang="en-US" dirty="0"/>
           </a:p>
@@ -9040,7 +9040,7 @@
           <a:p>
             <a:fld id="{9D6E9DEC-419B-4CC5-A080-3B06BD5A8291}" type="datetimeFigureOut">
               <a:rPr lang="en-US" dirty="0"/>
-              <a:t>3/20/2017</a:t>
+              <a:t>3/20/17</a:t>
             </a:fld>
             <a:endParaRPr lang="en-US" dirty="0"/>
           </a:p>
@@ -9584,6 +9584,13 @@
   <p:transition>
     <p:fade/>
   </p:transition>
+  <p:timing>
+    <p:tnLst>
+      <p:par>
+        <p:cTn id="1" dur="indefinite" restart="never" nodeType="tmRoot"/>
+      </p:par>
+    </p:tnLst>
+  </p:timing>
 </p:sld>
 </file>
 
@@ -9623,7 +9630,6 @@
               <a:rPr lang="de-DE" dirty="0"/>
               <a:t>Entwurf: Generierungsalgorithmus</a:t>
             </a:r>
-            <a:endParaRPr lang="de-DE" dirty="0"/>
           </a:p>
         </p:txBody>
       </p:sp>
@@ -10386,18 +10392,25 @@
   <p:clrMapOvr>
     <a:masterClrMapping/>
   </p:clrMapOvr>
-  <mc:AlternateContent xmlns:mc="http://schemas.openxmlformats.org/markup-compatibility/2006">
-    <mc:Choice xmlns:p159="http://schemas.microsoft.com/office/powerpoint/2015/09/main" Requires="p159">
+  <mc:AlternateContent xmlns:mc="http://schemas.openxmlformats.org/markup-compatibility/2006" xmlns:p159="http://schemas.microsoft.com/office/powerpoint/2015/09/main">
+    <mc:Choice Requires="p159">
       <p:transition xmlns:p14="http://schemas.microsoft.com/office/powerpoint/2010/main" spd="slow" p14:dur="2000">
         <p159:morph option="byObject"/>
       </p:transition>
     </mc:Choice>
-    <mc:Fallback>
+    <mc:Fallback xmlns="">
       <p:transition spd="slow">
         <p:fade/>
       </p:transition>
     </mc:Fallback>
   </mc:AlternateContent>
+  <p:timing>
+    <p:tnLst>
+      <p:par>
+        <p:cTn id="1" dur="indefinite" restart="never" nodeType="tmRoot"/>
+      </p:par>
+    </p:tnLst>
+  </p:timing>
 </p:sld>
 </file>
 
@@ -10437,7 +10450,6 @@
               <a:rPr lang="de-DE" dirty="0"/>
               <a:t>Entwurf: Generierungsalgorithmus</a:t>
             </a:r>
-            <a:endParaRPr lang="de-DE" dirty="0"/>
           </a:p>
         </p:txBody>
       </p:sp>
@@ -11350,18 +11362,25 @@
   <p:clrMapOvr>
     <a:masterClrMapping/>
   </p:clrMapOvr>
-  <mc:AlternateContent xmlns:mc="http://schemas.openxmlformats.org/markup-compatibility/2006">
-    <mc:Choice xmlns:p159="http://schemas.microsoft.com/office/powerpoint/2015/09/main" Requires="p159">
+  <mc:AlternateContent xmlns:mc="http://schemas.openxmlformats.org/markup-compatibility/2006" xmlns:p159="http://schemas.microsoft.com/office/powerpoint/2015/09/main">
+    <mc:Choice Requires="p159">
       <p:transition xmlns:p14="http://schemas.microsoft.com/office/powerpoint/2010/main" spd="slow" p14:dur="2000">
         <p159:morph option="byObject"/>
       </p:transition>
     </mc:Choice>
-    <mc:Fallback>
+    <mc:Fallback xmlns="">
       <p:transition spd="slow">
         <p:fade/>
       </p:transition>
     </mc:Fallback>
   </mc:AlternateContent>
+  <p:timing>
+    <p:tnLst>
+      <p:par>
+        <p:cTn id="1" dur="indefinite" restart="never" nodeType="tmRoot"/>
+      </p:par>
+    </p:tnLst>
+  </p:timing>
 </p:sld>
 </file>
 
@@ -11920,8 +11939,8 @@
             </a:fontRef>
           </p:style>
         </p:cxnSp>
-        <mc:AlternateContent xmlns:mc="http://schemas.openxmlformats.org/markup-compatibility/2006">
-          <mc:Choice xmlns:a14="http://schemas.microsoft.com/office/drawing/2010/main" Requires="a14">
+        <mc:AlternateContent xmlns:mc="http://schemas.openxmlformats.org/markup-compatibility/2006" xmlns:a14="http://schemas.microsoft.com/office/drawing/2010/main">
+          <mc:Choice Requires="a14">
             <p:sp>
               <p:nvSpPr>
                 <p:cNvPr id="35" name="Rechteck 34"/>
@@ -11976,7 +11995,7 @@
                                 <a:solidFill>
                                   <a:schemeClr val="tx2"/>
                                 </a:solidFill>
-                                <a:latin typeface="Cambria Math" panose="02040503050406030204" pitchFamily="18" charset="0"/>
+                                <a:latin typeface="Cambria Math" charset="0"/>
                               </a:rPr>
                             </m:ctrlPr>
                           </m:dPr>
@@ -11988,7 +12007,7 @@
                                     <a:solidFill>
                                       <a:schemeClr val="tx2"/>
                                     </a:solidFill>
-                                    <a:latin typeface="Cambria Math" panose="02040503050406030204" pitchFamily="18" charset="0"/>
+                                    <a:latin typeface="Cambria Math" charset="0"/>
                                   </a:rPr>
                                 </m:ctrlPr>
                               </m:eqArrPr>
@@ -12130,7 +12149,7 @@
               </p:txBody>
             </p:sp>
           </mc:Choice>
-          <mc:Fallback>
+          <mc:Fallback xmlns="">
             <p:sp>
               <p:nvSpPr>
                 <p:cNvPr id="35" name="Rechteck 34"/>
@@ -12620,6 +12639,13 @@
   <p:transition>
     <p:fade/>
   </p:transition>
+  <p:timing>
+    <p:tnLst>
+      <p:par>
+        <p:cTn id="1" dur="indefinite" restart="never" nodeType="tmRoot"/>
+      </p:par>
+    </p:tnLst>
+  </p:timing>
 </p:sld>
 </file>
 
@@ -12690,6 +12716,10 @@
             <a:r>
               <a:rPr lang="de-DE" sz="4800" b="1" dirty="0"/>
               <a:t>21.711</a:t>
+            </a:r>
+            <a:r>
+              <a:rPr lang="de-DE" sz="3600" b="1" dirty="0"/>
+              <a:t/>
             </a:r>
             <a:br>
               <a:rPr lang="de-DE" sz="3600" b="1" dirty="0"/>
@@ -12896,6 +12926,10 @@
               <a:rPr lang="de-DE" sz="4800" b="1" dirty="0"/>
               <a:t>~45%</a:t>
             </a:r>
+            <a:r>
+              <a:rPr lang="de-DE" sz="3600" b="1" dirty="0"/>
+              <a:t/>
+            </a:r>
             <a:br>
               <a:rPr lang="de-DE" sz="3600" b="1" dirty="0"/>
             </a:br>
@@ -13101,6 +13135,10 @@
               <a:rPr lang="de-DE" sz="4800" b="1" dirty="0"/>
               <a:t>~60%</a:t>
             </a:r>
+            <a:r>
+              <a:rPr lang="de-DE" sz="3600" b="1" dirty="0"/>
+              <a:t/>
+            </a:r>
             <a:br>
               <a:rPr lang="de-DE" sz="3600" b="1" dirty="0"/>
             </a:br>
@@ -13518,6 +13556,10 @@
               <a:rPr lang="de-DE" sz="4800" b="1" dirty="0"/>
               <a:t>&gt;1.400</a:t>
             </a:r>
+            <a:r>
+              <a:rPr lang="de-DE" sz="3600" b="1" dirty="0"/>
+              <a:t/>
+            </a:r>
             <a:br>
               <a:rPr lang="de-DE" sz="3600" b="1" dirty="0"/>
             </a:br>
@@ -13723,6 +13765,10 @@
               <a:rPr lang="de-DE" sz="4800" b="1" dirty="0"/>
               <a:t>&gt;220</a:t>
             </a:r>
+            <a:r>
+              <a:rPr lang="de-DE" sz="3600" b="1" dirty="0"/>
+              <a:t/>
+            </a:r>
             <a:br>
               <a:rPr lang="de-DE" sz="3600" b="1" dirty="0"/>
             </a:br>
@@ -13747,6 +13793,13 @@
   <p:transition>
     <p:fade/>
   </p:transition>
+  <p:timing>
+    <p:tnLst>
+      <p:par>
+        <p:cTn id="1" dur="indefinite" restart="never" nodeType="tmRoot"/>
+      </p:par>
+    </p:tnLst>
+  </p:timing>
 </p:sld>
 </file>
 
@@ -13879,6 +13932,13 @@
   <p:transition>
     <p:fade/>
   </p:transition>
+  <p:timing>
+    <p:tnLst>
+      <p:par>
+        <p:cTn id="1" dur="indefinite" restart="never" nodeType="tmRoot"/>
+      </p:par>
+    </p:tnLst>
+  </p:timing>
 </p:sld>
 </file>
 
@@ -13978,6 +14038,13 @@
   <p:transition>
     <p:fade/>
   </p:transition>
+  <p:timing>
+    <p:tnLst>
+      <p:par>
+        <p:cTn id="1" dur="indefinite" restart="never" nodeType="tmRoot"/>
+      </p:par>
+    </p:tnLst>
+  </p:timing>
 </p:sld>
 </file>
 
@@ -14055,6 +14122,13 @@
   <p:transition>
     <p:fade/>
   </p:transition>
+  <p:timing>
+    <p:tnLst>
+      <p:par>
+        <p:cTn id="1" dur="indefinite" restart="never" nodeType="tmRoot"/>
+      </p:par>
+    </p:tnLst>
+  </p:timing>
 </p:sld>
 </file>
 
@@ -14202,6 +14276,13 @@
   <p:transition>
     <p:fade/>
   </p:transition>
+  <p:timing>
+    <p:tnLst>
+      <p:par>
+        <p:cTn id="1" dur="indefinite" restart="never" nodeType="tmRoot"/>
+      </p:par>
+    </p:tnLst>
+  </p:timing>
 </p:sld>
 </file>
 
@@ -17522,6 +17603,13 @@
   <p:transition>
     <p:fade/>
   </p:transition>
+  <p:timing>
+    <p:tnLst>
+      <p:par>
+        <p:cTn id="1" dur="indefinite" restart="never" nodeType="tmRoot"/>
+      </p:par>
+    </p:tnLst>
+  </p:timing>
 </p:sld>
 </file>
 
@@ -17576,7 +17664,7 @@
         </p:nvSpPr>
         <p:spPr>
           <a:xfrm>
-            <a:off x="669222" y="3572548"/>
+            <a:off x="669222" y="5272771"/>
             <a:ext cx="3070034" cy="576262"/>
           </a:xfrm>
         </p:spPr>
@@ -17609,7 +17697,7 @@
         </p:nvSpPr>
         <p:spPr>
           <a:xfrm>
-            <a:off x="3964301" y="3572548"/>
+            <a:off x="3964301" y="5272771"/>
             <a:ext cx="3063240" cy="576262"/>
           </a:xfrm>
         </p:spPr>
@@ -17637,7 +17725,7 @@
         </p:nvSpPr>
         <p:spPr>
           <a:xfrm>
-            <a:off x="7232432" y="3572548"/>
+            <a:off x="7232432" y="5272771"/>
             <a:ext cx="3070025" cy="576262"/>
           </a:xfrm>
         </p:spPr>
@@ -17657,6 +17745,743 @@
           </a:p>
         </p:txBody>
       </p:sp>
+      <p:grpSp>
+        <p:nvGrpSpPr>
+          <p:cNvPr id="37" name="Gruppierung 36"/>
+          <p:cNvGrpSpPr/>
+          <p:nvPr/>
+        </p:nvGrpSpPr>
+        <p:grpSpPr>
+          <a:xfrm>
+            <a:off x="1119692" y="3446319"/>
+            <a:ext cx="2109234" cy="1229069"/>
+            <a:chOff x="1028700" y="3986218"/>
+            <a:chExt cx="2109234" cy="1229069"/>
+          </a:xfrm>
+        </p:grpSpPr>
+        <p:sp>
+          <p:nvSpPr>
+            <p:cNvPr id="4" name="Rechteck 3"/>
+            <p:cNvSpPr/>
+            <p:nvPr/>
+          </p:nvSpPr>
+          <p:spPr>
+            <a:xfrm>
+              <a:off x="1028700" y="3986218"/>
+              <a:ext cx="657225" cy="657225"/>
+            </a:xfrm>
+            <a:prstGeom prst="rect">
+              <a:avLst/>
+            </a:prstGeom>
+          </p:spPr>
+          <p:style>
+            <a:lnRef idx="2">
+              <a:schemeClr val="accent1">
+                <a:shade val="50000"/>
+              </a:schemeClr>
+            </a:lnRef>
+            <a:fillRef idx="1">
+              <a:schemeClr val="accent1"/>
+            </a:fillRef>
+            <a:effectRef idx="0">
+              <a:schemeClr val="accent1"/>
+            </a:effectRef>
+            <a:fontRef idx="minor">
+              <a:schemeClr val="lt1"/>
+            </a:fontRef>
+          </p:style>
+          <p:txBody>
+            <a:bodyPr rtlCol="0" anchor="ctr"/>
+            <a:lstStyle/>
+            <a:p>
+              <a:pPr algn="ctr"/>
+              <a:r>
+                <a:rPr lang="de-DE" sz="3600" dirty="0" smtClean="0">
+                  <a:solidFill>
+                    <a:schemeClr val="tx2"/>
+                  </a:solidFill>
+                </a:rPr>
+                <a:t>A</a:t>
+              </a:r>
+              <a:endParaRPr lang="de-DE" dirty="0">
+                <a:solidFill>
+                  <a:schemeClr val="tx2"/>
+                </a:solidFill>
+              </a:endParaRPr>
+            </a:p>
+          </p:txBody>
+        </p:sp>
+        <p:sp>
+          <p:nvSpPr>
+            <p:cNvPr id="8" name="Rechteck 7"/>
+            <p:cNvSpPr/>
+            <p:nvPr/>
+          </p:nvSpPr>
+          <p:spPr>
+            <a:xfrm>
+              <a:off x="2480709" y="4558062"/>
+              <a:ext cx="657225" cy="657225"/>
+            </a:xfrm>
+            <a:prstGeom prst="rect">
+              <a:avLst/>
+            </a:prstGeom>
+          </p:spPr>
+          <p:style>
+            <a:lnRef idx="2">
+              <a:schemeClr val="accent1">
+                <a:shade val="50000"/>
+              </a:schemeClr>
+            </a:lnRef>
+            <a:fillRef idx="1">
+              <a:schemeClr val="accent1"/>
+            </a:fillRef>
+            <a:effectRef idx="0">
+              <a:schemeClr val="accent1"/>
+            </a:effectRef>
+            <a:fontRef idx="minor">
+              <a:schemeClr val="lt1"/>
+            </a:fontRef>
+          </p:style>
+          <p:txBody>
+            <a:bodyPr rtlCol="0" anchor="ctr"/>
+            <a:lstStyle/>
+            <a:p>
+              <a:pPr algn="ctr"/>
+              <a:r>
+                <a:rPr lang="de-DE" sz="3600" dirty="0">
+                  <a:solidFill>
+                    <a:schemeClr val="tx2"/>
+                  </a:solidFill>
+                </a:rPr>
+                <a:t>B</a:t>
+              </a:r>
+              <a:endParaRPr lang="de-DE" dirty="0">
+                <a:solidFill>
+                  <a:schemeClr val="tx2"/>
+                </a:solidFill>
+              </a:endParaRPr>
+            </a:p>
+          </p:txBody>
+        </p:sp>
+        <p:cxnSp>
+          <p:nvCxnSpPr>
+            <p:cNvPr id="9" name="Gerade Verbindung mit Pfeil 8"/>
+            <p:cNvCxnSpPr>
+              <a:stCxn id="4" idx="3"/>
+              <a:endCxn id="8" idx="1"/>
+            </p:cNvCxnSpPr>
+            <p:nvPr/>
+          </p:nvCxnSpPr>
+          <p:spPr>
+            <a:xfrm>
+              <a:off x="1685925" y="4314831"/>
+              <a:ext cx="794784" cy="571844"/>
+            </a:xfrm>
+            <a:prstGeom prst="straightConnector1">
+              <a:avLst/>
+            </a:prstGeom>
+            <a:ln>
+              <a:tailEnd type="triangle"/>
+            </a:ln>
+          </p:spPr>
+          <p:style>
+            <a:lnRef idx="1">
+              <a:schemeClr val="accent1"/>
+            </a:lnRef>
+            <a:fillRef idx="0">
+              <a:schemeClr val="accent1"/>
+            </a:fillRef>
+            <a:effectRef idx="0">
+              <a:schemeClr val="accent1"/>
+            </a:effectRef>
+            <a:fontRef idx="minor">
+              <a:schemeClr val="tx1"/>
+            </a:fontRef>
+          </p:style>
+        </p:cxnSp>
+      </p:grpSp>
+      <p:grpSp>
+        <p:nvGrpSpPr>
+          <p:cNvPr id="38" name="Gruppierung 37"/>
+          <p:cNvGrpSpPr/>
+          <p:nvPr/>
+        </p:nvGrpSpPr>
+        <p:grpSpPr>
+          <a:xfrm>
+            <a:off x="4179277" y="2752327"/>
+            <a:ext cx="2628900" cy="2468461"/>
+            <a:chOff x="4100513" y="2752327"/>
+            <a:chExt cx="2628900" cy="2468461"/>
+          </a:xfrm>
+        </p:grpSpPr>
+        <p:sp>
+          <p:nvSpPr>
+            <p:cNvPr id="13" name="Rechteck 12"/>
+            <p:cNvSpPr/>
+            <p:nvPr/>
+          </p:nvSpPr>
+          <p:spPr>
+            <a:xfrm>
+              <a:off x="4510088" y="3328992"/>
+              <a:ext cx="657225" cy="657225"/>
+            </a:xfrm>
+            <a:prstGeom prst="rect">
+              <a:avLst/>
+            </a:prstGeom>
+          </p:spPr>
+          <p:style>
+            <a:lnRef idx="2">
+              <a:schemeClr val="accent1">
+                <a:shade val="50000"/>
+              </a:schemeClr>
+            </a:lnRef>
+            <a:fillRef idx="1">
+              <a:schemeClr val="accent1"/>
+            </a:fillRef>
+            <a:effectRef idx="0">
+              <a:schemeClr val="accent1"/>
+            </a:effectRef>
+            <a:fontRef idx="minor">
+              <a:schemeClr val="lt1"/>
+            </a:fontRef>
+          </p:style>
+          <p:txBody>
+            <a:bodyPr rtlCol="0" anchor="ctr"/>
+            <a:lstStyle/>
+            <a:p>
+              <a:pPr algn="ctr"/>
+              <a:r>
+                <a:rPr lang="de-DE" sz="3600" dirty="0" smtClean="0">
+                  <a:solidFill>
+                    <a:schemeClr val="tx2"/>
+                  </a:solidFill>
+                </a:rPr>
+                <a:t>A</a:t>
+              </a:r>
+              <a:endParaRPr lang="de-DE" dirty="0">
+                <a:solidFill>
+                  <a:schemeClr val="tx2"/>
+                </a:solidFill>
+              </a:endParaRPr>
+            </a:p>
+          </p:txBody>
+        </p:sp>
+        <p:sp>
+          <p:nvSpPr>
+            <p:cNvPr id="14" name="Rechteck 13"/>
+            <p:cNvSpPr/>
+            <p:nvPr/>
+          </p:nvSpPr>
+          <p:spPr>
+            <a:xfrm>
+              <a:off x="5390148" y="3643657"/>
+              <a:ext cx="657225" cy="657225"/>
+            </a:xfrm>
+            <a:prstGeom prst="rect">
+              <a:avLst/>
+            </a:prstGeom>
+          </p:spPr>
+          <p:style>
+            <a:lnRef idx="2">
+              <a:schemeClr val="accent1">
+                <a:shade val="50000"/>
+              </a:schemeClr>
+            </a:lnRef>
+            <a:fillRef idx="1">
+              <a:schemeClr val="accent1"/>
+            </a:fillRef>
+            <a:effectRef idx="0">
+              <a:schemeClr val="accent1"/>
+            </a:effectRef>
+            <a:fontRef idx="minor">
+              <a:schemeClr val="lt1"/>
+            </a:fontRef>
+          </p:style>
+          <p:txBody>
+            <a:bodyPr rtlCol="0" anchor="ctr"/>
+            <a:lstStyle/>
+            <a:p>
+              <a:pPr algn="ctr"/>
+              <a:r>
+                <a:rPr lang="de-DE" sz="3600" dirty="0">
+                  <a:solidFill>
+                    <a:schemeClr val="tx2"/>
+                  </a:solidFill>
+                </a:rPr>
+                <a:t>B</a:t>
+              </a:r>
+              <a:endParaRPr lang="de-DE" dirty="0">
+                <a:solidFill>
+                  <a:schemeClr val="tx2"/>
+                </a:solidFill>
+              </a:endParaRPr>
+            </a:p>
+          </p:txBody>
+        </p:sp>
+        <p:sp>
+          <p:nvSpPr>
+            <p:cNvPr id="15" name="Rechteck 14"/>
+            <p:cNvSpPr/>
+            <p:nvPr/>
+          </p:nvSpPr>
+          <p:spPr>
+            <a:xfrm>
+              <a:off x="4618173" y="4203552"/>
+              <a:ext cx="657225" cy="657225"/>
+            </a:xfrm>
+            <a:prstGeom prst="rect">
+              <a:avLst/>
+            </a:prstGeom>
+          </p:spPr>
+          <p:style>
+            <a:lnRef idx="2">
+              <a:schemeClr val="accent1">
+                <a:shade val="50000"/>
+              </a:schemeClr>
+            </a:lnRef>
+            <a:fillRef idx="1">
+              <a:schemeClr val="accent1"/>
+            </a:fillRef>
+            <a:effectRef idx="0">
+              <a:schemeClr val="accent1"/>
+            </a:effectRef>
+            <a:fontRef idx="minor">
+              <a:schemeClr val="lt1"/>
+            </a:fontRef>
+          </p:style>
+          <p:txBody>
+            <a:bodyPr rtlCol="0" anchor="ctr"/>
+            <a:lstStyle/>
+            <a:p>
+              <a:pPr algn="ctr"/>
+              <a:r>
+                <a:rPr lang="de-DE" sz="3600" dirty="0">
+                  <a:solidFill>
+                    <a:schemeClr val="tx2"/>
+                  </a:solidFill>
+                </a:rPr>
+                <a:t>C</a:t>
+              </a:r>
+              <a:endParaRPr lang="de-DE" dirty="0">
+                <a:solidFill>
+                  <a:schemeClr val="tx2"/>
+                </a:solidFill>
+              </a:endParaRPr>
+            </a:p>
+          </p:txBody>
+        </p:sp>
+        <p:sp>
+          <p:nvSpPr>
+            <p:cNvPr id="16" name="Rechteck 15"/>
+            <p:cNvSpPr/>
+            <p:nvPr/>
+          </p:nvSpPr>
+          <p:spPr>
+            <a:xfrm>
+              <a:off x="5552522" y="4367896"/>
+              <a:ext cx="657225" cy="657225"/>
+            </a:xfrm>
+            <a:prstGeom prst="rect">
+              <a:avLst/>
+            </a:prstGeom>
+          </p:spPr>
+          <p:style>
+            <a:lnRef idx="2">
+              <a:schemeClr val="accent1">
+                <a:shade val="50000"/>
+              </a:schemeClr>
+            </a:lnRef>
+            <a:fillRef idx="1">
+              <a:schemeClr val="accent1"/>
+            </a:fillRef>
+            <a:effectRef idx="0">
+              <a:schemeClr val="accent1"/>
+            </a:effectRef>
+            <a:fontRef idx="minor">
+              <a:schemeClr val="lt1"/>
+            </a:fontRef>
+          </p:style>
+          <p:txBody>
+            <a:bodyPr rtlCol="0" anchor="ctr"/>
+            <a:lstStyle/>
+            <a:p>
+              <a:pPr algn="ctr"/>
+              <a:r>
+                <a:rPr lang="de-DE" sz="3600" dirty="0">
+                  <a:solidFill>
+                    <a:schemeClr val="tx2"/>
+                  </a:solidFill>
+                </a:rPr>
+                <a:t>D</a:t>
+              </a:r>
+              <a:endParaRPr lang="de-DE" dirty="0">
+                <a:solidFill>
+                  <a:schemeClr val="tx2"/>
+                </a:solidFill>
+              </a:endParaRPr>
+            </a:p>
+          </p:txBody>
+        </p:sp>
+        <p:sp>
+          <p:nvSpPr>
+            <p:cNvPr id="24" name="Eckige Klammer links/rechts 23"/>
+            <p:cNvSpPr/>
+            <p:nvPr/>
+          </p:nvSpPr>
+          <p:spPr>
+            <a:xfrm>
+              <a:off x="4100513" y="2752327"/>
+              <a:ext cx="2628900" cy="2468461"/>
+            </a:xfrm>
+            <a:prstGeom prst="bracketPair">
+              <a:avLst/>
+            </a:prstGeom>
+          </p:spPr>
+          <p:style>
+            <a:lnRef idx="1">
+              <a:schemeClr val="accent1"/>
+            </a:lnRef>
+            <a:fillRef idx="0">
+              <a:schemeClr val="accent1"/>
+            </a:fillRef>
+            <a:effectRef idx="0">
+              <a:schemeClr val="accent1"/>
+            </a:effectRef>
+            <a:fontRef idx="minor">
+              <a:schemeClr val="tx1"/>
+            </a:fontRef>
+          </p:style>
+          <p:txBody>
+            <a:bodyPr rtlCol="0" anchor="ctr"/>
+            <a:lstStyle/>
+            <a:p>
+              <a:pPr algn="ctr"/>
+              <a:endParaRPr lang="de-DE"/>
+            </a:p>
+          </p:txBody>
+        </p:sp>
+        <p:sp>
+          <p:nvSpPr>
+            <p:cNvPr id="30" name="Textfeld 29"/>
+            <p:cNvSpPr txBox="1"/>
+            <p:nvPr/>
+          </p:nvSpPr>
+          <p:spPr>
+            <a:xfrm>
+              <a:off x="4692650" y="2855994"/>
+              <a:ext cx="1444626" cy="369332"/>
+            </a:xfrm>
+            <a:prstGeom prst="rect">
+              <a:avLst/>
+            </a:prstGeom>
+            <a:noFill/>
+          </p:spPr>
+          <p:txBody>
+            <a:bodyPr wrap="none" rtlCol="0">
+              <a:spAutoFit/>
+            </a:bodyPr>
+            <a:lstStyle/>
+            <a:p>
+              <a:r>
+                <a:rPr lang="de-DE" dirty="0" smtClean="0"/>
+                <a:t>min. 10 ECTS</a:t>
+              </a:r>
+              <a:endParaRPr lang="de-DE" dirty="0"/>
+            </a:p>
+          </p:txBody>
+        </p:sp>
+      </p:grpSp>
+      <p:grpSp>
+        <p:nvGrpSpPr>
+          <p:cNvPr id="39" name="Gruppierung 38"/>
+          <p:cNvGrpSpPr/>
+          <p:nvPr/>
+        </p:nvGrpSpPr>
+        <p:grpSpPr>
+          <a:xfrm>
+            <a:off x="7452994" y="2752327"/>
+            <a:ext cx="2628900" cy="2468461"/>
+            <a:chOff x="4100513" y="2752327"/>
+            <a:chExt cx="2628900" cy="2468461"/>
+          </a:xfrm>
+        </p:grpSpPr>
+        <p:sp>
+          <p:nvSpPr>
+            <p:cNvPr id="40" name="Rechteck 39"/>
+            <p:cNvSpPr/>
+            <p:nvPr/>
+          </p:nvSpPr>
+          <p:spPr>
+            <a:xfrm>
+              <a:off x="4510088" y="3328992"/>
+              <a:ext cx="657225" cy="657225"/>
+            </a:xfrm>
+            <a:prstGeom prst="rect">
+              <a:avLst/>
+            </a:prstGeom>
+          </p:spPr>
+          <p:style>
+            <a:lnRef idx="2">
+              <a:schemeClr val="accent1">
+                <a:shade val="50000"/>
+              </a:schemeClr>
+            </a:lnRef>
+            <a:fillRef idx="1">
+              <a:schemeClr val="accent1"/>
+            </a:fillRef>
+            <a:effectRef idx="0">
+              <a:schemeClr val="accent1"/>
+            </a:effectRef>
+            <a:fontRef idx="minor">
+              <a:schemeClr val="lt1"/>
+            </a:fontRef>
+          </p:style>
+          <p:txBody>
+            <a:bodyPr rtlCol="0" anchor="ctr"/>
+            <a:lstStyle/>
+            <a:p>
+              <a:pPr algn="ctr"/>
+              <a:r>
+                <a:rPr lang="de-DE" sz="3600" dirty="0" smtClean="0">
+                  <a:solidFill>
+                    <a:schemeClr val="tx2"/>
+                  </a:solidFill>
+                </a:rPr>
+                <a:t>A</a:t>
+              </a:r>
+              <a:endParaRPr lang="de-DE" dirty="0">
+                <a:solidFill>
+                  <a:schemeClr val="tx2"/>
+                </a:solidFill>
+              </a:endParaRPr>
+            </a:p>
+          </p:txBody>
+        </p:sp>
+        <p:sp>
+          <p:nvSpPr>
+            <p:cNvPr id="41" name="Rechteck 40"/>
+            <p:cNvSpPr/>
+            <p:nvPr/>
+          </p:nvSpPr>
+          <p:spPr>
+            <a:xfrm>
+              <a:off x="5390148" y="3643657"/>
+              <a:ext cx="657225" cy="657225"/>
+            </a:xfrm>
+            <a:prstGeom prst="rect">
+              <a:avLst/>
+            </a:prstGeom>
+          </p:spPr>
+          <p:style>
+            <a:lnRef idx="2">
+              <a:schemeClr val="accent1">
+                <a:shade val="50000"/>
+              </a:schemeClr>
+            </a:lnRef>
+            <a:fillRef idx="1">
+              <a:schemeClr val="accent1"/>
+            </a:fillRef>
+            <a:effectRef idx="0">
+              <a:schemeClr val="accent1"/>
+            </a:effectRef>
+            <a:fontRef idx="minor">
+              <a:schemeClr val="lt1"/>
+            </a:fontRef>
+          </p:style>
+          <p:txBody>
+            <a:bodyPr rtlCol="0" anchor="ctr"/>
+            <a:lstStyle/>
+            <a:p>
+              <a:pPr algn="ctr"/>
+              <a:r>
+                <a:rPr lang="de-DE" sz="3600" dirty="0">
+                  <a:solidFill>
+                    <a:schemeClr val="tx2"/>
+                  </a:solidFill>
+                </a:rPr>
+                <a:t>B</a:t>
+              </a:r>
+              <a:endParaRPr lang="de-DE" dirty="0">
+                <a:solidFill>
+                  <a:schemeClr val="tx2"/>
+                </a:solidFill>
+              </a:endParaRPr>
+            </a:p>
+          </p:txBody>
+        </p:sp>
+        <p:sp>
+          <p:nvSpPr>
+            <p:cNvPr id="42" name="Rechteck 41"/>
+            <p:cNvSpPr/>
+            <p:nvPr/>
+          </p:nvSpPr>
+          <p:spPr>
+            <a:xfrm>
+              <a:off x="4618173" y="4203552"/>
+              <a:ext cx="657225" cy="657225"/>
+            </a:xfrm>
+            <a:prstGeom prst="rect">
+              <a:avLst/>
+            </a:prstGeom>
+          </p:spPr>
+          <p:style>
+            <a:lnRef idx="2">
+              <a:schemeClr val="accent1">
+                <a:shade val="50000"/>
+              </a:schemeClr>
+            </a:lnRef>
+            <a:fillRef idx="1">
+              <a:schemeClr val="accent1"/>
+            </a:fillRef>
+            <a:effectRef idx="0">
+              <a:schemeClr val="accent1"/>
+            </a:effectRef>
+            <a:fontRef idx="minor">
+              <a:schemeClr val="lt1"/>
+            </a:fontRef>
+          </p:style>
+          <p:txBody>
+            <a:bodyPr rtlCol="0" anchor="ctr"/>
+            <a:lstStyle/>
+            <a:p>
+              <a:pPr algn="ctr"/>
+              <a:r>
+                <a:rPr lang="de-DE" sz="3600" dirty="0">
+                  <a:solidFill>
+                    <a:schemeClr val="tx2"/>
+                  </a:solidFill>
+                </a:rPr>
+                <a:t>C</a:t>
+              </a:r>
+              <a:endParaRPr lang="de-DE" dirty="0">
+                <a:solidFill>
+                  <a:schemeClr val="tx2"/>
+                </a:solidFill>
+              </a:endParaRPr>
+            </a:p>
+          </p:txBody>
+        </p:sp>
+        <p:sp>
+          <p:nvSpPr>
+            <p:cNvPr id="43" name="Rechteck 42"/>
+            <p:cNvSpPr/>
+            <p:nvPr/>
+          </p:nvSpPr>
+          <p:spPr>
+            <a:xfrm>
+              <a:off x="5552522" y="4367896"/>
+              <a:ext cx="657225" cy="657225"/>
+            </a:xfrm>
+            <a:prstGeom prst="rect">
+              <a:avLst/>
+            </a:prstGeom>
+          </p:spPr>
+          <p:style>
+            <a:lnRef idx="2">
+              <a:schemeClr val="accent1">
+                <a:shade val="50000"/>
+              </a:schemeClr>
+            </a:lnRef>
+            <a:fillRef idx="1">
+              <a:schemeClr val="accent1"/>
+            </a:fillRef>
+            <a:effectRef idx="0">
+              <a:schemeClr val="accent1"/>
+            </a:effectRef>
+            <a:fontRef idx="minor">
+              <a:schemeClr val="lt1"/>
+            </a:fontRef>
+          </p:style>
+          <p:txBody>
+            <a:bodyPr rtlCol="0" anchor="ctr"/>
+            <a:lstStyle/>
+            <a:p>
+              <a:pPr algn="ctr"/>
+              <a:r>
+                <a:rPr lang="de-DE" sz="3600" dirty="0">
+                  <a:solidFill>
+                    <a:schemeClr val="tx2"/>
+                  </a:solidFill>
+                </a:rPr>
+                <a:t>D</a:t>
+              </a:r>
+              <a:endParaRPr lang="de-DE" dirty="0">
+                <a:solidFill>
+                  <a:schemeClr val="tx2"/>
+                </a:solidFill>
+              </a:endParaRPr>
+            </a:p>
+          </p:txBody>
+        </p:sp>
+        <p:sp>
+          <p:nvSpPr>
+            <p:cNvPr id="44" name="Eckige Klammer links/rechts 43"/>
+            <p:cNvSpPr/>
+            <p:nvPr/>
+          </p:nvSpPr>
+          <p:spPr>
+            <a:xfrm>
+              <a:off x="4100513" y="2752327"/>
+              <a:ext cx="2628900" cy="2468461"/>
+            </a:xfrm>
+            <a:prstGeom prst="bracketPair">
+              <a:avLst/>
+            </a:prstGeom>
+          </p:spPr>
+          <p:style>
+            <a:lnRef idx="1">
+              <a:schemeClr val="accent1"/>
+            </a:lnRef>
+            <a:fillRef idx="0">
+              <a:schemeClr val="accent1"/>
+            </a:fillRef>
+            <a:effectRef idx="0">
+              <a:schemeClr val="accent1"/>
+            </a:effectRef>
+            <a:fontRef idx="minor">
+              <a:schemeClr val="tx1"/>
+            </a:fontRef>
+          </p:style>
+          <p:txBody>
+            <a:bodyPr rtlCol="0" anchor="ctr"/>
+            <a:lstStyle/>
+            <a:p>
+              <a:pPr algn="ctr"/>
+              <a:endParaRPr lang="de-DE"/>
+            </a:p>
+          </p:txBody>
+        </p:sp>
+        <p:sp>
+          <p:nvSpPr>
+            <p:cNvPr id="45" name="Textfeld 44"/>
+            <p:cNvSpPr txBox="1"/>
+            <p:nvPr/>
+          </p:nvSpPr>
+          <p:spPr>
+            <a:xfrm>
+              <a:off x="4746571" y="2840903"/>
+              <a:ext cx="1255472" cy="369332"/>
+            </a:xfrm>
+            <a:prstGeom prst="rect">
+              <a:avLst/>
+            </a:prstGeom>
+            <a:noFill/>
+          </p:spPr>
+          <p:txBody>
+            <a:bodyPr wrap="none" rtlCol="0">
+              <a:spAutoFit/>
+            </a:bodyPr>
+            <a:lstStyle/>
+            <a:p>
+              <a:r>
+                <a:rPr lang="de-DE" smtClean="0"/>
+                <a:t>2-3 Module</a:t>
+              </a:r>
+              <a:endParaRPr lang="de-DE" dirty="0"/>
+            </a:p>
+          </p:txBody>
+        </p:sp>
+      </p:grpSp>
     </p:spTree>
     <p:extLst>
       <p:ext uri="{BB962C8B-B14F-4D97-AF65-F5344CB8AC3E}">
@@ -17670,6 +18495,13 @@
   <p:transition>
     <p:fade/>
   </p:transition>
+  <p:timing>
+    <p:tnLst>
+      <p:par>
+        <p:cTn id="1" dur="indefinite" restart="never" nodeType="tmRoot"/>
+      </p:par>
+    </p:tnLst>
+  </p:timing>
 </p:sld>
 </file>
 
@@ -17709,7 +18541,6 @@
               <a:rPr lang="de-DE" dirty="0"/>
               <a:t>Entwurf: Generierungsalgorithmus</a:t>
             </a:r>
-            <a:endParaRPr lang="de-DE" dirty="0"/>
           </a:p>
         </p:txBody>
       </p:sp>
@@ -18760,7 +19591,6 @@
               <a:rPr lang="de-DE" dirty="0"/>
               <a:t>Entwurf: Generierungsalgorithmus</a:t>
             </a:r>
-            <a:endParaRPr lang="de-DE" dirty="0"/>
           </a:p>
         </p:txBody>
       </p:sp>
@@ -19319,13 +20149,13 @@
   <p:clrMapOvr>
     <a:masterClrMapping/>
   </p:clrMapOvr>
-  <mc:AlternateContent xmlns:mc="http://schemas.openxmlformats.org/markup-compatibility/2006">
-    <mc:Choice xmlns:p159="http://schemas.microsoft.com/office/powerpoint/2015/09/main" Requires="p159">
+  <mc:AlternateContent xmlns:mc="http://schemas.openxmlformats.org/markup-compatibility/2006" xmlns:p159="http://schemas.microsoft.com/office/powerpoint/2015/09/main">
+    <mc:Choice Requires="p159">
       <p:transition spd="slow">
         <p159:morph option="byObject"/>
       </p:transition>
     </mc:Choice>
-    <mc:Fallback>
+    <mc:Fallback xmlns="">
       <p:transition spd="slow">
         <p:fade/>
       </p:transition>
@@ -19819,7 +20649,6 @@
               <a:rPr lang="de-DE" dirty="0"/>
               <a:t>Entwurf: Generierungsalgorithmus</a:t>
             </a:r>
-            <a:endParaRPr lang="de-DE" dirty="0"/>
           </a:p>
         </p:txBody>
       </p:sp>
@@ -19928,13 +20757,13 @@
   <p:clrMapOvr>
     <a:masterClrMapping/>
   </p:clrMapOvr>
-  <mc:AlternateContent xmlns:mc="http://schemas.openxmlformats.org/markup-compatibility/2006">
-    <mc:Choice xmlns:p159="http://schemas.microsoft.com/office/powerpoint/2015/09/main" Requires="p159">
+  <mc:AlternateContent xmlns:mc="http://schemas.openxmlformats.org/markup-compatibility/2006" xmlns:p159="http://schemas.microsoft.com/office/powerpoint/2015/09/main">
+    <mc:Choice Requires="p159">
       <p:transition xmlns:p14="http://schemas.microsoft.com/office/powerpoint/2010/main" spd="slow" p14:dur="2000">
         <p159:morph option="byObject"/>
       </p:transition>
     </mc:Choice>
-    <mc:Fallback>
+    <mc:Fallback xmlns="">
       <p:transition spd="slow">
         <p:fade/>
       </p:transition>
@@ -20068,7 +20897,6 @@
               <a:rPr lang="de-DE" dirty="0"/>
               <a:t>Entwurf: Generierungsalgorithmus</a:t>
             </a:r>
-            <a:endParaRPr lang="de-DE" dirty="0"/>
           </a:p>
         </p:txBody>
       </p:sp>

</xml_diff>